<commit_message>
Report: Driving line generation added
</commit_message>
<xml_diff>
--- a/Docs/Final/systemOverview.pptx
+++ b/Docs/Final/systemOverview.pptx
@@ -6,6 +6,7 @@
   </p:sldMasterIdLst>
   <p:sldIdLst>
     <p:sldId id="256" r:id="rId2"/>
+    <p:sldId id="257" r:id="rId3"/>
   </p:sldIdLst>
   <p:sldSz cx="12192000" cy="6858000"/>
   <p:notesSz cx="6858000" cy="9144000"/>
@@ -104,6 +105,11 @@
       </a:defRPr>
     </a:lvl9pPr>
   </p:defaultTextStyle>
+  <p:extLst>
+    <p:ext uri="{EFAFB233-063F-42B5-8137-9DF3F51BA10A}">
+      <p15:sldGuideLst xmlns:p15="http://schemas.microsoft.com/office/powerpoint/2012/main"/>
+    </p:ext>
+  </p:extLst>
 </p:presentation>
 </file>
 
@@ -3509,7 +3515,7 @@
         </p:nvSpPr>
         <p:spPr>
           <a:xfrm>
-            <a:off x="2763079" y="5445061"/>
+            <a:off x="2763079" y="6306451"/>
             <a:ext cx="1855305" cy="369332"/>
           </a:xfrm>
           <a:prstGeom prst="rect">
@@ -3577,60 +3583,6 @@
       </p:cxnSp>
       <p:sp>
         <p:nvSpPr>
-          <p:cNvPr id="15" name="Rectangle 14">
-            <a:extLst>
-              <a:ext uri="{FF2B5EF4-FFF2-40B4-BE49-F238E27FC236}">
-                <a16:creationId xmlns:a16="http://schemas.microsoft.com/office/drawing/2014/main" id="{2F5048D3-F0B3-47EA-BB6B-9A99974940FA}"/>
-              </a:ext>
-            </a:extLst>
-          </p:cNvPr>
-          <p:cNvSpPr/>
-          <p:nvPr/>
-        </p:nvSpPr>
-        <p:spPr>
-          <a:xfrm>
-            <a:off x="2862470" y="4358587"/>
-            <a:ext cx="1749287" cy="1075649"/>
-          </a:xfrm>
-          <a:prstGeom prst="rect">
-            <a:avLst/>
-          </a:prstGeom>
-          <a:solidFill>
-            <a:schemeClr val="bg1"/>
-          </a:solidFill>
-          <a:ln>
-            <a:solidFill>
-              <a:schemeClr val="tx1"/>
-            </a:solidFill>
-          </a:ln>
-        </p:spPr>
-        <p:style>
-          <a:lnRef idx="2">
-            <a:schemeClr val="accent1">
-              <a:shade val="50000"/>
-            </a:schemeClr>
-          </a:lnRef>
-          <a:fillRef idx="1">
-            <a:schemeClr val="accent1"/>
-          </a:fillRef>
-          <a:effectRef idx="0">
-            <a:schemeClr val="accent1"/>
-          </a:effectRef>
-          <a:fontRef idx="minor">
-            <a:schemeClr val="lt1"/>
-          </a:fontRef>
-        </p:style>
-        <p:txBody>
-          <a:bodyPr rtlCol="0" anchor="ctr"/>
-          <a:lstStyle/>
-          <a:p>
-            <a:pPr algn="ctr"/>
-            <a:endParaRPr lang="en-AU"/>
-          </a:p>
-        </p:txBody>
-      </p:sp>
-      <p:sp>
-        <p:nvSpPr>
           <p:cNvPr id="16" name="Rectangle 15">
             <a:extLst>
               <a:ext uri="{FF2B5EF4-FFF2-40B4-BE49-F238E27FC236}">
@@ -3746,7 +3698,7 @@
         </p:nvSpPr>
         <p:spPr>
           <a:xfrm>
-            <a:off x="5055705" y="5445061"/>
+            <a:off x="5055705" y="6266695"/>
             <a:ext cx="1855305" cy="369332"/>
           </a:xfrm>
           <a:prstGeom prst="rect">
@@ -3814,60 +3766,6 @@
       </p:cxnSp>
       <p:sp>
         <p:nvSpPr>
-          <p:cNvPr id="20" name="Rectangle 19">
-            <a:extLst>
-              <a:ext uri="{FF2B5EF4-FFF2-40B4-BE49-F238E27FC236}">
-                <a16:creationId xmlns:a16="http://schemas.microsoft.com/office/drawing/2014/main" id="{7CDBF9E1-6BC3-43DC-9370-6E5EFDBFA67D}"/>
-              </a:ext>
-            </a:extLst>
-          </p:cNvPr>
-          <p:cNvSpPr/>
-          <p:nvPr/>
-        </p:nvSpPr>
-        <p:spPr>
-          <a:xfrm>
-            <a:off x="5155096" y="4358587"/>
-            <a:ext cx="1749287" cy="1075649"/>
-          </a:xfrm>
-          <a:prstGeom prst="rect">
-            <a:avLst/>
-          </a:prstGeom>
-          <a:solidFill>
-            <a:schemeClr val="bg1"/>
-          </a:solidFill>
-          <a:ln>
-            <a:solidFill>
-              <a:schemeClr val="tx1"/>
-            </a:solidFill>
-          </a:ln>
-        </p:spPr>
-        <p:style>
-          <a:lnRef idx="2">
-            <a:schemeClr val="accent1">
-              <a:shade val="50000"/>
-            </a:schemeClr>
-          </a:lnRef>
-          <a:fillRef idx="1">
-            <a:schemeClr val="accent1"/>
-          </a:fillRef>
-          <a:effectRef idx="0">
-            <a:schemeClr val="accent1"/>
-          </a:effectRef>
-          <a:fontRef idx="minor">
-            <a:schemeClr val="lt1"/>
-          </a:fontRef>
-        </p:style>
-        <p:txBody>
-          <a:bodyPr rtlCol="0" anchor="ctr"/>
-          <a:lstStyle/>
-          <a:p>
-            <a:pPr algn="ctr"/>
-            <a:endParaRPr lang="en-AU"/>
-          </a:p>
-        </p:txBody>
-      </p:sp>
-      <p:sp>
-        <p:nvSpPr>
           <p:cNvPr id="21" name="Rectangle 20">
             <a:extLst>
               <a:ext uri="{FF2B5EF4-FFF2-40B4-BE49-F238E27FC236}">
@@ -3983,7 +3881,7 @@
         </p:nvSpPr>
         <p:spPr>
           <a:xfrm>
-            <a:off x="7348331" y="5445061"/>
+            <a:off x="7348331" y="6266695"/>
             <a:ext cx="1855305" cy="646331"/>
           </a:xfrm>
           <a:prstGeom prst="rect">
@@ -4051,60 +3949,6 @@
       </p:cxnSp>
       <p:sp>
         <p:nvSpPr>
-          <p:cNvPr id="25" name="Rectangle 24">
-            <a:extLst>
-              <a:ext uri="{FF2B5EF4-FFF2-40B4-BE49-F238E27FC236}">
-                <a16:creationId xmlns:a16="http://schemas.microsoft.com/office/drawing/2014/main" id="{A1BFC910-BCAA-44FD-9DEA-7C2ABB1037E1}"/>
-              </a:ext>
-            </a:extLst>
-          </p:cNvPr>
-          <p:cNvSpPr/>
-          <p:nvPr/>
-        </p:nvSpPr>
-        <p:spPr>
-          <a:xfrm>
-            <a:off x="7447722" y="4358587"/>
-            <a:ext cx="1749287" cy="1075649"/>
-          </a:xfrm>
-          <a:prstGeom prst="rect">
-            <a:avLst/>
-          </a:prstGeom>
-          <a:solidFill>
-            <a:schemeClr val="bg1"/>
-          </a:solidFill>
-          <a:ln>
-            <a:solidFill>
-              <a:schemeClr val="tx1"/>
-            </a:solidFill>
-          </a:ln>
-        </p:spPr>
-        <p:style>
-          <a:lnRef idx="2">
-            <a:schemeClr val="accent1">
-              <a:shade val="50000"/>
-            </a:schemeClr>
-          </a:lnRef>
-          <a:fillRef idx="1">
-            <a:schemeClr val="accent1"/>
-          </a:fillRef>
-          <a:effectRef idx="0">
-            <a:schemeClr val="accent1"/>
-          </a:effectRef>
-          <a:fontRef idx="minor">
-            <a:schemeClr val="lt1"/>
-          </a:fontRef>
-        </p:style>
-        <p:txBody>
-          <a:bodyPr rtlCol="0" anchor="ctr"/>
-          <a:lstStyle/>
-          <a:p>
-            <a:pPr algn="ctr"/>
-            <a:endParaRPr lang="en-AU"/>
-          </a:p>
-        </p:txBody>
-      </p:sp>
-      <p:sp>
-        <p:nvSpPr>
           <p:cNvPr id="26" name="Rectangle 25">
             <a:extLst>
               <a:ext uri="{FF2B5EF4-FFF2-40B4-BE49-F238E27FC236}">
@@ -4220,7 +4064,7 @@
         </p:nvSpPr>
         <p:spPr>
           <a:xfrm>
-            <a:off x="9614451" y="5445061"/>
+            <a:off x="9614451" y="6266695"/>
             <a:ext cx="1855305" cy="646331"/>
           </a:xfrm>
           <a:prstGeom prst="rect">
@@ -4286,60 +4130,6 @@
           </a:fontRef>
         </p:style>
       </p:cxnSp>
-      <p:sp>
-        <p:nvSpPr>
-          <p:cNvPr id="30" name="Rectangle 29">
-            <a:extLst>
-              <a:ext uri="{FF2B5EF4-FFF2-40B4-BE49-F238E27FC236}">
-                <a16:creationId xmlns:a16="http://schemas.microsoft.com/office/drawing/2014/main" id="{706BB3D2-0B93-49FB-8FCB-EE0F7F34C398}"/>
-              </a:ext>
-            </a:extLst>
-          </p:cNvPr>
-          <p:cNvSpPr/>
-          <p:nvPr/>
-        </p:nvSpPr>
-        <p:spPr>
-          <a:xfrm>
-            <a:off x="9713842" y="4358587"/>
-            <a:ext cx="1749287" cy="1075649"/>
-          </a:xfrm>
-          <a:prstGeom prst="rect">
-            <a:avLst/>
-          </a:prstGeom>
-          <a:solidFill>
-            <a:schemeClr val="bg1"/>
-          </a:solidFill>
-          <a:ln>
-            <a:solidFill>
-              <a:schemeClr val="tx1"/>
-            </a:solidFill>
-          </a:ln>
-        </p:spPr>
-        <p:style>
-          <a:lnRef idx="2">
-            <a:schemeClr val="accent1">
-              <a:shade val="50000"/>
-            </a:schemeClr>
-          </a:lnRef>
-          <a:fillRef idx="1">
-            <a:schemeClr val="accent1"/>
-          </a:fillRef>
-          <a:effectRef idx="0">
-            <a:schemeClr val="accent1"/>
-          </a:effectRef>
-          <a:fontRef idx="minor">
-            <a:schemeClr val="lt1"/>
-          </a:fontRef>
-        </p:style>
-        <p:txBody>
-          <a:bodyPr rtlCol="0" anchor="ctr"/>
-          <a:lstStyle/>
-          <a:p>
-            <a:pPr algn="ctr"/>
-            <a:endParaRPr lang="en-AU"/>
-          </a:p>
-        </p:txBody>
-      </p:sp>
       <p:sp>
         <p:nvSpPr>
           <p:cNvPr id="31" name="TextBox 30">
@@ -4721,10 +4511,1758 @@
           </a:fontRef>
         </p:style>
       </p:cxnSp>
+      <p:pic>
+        <p:nvPicPr>
+          <p:cNvPr id="52" name="Picture 51">
+            <a:extLst>
+              <a:ext uri="{FF2B5EF4-FFF2-40B4-BE49-F238E27FC236}">
+                <a16:creationId xmlns:a16="http://schemas.microsoft.com/office/drawing/2014/main" id="{6974363B-0C81-46E2-A1E0-A0C97760E09E}"/>
+              </a:ext>
+            </a:extLst>
+          </p:cNvPr>
+          <p:cNvPicPr>
+            <a:picLocks noChangeAspect="1"/>
+          </p:cNvPicPr>
+          <p:nvPr/>
+        </p:nvPicPr>
+        <p:blipFill>
+          <a:blip r:embed="rId2"/>
+          <a:stretch>
+            <a:fillRect/>
+          </a:stretch>
+        </p:blipFill>
+        <p:spPr>
+          <a:xfrm>
+            <a:off x="10073675" y="4368162"/>
+            <a:ext cx="1029619" cy="1871166"/>
+          </a:xfrm>
+          <a:prstGeom prst="rect">
+            <a:avLst/>
+          </a:prstGeom>
+        </p:spPr>
+      </p:pic>
+      <p:pic>
+        <p:nvPicPr>
+          <p:cNvPr id="53" name="Picture 52">
+            <a:extLst>
+              <a:ext uri="{FF2B5EF4-FFF2-40B4-BE49-F238E27FC236}">
+                <a16:creationId xmlns:a16="http://schemas.microsoft.com/office/drawing/2014/main" id="{BC7E04D2-1301-42CD-9522-EE7586E5B28E}"/>
+              </a:ext>
+            </a:extLst>
+          </p:cNvPr>
+          <p:cNvPicPr>
+            <a:picLocks noChangeAspect="1"/>
+          </p:cNvPicPr>
+          <p:nvPr/>
+        </p:nvPicPr>
+        <p:blipFill>
+          <a:blip r:embed="rId3"/>
+          <a:stretch>
+            <a:fillRect/>
+          </a:stretch>
+        </p:blipFill>
+        <p:spPr>
+          <a:xfrm>
+            <a:off x="7417171" y="4454954"/>
+            <a:ext cx="1855302" cy="1657725"/>
+          </a:xfrm>
+          <a:prstGeom prst="rect">
+            <a:avLst/>
+          </a:prstGeom>
+        </p:spPr>
+      </p:pic>
+      <p:pic>
+        <p:nvPicPr>
+          <p:cNvPr id="54" name="Picture 53">
+            <a:extLst>
+              <a:ext uri="{FF2B5EF4-FFF2-40B4-BE49-F238E27FC236}">
+                <a16:creationId xmlns:a16="http://schemas.microsoft.com/office/drawing/2014/main" id="{0532A967-AED4-4E1D-A29F-0FA269BBFF7F}"/>
+              </a:ext>
+            </a:extLst>
+          </p:cNvPr>
+          <p:cNvPicPr>
+            <a:picLocks noChangeAspect="1"/>
+          </p:cNvPicPr>
+          <p:nvPr/>
+        </p:nvPicPr>
+        <p:blipFill>
+          <a:blip r:embed="rId4"/>
+          <a:stretch>
+            <a:fillRect/>
+          </a:stretch>
+        </p:blipFill>
+        <p:spPr>
+          <a:xfrm>
+            <a:off x="472844" y="4469917"/>
+            <a:ext cx="1757755" cy="1642762"/>
+          </a:xfrm>
+          <a:prstGeom prst="rect">
+            <a:avLst/>
+          </a:prstGeom>
+        </p:spPr>
+      </p:pic>
+      <p:pic>
+        <p:nvPicPr>
+          <p:cNvPr id="55" name="Picture 54">
+            <a:extLst>
+              <a:ext uri="{FF2B5EF4-FFF2-40B4-BE49-F238E27FC236}">
+                <a16:creationId xmlns:a16="http://schemas.microsoft.com/office/drawing/2014/main" id="{9EA50B5B-0351-4572-9855-4435A935DF5E}"/>
+              </a:ext>
+            </a:extLst>
+          </p:cNvPr>
+          <p:cNvPicPr>
+            <a:picLocks noChangeAspect="1"/>
+          </p:cNvPicPr>
+          <p:nvPr/>
+        </p:nvPicPr>
+        <p:blipFill>
+          <a:blip r:embed="rId5"/>
+          <a:stretch>
+            <a:fillRect/>
+          </a:stretch>
+        </p:blipFill>
+        <p:spPr>
+          <a:xfrm>
+            <a:off x="2826155" y="4457180"/>
+            <a:ext cx="1752473" cy="1767536"/>
+          </a:xfrm>
+          <a:prstGeom prst="rect">
+            <a:avLst/>
+          </a:prstGeom>
+        </p:spPr>
+      </p:pic>
     </p:spTree>
     <p:extLst>
       <p:ext uri="{BB962C8B-B14F-4D97-AF65-F5344CB8AC3E}">
         <p14:creationId xmlns:p14="http://schemas.microsoft.com/office/powerpoint/2010/main" val="2670385884"/>
+      </p:ext>
+    </p:extLst>
+  </p:cSld>
+  <p:clrMapOvr>
+    <a:masterClrMapping/>
+  </p:clrMapOvr>
+</p:sld>
+</file>
+
+<file path=ppt/slides/slide2.xml><?xml version="1.0" encoding="utf-8"?>
+<p:sld xmlns:a="http://schemas.openxmlformats.org/drawingml/2006/main" xmlns:r="http://schemas.openxmlformats.org/officeDocument/2006/relationships" xmlns:p="http://schemas.openxmlformats.org/presentationml/2006/main">
+  <p:cSld>
+    <p:spTree>
+      <p:nvGrpSpPr>
+        <p:cNvPr id="1" name=""/>
+        <p:cNvGrpSpPr/>
+        <p:nvPr/>
+      </p:nvGrpSpPr>
+      <p:grpSpPr>
+        <a:xfrm>
+          <a:off x="0" y="0"/>
+          <a:ext cx="0" cy="0"/>
+          <a:chOff x="0" y="0"/>
+          <a:chExt cx="0" cy="0"/>
+        </a:xfrm>
+      </p:grpSpPr>
+      <p:grpSp>
+        <p:nvGrpSpPr>
+          <p:cNvPr id="48" name="Group 47">
+            <a:extLst>
+              <a:ext uri="{FF2B5EF4-FFF2-40B4-BE49-F238E27FC236}">
+                <a16:creationId xmlns:a16="http://schemas.microsoft.com/office/drawing/2014/main" id="{79E69EC9-06E8-4045-9C5B-F34D1D2BE19F}"/>
+              </a:ext>
+            </a:extLst>
+          </p:cNvPr>
+          <p:cNvGrpSpPr/>
+          <p:nvPr/>
+        </p:nvGrpSpPr>
+        <p:grpSpPr>
+          <a:xfrm>
+            <a:off x="5168607" y="890145"/>
+            <a:ext cx="7430741" cy="6806815"/>
+            <a:chOff x="-1522292" y="1016384"/>
+            <a:chExt cx="7430741" cy="6806815"/>
+          </a:xfrm>
+        </p:grpSpPr>
+        <p:cxnSp>
+          <p:nvCxnSpPr>
+            <p:cNvPr id="23" name="Straight Connector 22">
+              <a:extLst>
+                <a:ext uri="{FF2B5EF4-FFF2-40B4-BE49-F238E27FC236}">
+                  <a16:creationId xmlns:a16="http://schemas.microsoft.com/office/drawing/2014/main" id="{A6F0082E-9787-4C95-B276-A094E3206CE7}"/>
+                </a:ext>
+              </a:extLst>
+            </p:cNvPr>
+            <p:cNvCxnSpPr>
+              <a:cxnSpLocks/>
+            </p:cNvCxnSpPr>
+            <p:nvPr/>
+          </p:nvCxnSpPr>
+          <p:spPr>
+            <a:xfrm>
+              <a:off x="2411896" y="1629744"/>
+              <a:ext cx="2285999" cy="1101367"/>
+            </a:xfrm>
+            <a:prstGeom prst="line">
+              <a:avLst/>
+            </a:prstGeom>
+            <a:ln>
+              <a:solidFill>
+                <a:schemeClr val="tx1"/>
+              </a:solidFill>
+            </a:ln>
+          </p:spPr>
+          <p:style>
+            <a:lnRef idx="1">
+              <a:schemeClr val="accent1"/>
+            </a:lnRef>
+            <a:fillRef idx="0">
+              <a:schemeClr val="accent1"/>
+            </a:fillRef>
+            <a:effectRef idx="0">
+              <a:schemeClr val="accent1"/>
+            </a:effectRef>
+            <a:fontRef idx="minor">
+              <a:schemeClr val="tx1"/>
+            </a:fontRef>
+          </p:style>
+        </p:cxnSp>
+        <p:sp>
+          <p:nvSpPr>
+            <p:cNvPr id="5" name="Oval 4">
+              <a:extLst>
+                <a:ext uri="{FF2B5EF4-FFF2-40B4-BE49-F238E27FC236}">
+                  <a16:creationId xmlns:a16="http://schemas.microsoft.com/office/drawing/2014/main" id="{BB8B3061-A351-4781-B553-B8F45DDE8CCC}"/>
+                </a:ext>
+              </a:extLst>
+            </p:cNvPr>
+            <p:cNvSpPr/>
+            <p:nvPr/>
+          </p:nvSpPr>
+          <p:spPr>
+            <a:xfrm>
+              <a:off x="1384853" y="1517374"/>
+              <a:ext cx="172278" cy="172278"/>
+            </a:xfrm>
+            <a:prstGeom prst="ellipse">
+              <a:avLst/>
+            </a:prstGeom>
+            <a:solidFill>
+              <a:schemeClr val="tx1"/>
+            </a:solidFill>
+            <a:ln>
+              <a:noFill/>
+            </a:ln>
+          </p:spPr>
+          <p:style>
+            <a:lnRef idx="2">
+              <a:schemeClr val="accent1">
+                <a:shade val="50000"/>
+              </a:schemeClr>
+            </a:lnRef>
+            <a:fillRef idx="1">
+              <a:schemeClr val="accent1"/>
+            </a:fillRef>
+            <a:effectRef idx="0">
+              <a:schemeClr val="accent1"/>
+            </a:effectRef>
+            <a:fontRef idx="minor">
+              <a:schemeClr val="lt1"/>
+            </a:fontRef>
+          </p:style>
+          <p:txBody>
+            <a:bodyPr rtlCol="0" anchor="ctr"/>
+            <a:lstStyle/>
+            <a:p>
+              <a:pPr algn="ctr"/>
+              <a:endParaRPr lang="en-AU"/>
+            </a:p>
+          </p:txBody>
+        </p:sp>
+        <p:sp>
+          <p:nvSpPr>
+            <p:cNvPr id="6" name="Oval 5">
+              <a:extLst>
+                <a:ext uri="{FF2B5EF4-FFF2-40B4-BE49-F238E27FC236}">
+                  <a16:creationId xmlns:a16="http://schemas.microsoft.com/office/drawing/2014/main" id="{6F500579-8283-4BF1-8E62-A638B8C161E1}"/>
+                </a:ext>
+              </a:extLst>
+            </p:cNvPr>
+            <p:cNvSpPr/>
+            <p:nvPr/>
+          </p:nvSpPr>
+          <p:spPr>
+            <a:xfrm>
+              <a:off x="4605131" y="1517374"/>
+              <a:ext cx="172278" cy="172278"/>
+            </a:xfrm>
+            <a:prstGeom prst="ellipse">
+              <a:avLst/>
+            </a:prstGeom>
+            <a:solidFill>
+              <a:schemeClr val="tx1"/>
+            </a:solidFill>
+            <a:ln>
+              <a:noFill/>
+            </a:ln>
+          </p:spPr>
+          <p:style>
+            <a:lnRef idx="2">
+              <a:schemeClr val="accent1">
+                <a:shade val="50000"/>
+              </a:schemeClr>
+            </a:lnRef>
+            <a:fillRef idx="1">
+              <a:schemeClr val="accent1"/>
+            </a:fillRef>
+            <a:effectRef idx="0">
+              <a:schemeClr val="accent1"/>
+            </a:effectRef>
+            <a:fontRef idx="minor">
+              <a:schemeClr val="lt1"/>
+            </a:fontRef>
+          </p:style>
+          <p:txBody>
+            <a:bodyPr rtlCol="0" anchor="ctr"/>
+            <a:lstStyle/>
+            <a:p>
+              <a:pPr algn="ctr"/>
+              <a:endParaRPr lang="en-AU"/>
+            </a:p>
+          </p:txBody>
+        </p:sp>
+        <p:sp>
+          <p:nvSpPr>
+            <p:cNvPr id="7" name="Oval 6">
+              <a:extLst>
+                <a:ext uri="{FF2B5EF4-FFF2-40B4-BE49-F238E27FC236}">
+                  <a16:creationId xmlns:a16="http://schemas.microsoft.com/office/drawing/2014/main" id="{18686E00-29D2-40ED-A672-D34E13749229}"/>
+                </a:ext>
+              </a:extLst>
+            </p:cNvPr>
+            <p:cNvSpPr/>
+            <p:nvPr/>
+          </p:nvSpPr>
+          <p:spPr>
+            <a:xfrm>
+              <a:off x="4605131" y="4737652"/>
+              <a:ext cx="172278" cy="172278"/>
+            </a:xfrm>
+            <a:prstGeom prst="ellipse">
+              <a:avLst/>
+            </a:prstGeom>
+            <a:solidFill>
+              <a:schemeClr val="tx1"/>
+            </a:solidFill>
+            <a:ln>
+              <a:noFill/>
+            </a:ln>
+          </p:spPr>
+          <p:style>
+            <a:lnRef idx="2">
+              <a:schemeClr val="accent1">
+                <a:shade val="50000"/>
+              </a:schemeClr>
+            </a:lnRef>
+            <a:fillRef idx="1">
+              <a:schemeClr val="accent1"/>
+            </a:fillRef>
+            <a:effectRef idx="0">
+              <a:schemeClr val="accent1"/>
+            </a:effectRef>
+            <a:fontRef idx="minor">
+              <a:schemeClr val="lt1"/>
+            </a:fontRef>
+          </p:style>
+          <p:txBody>
+            <a:bodyPr rtlCol="0" anchor="ctr"/>
+            <a:lstStyle/>
+            <a:p>
+              <a:pPr algn="ctr"/>
+              <a:endParaRPr lang="en-AU"/>
+            </a:p>
+          </p:txBody>
+        </p:sp>
+        <p:cxnSp>
+          <p:nvCxnSpPr>
+            <p:cNvPr id="9" name="Straight Connector 8">
+              <a:extLst>
+                <a:ext uri="{FF2B5EF4-FFF2-40B4-BE49-F238E27FC236}">
+                  <a16:creationId xmlns:a16="http://schemas.microsoft.com/office/drawing/2014/main" id="{94C0ADDF-1B42-44B4-88BC-6A71CDC09042}"/>
+                </a:ext>
+              </a:extLst>
+            </p:cNvPr>
+            <p:cNvCxnSpPr>
+              <a:cxnSpLocks/>
+            </p:cNvCxnSpPr>
+            <p:nvPr/>
+          </p:nvCxnSpPr>
+          <p:spPr>
+            <a:xfrm flipV="1">
+              <a:off x="4697895" y="1603513"/>
+              <a:ext cx="0" cy="3220278"/>
+            </a:xfrm>
+            <a:prstGeom prst="line">
+              <a:avLst/>
+            </a:prstGeom>
+            <a:ln>
+              <a:solidFill>
+                <a:schemeClr val="tx1"/>
+              </a:solidFill>
+            </a:ln>
+          </p:spPr>
+          <p:style>
+            <a:lnRef idx="1">
+              <a:schemeClr val="accent1"/>
+            </a:lnRef>
+            <a:fillRef idx="0">
+              <a:schemeClr val="accent1"/>
+            </a:fillRef>
+            <a:effectRef idx="0">
+              <a:schemeClr val="accent1"/>
+            </a:effectRef>
+            <a:fontRef idx="minor">
+              <a:schemeClr val="tx1"/>
+            </a:fontRef>
+          </p:style>
+        </p:cxnSp>
+        <p:cxnSp>
+          <p:nvCxnSpPr>
+            <p:cNvPr id="10" name="Straight Connector 9">
+              <a:extLst>
+                <a:ext uri="{FF2B5EF4-FFF2-40B4-BE49-F238E27FC236}">
+                  <a16:creationId xmlns:a16="http://schemas.microsoft.com/office/drawing/2014/main" id="{28C815E3-7F08-4468-9171-BD779C2BCA26}"/>
+                </a:ext>
+              </a:extLst>
+            </p:cNvPr>
+            <p:cNvCxnSpPr>
+              <a:cxnSpLocks/>
+            </p:cNvCxnSpPr>
+            <p:nvPr/>
+          </p:nvCxnSpPr>
+          <p:spPr>
+            <a:xfrm>
+              <a:off x="1517376" y="1603513"/>
+              <a:ext cx="3087755" cy="0"/>
+            </a:xfrm>
+            <a:prstGeom prst="line">
+              <a:avLst/>
+            </a:prstGeom>
+            <a:ln>
+              <a:solidFill>
+                <a:schemeClr val="tx1"/>
+              </a:solidFill>
+            </a:ln>
+          </p:spPr>
+          <p:style>
+            <a:lnRef idx="1">
+              <a:schemeClr val="accent1"/>
+            </a:lnRef>
+            <a:fillRef idx="0">
+              <a:schemeClr val="accent1"/>
+            </a:fillRef>
+            <a:effectRef idx="0">
+              <a:schemeClr val="accent1"/>
+            </a:effectRef>
+            <a:fontRef idx="minor">
+              <a:schemeClr val="tx1"/>
+            </a:fontRef>
+          </p:style>
+        </p:cxnSp>
+        <p:sp>
+          <p:nvSpPr>
+            <p:cNvPr id="17" name="TextBox 16">
+              <a:extLst>
+                <a:ext uri="{FF2B5EF4-FFF2-40B4-BE49-F238E27FC236}">
+                  <a16:creationId xmlns:a16="http://schemas.microsoft.com/office/drawing/2014/main" id="{8F3D819D-1EF6-40CB-B61F-92DEBAD7A864}"/>
+                </a:ext>
+              </a:extLst>
+            </p:cNvPr>
+            <p:cNvSpPr txBox="1"/>
+            <p:nvPr/>
+          </p:nvSpPr>
+          <p:spPr>
+            <a:xfrm>
+              <a:off x="3879445" y="5155960"/>
+              <a:ext cx="1623650" cy="369332"/>
+            </a:xfrm>
+            <a:prstGeom prst="rect">
+              <a:avLst/>
+            </a:prstGeom>
+            <a:noFill/>
+          </p:spPr>
+          <p:txBody>
+            <a:bodyPr wrap="none" rtlCol="0">
+              <a:spAutoFit/>
+            </a:bodyPr>
+            <a:lstStyle/>
+            <a:p>
+              <a:r>
+                <a:rPr lang="en-US" dirty="0"/>
+                <a:t>Approach node</a:t>
+              </a:r>
+              <a:endParaRPr lang="en-AU" dirty="0"/>
+            </a:p>
+          </p:txBody>
+        </p:sp>
+        <p:sp>
+          <p:nvSpPr>
+            <p:cNvPr id="18" name="TextBox 17">
+              <a:extLst>
+                <a:ext uri="{FF2B5EF4-FFF2-40B4-BE49-F238E27FC236}">
+                  <a16:creationId xmlns:a16="http://schemas.microsoft.com/office/drawing/2014/main" id="{9D92E374-1DA2-4DD8-B9C2-061E7944F81E}"/>
+                </a:ext>
+              </a:extLst>
+            </p:cNvPr>
+            <p:cNvSpPr txBox="1"/>
+            <p:nvPr/>
+          </p:nvSpPr>
+          <p:spPr>
+            <a:xfrm>
+              <a:off x="4472350" y="1025027"/>
+              <a:ext cx="1436099" cy="369332"/>
+            </a:xfrm>
+            <a:prstGeom prst="rect">
+              <a:avLst/>
+            </a:prstGeom>
+            <a:noFill/>
+          </p:spPr>
+          <p:txBody>
+            <a:bodyPr wrap="none" rtlCol="0">
+              <a:spAutoFit/>
+            </a:bodyPr>
+            <a:lstStyle/>
+            <a:p>
+              <a:r>
+                <a:rPr lang="en-US" dirty="0"/>
+                <a:t>Feature node</a:t>
+              </a:r>
+              <a:endParaRPr lang="en-AU" dirty="0"/>
+            </a:p>
+          </p:txBody>
+        </p:sp>
+        <p:sp>
+          <p:nvSpPr>
+            <p:cNvPr id="19" name="TextBox 18">
+              <a:extLst>
+                <a:ext uri="{FF2B5EF4-FFF2-40B4-BE49-F238E27FC236}">
+                  <a16:creationId xmlns:a16="http://schemas.microsoft.com/office/drawing/2014/main" id="{3775ED4A-2AE1-4577-A6E2-347C44AA033C}"/>
+                </a:ext>
+              </a:extLst>
+            </p:cNvPr>
+            <p:cNvSpPr txBox="1"/>
+            <p:nvPr/>
+          </p:nvSpPr>
+          <p:spPr>
+            <a:xfrm>
+              <a:off x="205150" y="1016384"/>
+              <a:ext cx="1059906" cy="369332"/>
+            </a:xfrm>
+            <a:prstGeom prst="rect">
+              <a:avLst/>
+            </a:prstGeom>
+            <a:noFill/>
+          </p:spPr>
+          <p:txBody>
+            <a:bodyPr wrap="none" rtlCol="0">
+              <a:spAutoFit/>
+            </a:bodyPr>
+            <a:lstStyle/>
+            <a:p>
+              <a:r>
+                <a:rPr lang="en-US" dirty="0"/>
+                <a:t>Exit node</a:t>
+              </a:r>
+              <a:endParaRPr lang="en-AU" dirty="0"/>
+            </a:p>
+          </p:txBody>
+        </p:sp>
+        <p:sp>
+          <p:nvSpPr>
+            <p:cNvPr id="21" name="Oval 20">
+              <a:extLst>
+                <a:ext uri="{FF2B5EF4-FFF2-40B4-BE49-F238E27FC236}">
+                  <a16:creationId xmlns:a16="http://schemas.microsoft.com/office/drawing/2014/main" id="{57BBFA6D-8FB3-4CA9-A9E2-C098C9EA8E4B}"/>
+                </a:ext>
+              </a:extLst>
+            </p:cNvPr>
+            <p:cNvSpPr/>
+            <p:nvPr/>
+          </p:nvSpPr>
+          <p:spPr>
+            <a:xfrm>
+              <a:off x="2325757" y="1517374"/>
+              <a:ext cx="172278" cy="172278"/>
+            </a:xfrm>
+            <a:prstGeom prst="ellipse">
+              <a:avLst/>
+            </a:prstGeom>
+            <a:solidFill>
+              <a:schemeClr val="bg1"/>
+            </a:solidFill>
+            <a:ln>
+              <a:solidFill>
+                <a:schemeClr val="tx1"/>
+              </a:solidFill>
+            </a:ln>
+          </p:spPr>
+          <p:style>
+            <a:lnRef idx="2">
+              <a:schemeClr val="accent1">
+                <a:shade val="50000"/>
+              </a:schemeClr>
+            </a:lnRef>
+            <a:fillRef idx="1">
+              <a:schemeClr val="accent1"/>
+            </a:fillRef>
+            <a:effectRef idx="0">
+              <a:schemeClr val="accent1"/>
+            </a:effectRef>
+            <a:fontRef idx="minor">
+              <a:schemeClr val="lt1"/>
+            </a:fontRef>
+          </p:style>
+          <p:txBody>
+            <a:bodyPr rtlCol="0" anchor="ctr"/>
+            <a:lstStyle/>
+            <a:p>
+              <a:pPr algn="ctr"/>
+              <a:endParaRPr lang="en-AU"/>
+            </a:p>
+          </p:txBody>
+        </p:sp>
+        <p:sp>
+          <p:nvSpPr>
+            <p:cNvPr id="22" name="Oval 21">
+              <a:extLst>
+                <a:ext uri="{FF2B5EF4-FFF2-40B4-BE49-F238E27FC236}">
+                  <a16:creationId xmlns:a16="http://schemas.microsoft.com/office/drawing/2014/main" id="{FA4CF283-511A-4292-98E2-CEFE95F58081}"/>
+                </a:ext>
+              </a:extLst>
+            </p:cNvPr>
+            <p:cNvSpPr/>
+            <p:nvPr/>
+          </p:nvSpPr>
+          <p:spPr>
+            <a:xfrm>
+              <a:off x="4605131" y="2632794"/>
+              <a:ext cx="172278" cy="172278"/>
+            </a:xfrm>
+            <a:prstGeom prst="ellipse">
+              <a:avLst/>
+            </a:prstGeom>
+            <a:solidFill>
+              <a:schemeClr val="bg1"/>
+            </a:solidFill>
+            <a:ln>
+              <a:solidFill>
+                <a:schemeClr val="tx1"/>
+              </a:solidFill>
+            </a:ln>
+          </p:spPr>
+          <p:style>
+            <a:lnRef idx="2">
+              <a:schemeClr val="accent1">
+                <a:shade val="50000"/>
+              </a:schemeClr>
+            </a:lnRef>
+            <a:fillRef idx="1">
+              <a:schemeClr val="accent1"/>
+            </a:fillRef>
+            <a:effectRef idx="0">
+              <a:schemeClr val="accent1"/>
+            </a:effectRef>
+            <a:fontRef idx="minor">
+              <a:schemeClr val="lt1"/>
+            </a:fontRef>
+          </p:style>
+          <p:txBody>
+            <a:bodyPr rtlCol="0" anchor="ctr"/>
+            <a:lstStyle/>
+            <a:p>
+              <a:pPr algn="ctr"/>
+              <a:endParaRPr lang="en-AU"/>
+            </a:p>
+          </p:txBody>
+        </p:sp>
+        <p:sp>
+          <p:nvSpPr>
+            <p:cNvPr id="33" name="Isosceles Triangle 32">
+              <a:extLst>
+                <a:ext uri="{FF2B5EF4-FFF2-40B4-BE49-F238E27FC236}">
+                  <a16:creationId xmlns:a16="http://schemas.microsoft.com/office/drawing/2014/main" id="{ABC94D29-BFE4-4D78-ABC9-8B184B6F7BD7}"/>
+                </a:ext>
+              </a:extLst>
+            </p:cNvPr>
+            <p:cNvSpPr/>
+            <p:nvPr/>
+          </p:nvSpPr>
+          <p:spPr>
+            <a:xfrm>
+              <a:off x="2965175" y="1835528"/>
+              <a:ext cx="172278" cy="172278"/>
+            </a:xfrm>
+            <a:prstGeom prst="triangle">
+              <a:avLst/>
+            </a:prstGeom>
+            <a:solidFill>
+              <a:schemeClr val="tx1"/>
+            </a:solidFill>
+            <a:ln>
+              <a:solidFill>
+                <a:schemeClr val="tx1"/>
+              </a:solidFill>
+            </a:ln>
+          </p:spPr>
+          <p:style>
+            <a:lnRef idx="2">
+              <a:schemeClr val="accent1">
+                <a:shade val="50000"/>
+              </a:schemeClr>
+            </a:lnRef>
+            <a:fillRef idx="1">
+              <a:schemeClr val="accent1"/>
+            </a:fillRef>
+            <a:effectRef idx="0">
+              <a:schemeClr val="accent1"/>
+            </a:effectRef>
+            <a:fontRef idx="minor">
+              <a:schemeClr val="lt1"/>
+            </a:fontRef>
+          </p:style>
+          <p:txBody>
+            <a:bodyPr rtlCol="0" anchor="ctr"/>
+            <a:lstStyle/>
+            <a:p>
+              <a:pPr algn="ctr"/>
+              <a:endParaRPr lang="en-AU"/>
+            </a:p>
+          </p:txBody>
+        </p:sp>
+        <p:sp>
+          <p:nvSpPr>
+            <p:cNvPr id="34" name="Arc 33">
+              <a:extLst>
+                <a:ext uri="{FF2B5EF4-FFF2-40B4-BE49-F238E27FC236}">
+                  <a16:creationId xmlns:a16="http://schemas.microsoft.com/office/drawing/2014/main" id="{7D9D17F5-FE1C-4C7D-9E54-40BB80A98207}"/>
+                </a:ext>
+              </a:extLst>
+            </p:cNvPr>
+            <p:cNvSpPr/>
+            <p:nvPr/>
+          </p:nvSpPr>
+          <p:spPr>
+            <a:xfrm>
+              <a:off x="-1522292" y="1602682"/>
+              <a:ext cx="6220187" cy="6220517"/>
+            </a:xfrm>
+            <a:prstGeom prst="arc">
+              <a:avLst>
+                <a:gd name="adj1" fmla="val 16174591"/>
+                <a:gd name="adj2" fmla="val 0"/>
+              </a:avLst>
+            </a:prstGeom>
+            <a:noFill/>
+            <a:ln w="57150">
+              <a:solidFill>
+                <a:schemeClr val="tx1"/>
+              </a:solidFill>
+              <a:prstDash val="dash"/>
+            </a:ln>
+          </p:spPr>
+          <p:style>
+            <a:lnRef idx="1">
+              <a:schemeClr val="accent1"/>
+            </a:lnRef>
+            <a:fillRef idx="0">
+              <a:schemeClr val="accent1"/>
+            </a:fillRef>
+            <a:effectRef idx="0">
+              <a:schemeClr val="accent1"/>
+            </a:effectRef>
+            <a:fontRef idx="minor">
+              <a:schemeClr val="tx1"/>
+            </a:fontRef>
+          </p:style>
+          <p:txBody>
+            <a:bodyPr rtlCol="0" anchor="ctr"/>
+            <a:lstStyle/>
+            <a:p>
+              <a:pPr algn="ctr"/>
+              <a:endParaRPr lang="en-AU"/>
+            </a:p>
+          </p:txBody>
+        </p:sp>
+      </p:grpSp>
+      <p:grpSp>
+        <p:nvGrpSpPr>
+          <p:cNvPr id="11" name="Group 10">
+            <a:extLst>
+              <a:ext uri="{FF2B5EF4-FFF2-40B4-BE49-F238E27FC236}">
+                <a16:creationId xmlns:a16="http://schemas.microsoft.com/office/drawing/2014/main" id="{68ADB2F7-8876-41BF-B1CF-6BD14BF73F9E}"/>
+              </a:ext>
+            </a:extLst>
+          </p:cNvPr>
+          <p:cNvGrpSpPr/>
+          <p:nvPr/>
+        </p:nvGrpSpPr>
+        <p:grpSpPr>
+          <a:xfrm>
+            <a:off x="0" y="400683"/>
+            <a:ext cx="6015994" cy="4889932"/>
+            <a:chOff x="0" y="400683"/>
+            <a:chExt cx="6015994" cy="4889932"/>
+          </a:xfrm>
+        </p:grpSpPr>
+        <p:grpSp>
+          <p:nvGrpSpPr>
+            <p:cNvPr id="54" name="Group 53">
+              <a:extLst>
+                <a:ext uri="{FF2B5EF4-FFF2-40B4-BE49-F238E27FC236}">
+                  <a16:creationId xmlns:a16="http://schemas.microsoft.com/office/drawing/2014/main" id="{AA29CFA4-68E8-42D5-A6B3-AFC2B9EE781F}"/>
+                </a:ext>
+              </a:extLst>
+            </p:cNvPr>
+            <p:cNvGrpSpPr/>
+            <p:nvPr/>
+          </p:nvGrpSpPr>
+          <p:grpSpPr>
+            <a:xfrm>
+              <a:off x="0" y="400683"/>
+              <a:ext cx="6015994" cy="4889932"/>
+              <a:chOff x="683333" y="413383"/>
+              <a:chExt cx="6015994" cy="4889932"/>
+            </a:xfrm>
+          </p:grpSpPr>
+          <p:cxnSp>
+            <p:nvCxnSpPr>
+              <p:cNvPr id="35" name="Straight Connector 34">
+                <a:extLst>
+                  <a:ext uri="{FF2B5EF4-FFF2-40B4-BE49-F238E27FC236}">
+                    <a16:creationId xmlns:a16="http://schemas.microsoft.com/office/drawing/2014/main" id="{C3001F6D-F17E-4B1B-B9DB-6828590BE644}"/>
+                  </a:ext>
+                </a:extLst>
+              </p:cNvPr>
+              <p:cNvCxnSpPr>
+                <a:cxnSpLocks/>
+              </p:cNvCxnSpPr>
+              <p:nvPr/>
+            </p:nvCxnSpPr>
+            <p:spPr>
+              <a:xfrm>
+                <a:off x="2890079" y="1407767"/>
+                <a:ext cx="2285999" cy="1101367"/>
+              </a:xfrm>
+              <a:prstGeom prst="line">
+                <a:avLst/>
+              </a:prstGeom>
+              <a:ln>
+                <a:solidFill>
+                  <a:schemeClr val="tx1"/>
+                </a:solidFill>
+              </a:ln>
+            </p:spPr>
+            <p:style>
+              <a:lnRef idx="1">
+                <a:schemeClr val="accent1"/>
+              </a:lnRef>
+              <a:fillRef idx="0">
+                <a:schemeClr val="accent1"/>
+              </a:fillRef>
+              <a:effectRef idx="0">
+                <a:schemeClr val="accent1"/>
+              </a:effectRef>
+              <a:fontRef idx="minor">
+                <a:schemeClr val="tx1"/>
+              </a:fontRef>
+            </p:style>
+          </p:cxnSp>
+          <p:sp>
+            <p:nvSpPr>
+              <p:cNvPr id="36" name="Oval 35">
+                <a:extLst>
+                  <a:ext uri="{FF2B5EF4-FFF2-40B4-BE49-F238E27FC236}">
+                    <a16:creationId xmlns:a16="http://schemas.microsoft.com/office/drawing/2014/main" id="{35737EFA-41F0-4502-BEA6-53B7F6EAEA21}"/>
+                  </a:ext>
+                </a:extLst>
+              </p:cNvPr>
+              <p:cNvSpPr/>
+              <p:nvPr/>
+            </p:nvSpPr>
+            <p:spPr>
+              <a:xfrm>
+                <a:off x="1863036" y="1295397"/>
+                <a:ext cx="172278" cy="172278"/>
+              </a:xfrm>
+              <a:prstGeom prst="ellipse">
+                <a:avLst/>
+              </a:prstGeom>
+              <a:solidFill>
+                <a:schemeClr val="tx1"/>
+              </a:solidFill>
+              <a:ln>
+                <a:noFill/>
+              </a:ln>
+            </p:spPr>
+            <p:style>
+              <a:lnRef idx="2">
+                <a:schemeClr val="accent1">
+                  <a:shade val="50000"/>
+                </a:schemeClr>
+              </a:lnRef>
+              <a:fillRef idx="1">
+                <a:schemeClr val="accent1"/>
+              </a:fillRef>
+              <a:effectRef idx="0">
+                <a:schemeClr val="accent1"/>
+              </a:effectRef>
+              <a:fontRef idx="minor">
+                <a:schemeClr val="lt1"/>
+              </a:fontRef>
+            </p:style>
+            <p:txBody>
+              <a:bodyPr rtlCol="0" anchor="ctr"/>
+              <a:lstStyle/>
+              <a:p>
+                <a:pPr algn="ctr"/>
+                <a:endParaRPr lang="en-AU"/>
+              </a:p>
+            </p:txBody>
+          </p:sp>
+          <p:sp>
+            <p:nvSpPr>
+              <p:cNvPr id="37" name="Oval 36">
+                <a:extLst>
+                  <a:ext uri="{FF2B5EF4-FFF2-40B4-BE49-F238E27FC236}">
+                    <a16:creationId xmlns:a16="http://schemas.microsoft.com/office/drawing/2014/main" id="{233DBE09-8B3E-486B-A92D-7984D63CB5F9}"/>
+                  </a:ext>
+                </a:extLst>
+              </p:cNvPr>
+              <p:cNvSpPr/>
+              <p:nvPr/>
+            </p:nvSpPr>
+            <p:spPr>
+              <a:xfrm>
+                <a:off x="5083314" y="1295397"/>
+                <a:ext cx="172278" cy="172278"/>
+              </a:xfrm>
+              <a:prstGeom prst="ellipse">
+                <a:avLst/>
+              </a:prstGeom>
+              <a:solidFill>
+                <a:schemeClr val="tx1"/>
+              </a:solidFill>
+              <a:ln>
+                <a:noFill/>
+              </a:ln>
+            </p:spPr>
+            <p:style>
+              <a:lnRef idx="2">
+                <a:schemeClr val="accent1">
+                  <a:shade val="50000"/>
+                </a:schemeClr>
+              </a:lnRef>
+              <a:fillRef idx="1">
+                <a:schemeClr val="accent1"/>
+              </a:fillRef>
+              <a:effectRef idx="0">
+                <a:schemeClr val="accent1"/>
+              </a:effectRef>
+              <a:fontRef idx="minor">
+                <a:schemeClr val="lt1"/>
+              </a:fontRef>
+            </p:style>
+            <p:txBody>
+              <a:bodyPr rtlCol="0" anchor="ctr"/>
+              <a:lstStyle/>
+              <a:p>
+                <a:pPr algn="ctr"/>
+                <a:endParaRPr lang="en-AU"/>
+              </a:p>
+            </p:txBody>
+          </p:sp>
+          <p:sp>
+            <p:nvSpPr>
+              <p:cNvPr id="38" name="Oval 37">
+                <a:extLst>
+                  <a:ext uri="{FF2B5EF4-FFF2-40B4-BE49-F238E27FC236}">
+                    <a16:creationId xmlns:a16="http://schemas.microsoft.com/office/drawing/2014/main" id="{B7B1D530-8321-479A-AB44-59702EF06544}"/>
+                  </a:ext>
+                </a:extLst>
+              </p:cNvPr>
+              <p:cNvSpPr/>
+              <p:nvPr/>
+            </p:nvSpPr>
+            <p:spPr>
+              <a:xfrm>
+                <a:off x="5083314" y="4515675"/>
+                <a:ext cx="172278" cy="172278"/>
+              </a:xfrm>
+              <a:prstGeom prst="ellipse">
+                <a:avLst/>
+              </a:prstGeom>
+              <a:solidFill>
+                <a:schemeClr val="tx1"/>
+              </a:solidFill>
+              <a:ln>
+                <a:noFill/>
+              </a:ln>
+            </p:spPr>
+            <p:style>
+              <a:lnRef idx="2">
+                <a:schemeClr val="accent1">
+                  <a:shade val="50000"/>
+                </a:schemeClr>
+              </a:lnRef>
+              <a:fillRef idx="1">
+                <a:schemeClr val="accent1"/>
+              </a:fillRef>
+              <a:effectRef idx="0">
+                <a:schemeClr val="accent1"/>
+              </a:effectRef>
+              <a:fontRef idx="minor">
+                <a:schemeClr val="lt1"/>
+              </a:fontRef>
+            </p:style>
+            <p:txBody>
+              <a:bodyPr rtlCol="0" anchor="ctr"/>
+              <a:lstStyle/>
+              <a:p>
+                <a:pPr algn="ctr"/>
+                <a:endParaRPr lang="en-AU"/>
+              </a:p>
+            </p:txBody>
+          </p:sp>
+          <p:cxnSp>
+            <p:nvCxnSpPr>
+              <p:cNvPr id="39" name="Straight Connector 38">
+                <a:extLst>
+                  <a:ext uri="{FF2B5EF4-FFF2-40B4-BE49-F238E27FC236}">
+                    <a16:creationId xmlns:a16="http://schemas.microsoft.com/office/drawing/2014/main" id="{818AB11C-869C-40C7-AB3D-E95DFB8E049A}"/>
+                  </a:ext>
+                </a:extLst>
+              </p:cNvPr>
+              <p:cNvCxnSpPr>
+                <a:cxnSpLocks/>
+              </p:cNvCxnSpPr>
+              <p:nvPr/>
+            </p:nvCxnSpPr>
+            <p:spPr>
+              <a:xfrm flipV="1">
+                <a:off x="5176078" y="1381536"/>
+                <a:ext cx="0" cy="3220278"/>
+              </a:xfrm>
+              <a:prstGeom prst="line">
+                <a:avLst/>
+              </a:prstGeom>
+              <a:ln>
+                <a:solidFill>
+                  <a:schemeClr val="tx1"/>
+                </a:solidFill>
+              </a:ln>
+            </p:spPr>
+            <p:style>
+              <a:lnRef idx="1">
+                <a:schemeClr val="accent1"/>
+              </a:lnRef>
+              <a:fillRef idx="0">
+                <a:schemeClr val="accent1"/>
+              </a:fillRef>
+              <a:effectRef idx="0">
+                <a:schemeClr val="accent1"/>
+              </a:effectRef>
+              <a:fontRef idx="minor">
+                <a:schemeClr val="tx1"/>
+              </a:fontRef>
+            </p:style>
+          </p:cxnSp>
+          <p:cxnSp>
+            <p:nvCxnSpPr>
+              <p:cNvPr id="40" name="Straight Connector 39">
+                <a:extLst>
+                  <a:ext uri="{FF2B5EF4-FFF2-40B4-BE49-F238E27FC236}">
+                    <a16:creationId xmlns:a16="http://schemas.microsoft.com/office/drawing/2014/main" id="{1DFDC45A-0C54-4C6E-AF98-10054611C8DE}"/>
+                  </a:ext>
+                </a:extLst>
+              </p:cNvPr>
+              <p:cNvCxnSpPr>
+                <a:cxnSpLocks/>
+              </p:cNvCxnSpPr>
+              <p:nvPr/>
+            </p:nvCxnSpPr>
+            <p:spPr>
+              <a:xfrm>
+                <a:off x="1995559" y="1381536"/>
+                <a:ext cx="3087755" cy="0"/>
+              </a:xfrm>
+              <a:prstGeom prst="line">
+                <a:avLst/>
+              </a:prstGeom>
+              <a:ln>
+                <a:solidFill>
+                  <a:schemeClr val="tx1"/>
+                </a:solidFill>
+              </a:ln>
+            </p:spPr>
+            <p:style>
+              <a:lnRef idx="1">
+                <a:schemeClr val="accent1"/>
+              </a:lnRef>
+              <a:fillRef idx="0">
+                <a:schemeClr val="accent1"/>
+              </a:fillRef>
+              <a:effectRef idx="0">
+                <a:schemeClr val="accent1"/>
+              </a:effectRef>
+              <a:fontRef idx="minor">
+                <a:schemeClr val="tx1"/>
+              </a:fontRef>
+            </p:style>
+          </p:cxnSp>
+          <p:sp>
+            <p:nvSpPr>
+              <p:cNvPr id="41" name="TextBox 40">
+                <a:extLst>
+                  <a:ext uri="{FF2B5EF4-FFF2-40B4-BE49-F238E27FC236}">
+                    <a16:creationId xmlns:a16="http://schemas.microsoft.com/office/drawing/2014/main" id="{7E1293E3-4E6B-43FA-A8E6-EF511309562F}"/>
+                  </a:ext>
+                </a:extLst>
+              </p:cNvPr>
+              <p:cNvSpPr txBox="1"/>
+              <p:nvPr/>
+            </p:nvSpPr>
+            <p:spPr>
+              <a:xfrm>
+                <a:off x="4357628" y="4933983"/>
+                <a:ext cx="1623650" cy="369332"/>
+              </a:xfrm>
+              <a:prstGeom prst="rect">
+                <a:avLst/>
+              </a:prstGeom>
+              <a:noFill/>
+            </p:spPr>
+            <p:txBody>
+              <a:bodyPr wrap="none" rtlCol="0">
+                <a:spAutoFit/>
+              </a:bodyPr>
+              <a:lstStyle/>
+              <a:p>
+                <a:r>
+                  <a:rPr lang="en-US" dirty="0"/>
+                  <a:t>Approach node</a:t>
+                </a:r>
+                <a:endParaRPr lang="en-AU" dirty="0"/>
+              </a:p>
+            </p:txBody>
+          </p:sp>
+          <p:sp>
+            <p:nvSpPr>
+              <p:cNvPr id="42" name="TextBox 41">
+                <a:extLst>
+                  <a:ext uri="{FF2B5EF4-FFF2-40B4-BE49-F238E27FC236}">
+                    <a16:creationId xmlns:a16="http://schemas.microsoft.com/office/drawing/2014/main" id="{AC67BE92-CF3E-4B70-8DDE-4632605FB662}"/>
+                  </a:ext>
+                </a:extLst>
+              </p:cNvPr>
+              <p:cNvSpPr txBox="1"/>
+              <p:nvPr/>
+            </p:nvSpPr>
+            <p:spPr>
+              <a:xfrm>
+                <a:off x="5263228" y="904642"/>
+                <a:ext cx="1436099" cy="369332"/>
+              </a:xfrm>
+              <a:prstGeom prst="rect">
+                <a:avLst/>
+              </a:prstGeom>
+              <a:noFill/>
+            </p:spPr>
+            <p:txBody>
+              <a:bodyPr wrap="none" rtlCol="0">
+                <a:spAutoFit/>
+              </a:bodyPr>
+              <a:lstStyle/>
+              <a:p>
+                <a:r>
+                  <a:rPr lang="en-US" dirty="0"/>
+                  <a:t>Feature node</a:t>
+                </a:r>
+                <a:endParaRPr lang="en-AU" dirty="0"/>
+              </a:p>
+            </p:txBody>
+          </p:sp>
+          <p:sp>
+            <p:nvSpPr>
+              <p:cNvPr id="43" name="TextBox 42">
+                <a:extLst>
+                  <a:ext uri="{FF2B5EF4-FFF2-40B4-BE49-F238E27FC236}">
+                    <a16:creationId xmlns:a16="http://schemas.microsoft.com/office/drawing/2014/main" id="{E567B97D-50A8-4DF0-9BEB-AC5079CF2260}"/>
+                  </a:ext>
+                </a:extLst>
+              </p:cNvPr>
+              <p:cNvSpPr txBox="1"/>
+              <p:nvPr/>
+            </p:nvSpPr>
+            <p:spPr>
+              <a:xfrm>
+                <a:off x="683333" y="794407"/>
+                <a:ext cx="1059906" cy="369332"/>
+              </a:xfrm>
+              <a:prstGeom prst="rect">
+                <a:avLst/>
+              </a:prstGeom>
+              <a:noFill/>
+            </p:spPr>
+            <p:txBody>
+              <a:bodyPr wrap="none" rtlCol="0">
+                <a:spAutoFit/>
+              </a:bodyPr>
+              <a:lstStyle/>
+              <a:p>
+                <a:r>
+                  <a:rPr lang="en-US" dirty="0"/>
+                  <a:t>Exit node</a:t>
+                </a:r>
+                <a:endParaRPr lang="en-AU" dirty="0"/>
+              </a:p>
+            </p:txBody>
+          </p:sp>
+          <p:sp>
+            <p:nvSpPr>
+              <p:cNvPr id="44" name="Oval 43">
+                <a:extLst>
+                  <a:ext uri="{FF2B5EF4-FFF2-40B4-BE49-F238E27FC236}">
+                    <a16:creationId xmlns:a16="http://schemas.microsoft.com/office/drawing/2014/main" id="{12AAF61A-21C1-4AA9-A5A1-5F4E628B85FB}"/>
+                  </a:ext>
+                </a:extLst>
+              </p:cNvPr>
+              <p:cNvSpPr/>
+              <p:nvPr/>
+            </p:nvSpPr>
+            <p:spPr>
+              <a:xfrm>
+                <a:off x="2803940" y="1295397"/>
+                <a:ext cx="172278" cy="172278"/>
+              </a:xfrm>
+              <a:prstGeom prst="ellipse">
+                <a:avLst/>
+              </a:prstGeom>
+              <a:solidFill>
+                <a:schemeClr val="bg1"/>
+              </a:solidFill>
+              <a:ln>
+                <a:solidFill>
+                  <a:schemeClr val="tx1"/>
+                </a:solidFill>
+              </a:ln>
+            </p:spPr>
+            <p:style>
+              <a:lnRef idx="2">
+                <a:schemeClr val="accent1">
+                  <a:shade val="50000"/>
+                </a:schemeClr>
+              </a:lnRef>
+              <a:fillRef idx="1">
+                <a:schemeClr val="accent1"/>
+              </a:fillRef>
+              <a:effectRef idx="0">
+                <a:schemeClr val="accent1"/>
+              </a:effectRef>
+              <a:fontRef idx="minor">
+                <a:schemeClr val="lt1"/>
+              </a:fontRef>
+            </p:style>
+            <p:txBody>
+              <a:bodyPr rtlCol="0" anchor="ctr"/>
+              <a:lstStyle/>
+              <a:p>
+                <a:pPr algn="ctr"/>
+                <a:endParaRPr lang="en-AU"/>
+              </a:p>
+            </p:txBody>
+          </p:sp>
+          <p:sp>
+            <p:nvSpPr>
+              <p:cNvPr id="45" name="Oval 44">
+                <a:extLst>
+                  <a:ext uri="{FF2B5EF4-FFF2-40B4-BE49-F238E27FC236}">
+                    <a16:creationId xmlns:a16="http://schemas.microsoft.com/office/drawing/2014/main" id="{F1110D62-6581-48E7-A6B0-A333B3F47AC7}"/>
+                  </a:ext>
+                </a:extLst>
+              </p:cNvPr>
+              <p:cNvSpPr/>
+              <p:nvPr/>
+            </p:nvSpPr>
+            <p:spPr>
+              <a:xfrm>
+                <a:off x="5083314" y="2410817"/>
+                <a:ext cx="172278" cy="172278"/>
+              </a:xfrm>
+              <a:prstGeom prst="ellipse">
+                <a:avLst/>
+              </a:prstGeom>
+              <a:solidFill>
+                <a:schemeClr val="bg1"/>
+              </a:solidFill>
+              <a:ln>
+                <a:solidFill>
+                  <a:schemeClr val="tx1"/>
+                </a:solidFill>
+              </a:ln>
+            </p:spPr>
+            <p:style>
+              <a:lnRef idx="2">
+                <a:schemeClr val="accent1">
+                  <a:shade val="50000"/>
+                </a:schemeClr>
+              </a:lnRef>
+              <a:fillRef idx="1">
+                <a:schemeClr val="accent1"/>
+              </a:fillRef>
+              <a:effectRef idx="0">
+                <a:schemeClr val="accent1"/>
+              </a:effectRef>
+              <a:fontRef idx="minor">
+                <a:schemeClr val="lt1"/>
+              </a:fontRef>
+            </p:style>
+            <p:txBody>
+              <a:bodyPr rtlCol="0" anchor="ctr"/>
+              <a:lstStyle/>
+              <a:p>
+                <a:pPr algn="ctr"/>
+                <a:endParaRPr lang="en-AU"/>
+              </a:p>
+            </p:txBody>
+          </p:sp>
+          <p:sp>
+            <p:nvSpPr>
+              <p:cNvPr id="46" name="Isosceles Triangle 45">
+                <a:extLst>
+                  <a:ext uri="{FF2B5EF4-FFF2-40B4-BE49-F238E27FC236}">
+                    <a16:creationId xmlns:a16="http://schemas.microsoft.com/office/drawing/2014/main" id="{E10CC3F3-95C3-47A8-B786-807326F8625E}"/>
+                  </a:ext>
+                </a:extLst>
+              </p:cNvPr>
+              <p:cNvSpPr/>
+              <p:nvPr/>
+            </p:nvSpPr>
+            <p:spPr>
+              <a:xfrm>
+                <a:off x="3443358" y="1613551"/>
+                <a:ext cx="172278" cy="172278"/>
+              </a:xfrm>
+              <a:prstGeom prst="triangle">
+                <a:avLst/>
+              </a:prstGeom>
+              <a:solidFill>
+                <a:schemeClr val="tx1"/>
+              </a:solidFill>
+              <a:ln>
+                <a:solidFill>
+                  <a:schemeClr val="tx1"/>
+                </a:solidFill>
+              </a:ln>
+            </p:spPr>
+            <p:style>
+              <a:lnRef idx="2">
+                <a:schemeClr val="accent1">
+                  <a:shade val="50000"/>
+                </a:schemeClr>
+              </a:lnRef>
+              <a:fillRef idx="1">
+                <a:schemeClr val="accent1"/>
+              </a:fillRef>
+              <a:effectRef idx="0">
+                <a:schemeClr val="accent1"/>
+              </a:effectRef>
+              <a:fontRef idx="minor">
+                <a:schemeClr val="lt1"/>
+              </a:fontRef>
+            </p:style>
+            <p:txBody>
+              <a:bodyPr rtlCol="0" anchor="ctr"/>
+              <a:lstStyle/>
+              <a:p>
+                <a:pPr algn="ctr"/>
+                <a:endParaRPr lang="en-AU"/>
+              </a:p>
+            </p:txBody>
+          </p:sp>
+          <p:sp>
+            <p:nvSpPr>
+              <p:cNvPr id="47" name="Right Brace 46">
+                <a:extLst>
+                  <a:ext uri="{FF2B5EF4-FFF2-40B4-BE49-F238E27FC236}">
+                    <a16:creationId xmlns:a16="http://schemas.microsoft.com/office/drawing/2014/main" id="{33ABFF32-3137-48C8-AEEC-1CC9DA82B49E}"/>
+                  </a:ext>
+                </a:extLst>
+              </p:cNvPr>
+              <p:cNvSpPr/>
+              <p:nvPr/>
+            </p:nvSpPr>
+            <p:spPr>
+              <a:xfrm>
+                <a:off x="5397137" y="2496956"/>
+                <a:ext cx="355596" cy="2104858"/>
+              </a:xfrm>
+              <a:prstGeom prst="rightBrace">
+                <a:avLst/>
+              </a:prstGeom>
+              <a:ln>
+                <a:solidFill>
+                  <a:schemeClr val="tx1"/>
+                </a:solidFill>
+              </a:ln>
+            </p:spPr>
+            <p:style>
+              <a:lnRef idx="1">
+                <a:schemeClr val="accent1"/>
+              </a:lnRef>
+              <a:fillRef idx="0">
+                <a:schemeClr val="accent1"/>
+              </a:fillRef>
+              <a:effectRef idx="0">
+                <a:schemeClr val="accent1"/>
+              </a:effectRef>
+              <a:fontRef idx="minor">
+                <a:schemeClr val="tx1"/>
+              </a:fontRef>
+            </p:style>
+            <p:txBody>
+              <a:bodyPr rtlCol="0" anchor="ctr"/>
+              <a:lstStyle/>
+              <a:p>
+                <a:pPr algn="ctr"/>
+                <a:endParaRPr lang="en-AU"/>
+              </a:p>
+            </p:txBody>
+          </p:sp>
+          <p:sp>
+            <p:nvSpPr>
+              <p:cNvPr id="49" name="Right Brace 48">
+                <a:extLst>
+                  <a:ext uri="{FF2B5EF4-FFF2-40B4-BE49-F238E27FC236}">
+                    <a16:creationId xmlns:a16="http://schemas.microsoft.com/office/drawing/2014/main" id="{6174910E-7E0B-445B-8227-D8AB3B7449A1}"/>
+                  </a:ext>
+                </a:extLst>
+              </p:cNvPr>
+              <p:cNvSpPr/>
+              <p:nvPr/>
+            </p:nvSpPr>
+            <p:spPr>
+              <a:xfrm rot="16200000">
+                <a:off x="3855280" y="-13373"/>
+                <a:ext cx="355596" cy="2104858"/>
+              </a:xfrm>
+              <a:prstGeom prst="rightBrace">
+                <a:avLst/>
+              </a:prstGeom>
+              <a:ln>
+                <a:solidFill>
+                  <a:schemeClr val="tx1"/>
+                </a:solidFill>
+              </a:ln>
+            </p:spPr>
+            <p:style>
+              <a:lnRef idx="1">
+                <a:schemeClr val="accent1"/>
+              </a:lnRef>
+              <a:fillRef idx="0">
+                <a:schemeClr val="accent1"/>
+              </a:fillRef>
+              <a:effectRef idx="0">
+                <a:schemeClr val="accent1"/>
+              </a:effectRef>
+              <a:fontRef idx="minor">
+                <a:schemeClr val="tx1"/>
+              </a:fontRef>
+            </p:style>
+            <p:txBody>
+              <a:bodyPr rtlCol="0" anchor="ctr"/>
+              <a:lstStyle/>
+              <a:p>
+                <a:pPr algn="ctr"/>
+                <a:endParaRPr lang="en-AU"/>
+              </a:p>
+            </p:txBody>
+          </p:sp>
+          <p:sp>
+            <p:nvSpPr>
+              <p:cNvPr id="50" name="Right Brace 49">
+                <a:extLst>
+                  <a:ext uri="{FF2B5EF4-FFF2-40B4-BE49-F238E27FC236}">
+                    <a16:creationId xmlns:a16="http://schemas.microsoft.com/office/drawing/2014/main" id="{40E52019-BA0B-4A8C-98C8-B7364ACC3E6D}"/>
+                  </a:ext>
+                </a:extLst>
+              </p:cNvPr>
+              <p:cNvSpPr/>
+              <p:nvPr/>
+            </p:nvSpPr>
+            <p:spPr>
+              <a:xfrm rot="6925835">
+                <a:off x="4024159" y="1489025"/>
+                <a:ext cx="355596" cy="1826241"/>
+              </a:xfrm>
+              <a:prstGeom prst="rightBrace">
+                <a:avLst/>
+              </a:prstGeom>
+              <a:ln>
+                <a:solidFill>
+                  <a:schemeClr val="tx1"/>
+                </a:solidFill>
+              </a:ln>
+            </p:spPr>
+            <p:style>
+              <a:lnRef idx="1">
+                <a:schemeClr val="accent1"/>
+              </a:lnRef>
+              <a:fillRef idx="0">
+                <a:schemeClr val="accent1"/>
+              </a:fillRef>
+              <a:effectRef idx="0">
+                <a:schemeClr val="accent1"/>
+              </a:effectRef>
+              <a:fontRef idx="minor">
+                <a:schemeClr val="tx1"/>
+              </a:fontRef>
+            </p:style>
+            <p:txBody>
+              <a:bodyPr rtlCol="0" anchor="ctr"/>
+              <a:lstStyle/>
+              <a:p>
+                <a:pPr algn="ctr"/>
+                <a:endParaRPr lang="en-AU"/>
+              </a:p>
+            </p:txBody>
+          </p:sp>
+          <p:sp>
+            <p:nvSpPr>
+              <p:cNvPr id="51" name="TextBox 50">
+                <a:extLst>
+                  <a:ext uri="{FF2B5EF4-FFF2-40B4-BE49-F238E27FC236}">
+                    <a16:creationId xmlns:a16="http://schemas.microsoft.com/office/drawing/2014/main" id="{8FA16DFA-A6F0-4468-B185-C9B0828686D0}"/>
+                  </a:ext>
+                </a:extLst>
+              </p:cNvPr>
+              <p:cNvSpPr txBox="1"/>
+              <p:nvPr/>
+            </p:nvSpPr>
+            <p:spPr>
+              <a:xfrm>
+                <a:off x="5894278" y="3364719"/>
+                <a:ext cx="261610" cy="369332"/>
+              </a:xfrm>
+              <a:prstGeom prst="rect">
+                <a:avLst/>
+              </a:prstGeom>
+              <a:noFill/>
+            </p:spPr>
+            <p:txBody>
+              <a:bodyPr wrap="none" rtlCol="0">
+                <a:spAutoFit/>
+              </a:bodyPr>
+              <a:lstStyle/>
+              <a:p>
+                <a:r>
+                  <a:rPr lang="en-US" i="1" dirty="0"/>
+                  <a:t>t</a:t>
+                </a:r>
+                <a:endParaRPr lang="en-AU" i="1" dirty="0"/>
+              </a:p>
+            </p:txBody>
+          </p:sp>
+          <p:sp>
+            <p:nvSpPr>
+              <p:cNvPr id="52" name="TextBox 51">
+                <a:extLst>
+                  <a:ext uri="{FF2B5EF4-FFF2-40B4-BE49-F238E27FC236}">
+                    <a16:creationId xmlns:a16="http://schemas.microsoft.com/office/drawing/2014/main" id="{761759BE-84C7-4B72-867C-9A1C314792C5}"/>
+                  </a:ext>
+                </a:extLst>
+              </p:cNvPr>
+              <p:cNvSpPr txBox="1"/>
+              <p:nvPr/>
+            </p:nvSpPr>
+            <p:spPr>
+              <a:xfrm>
+                <a:off x="3940347" y="2649130"/>
+                <a:ext cx="261610" cy="369332"/>
+              </a:xfrm>
+              <a:prstGeom prst="rect">
+                <a:avLst/>
+              </a:prstGeom>
+              <a:noFill/>
+            </p:spPr>
+            <p:txBody>
+              <a:bodyPr wrap="none" rtlCol="0">
+                <a:spAutoFit/>
+              </a:bodyPr>
+              <a:lstStyle/>
+              <a:p>
+                <a:r>
+                  <a:rPr lang="en-US" i="1" dirty="0"/>
+                  <a:t>t</a:t>
+                </a:r>
+                <a:endParaRPr lang="en-AU" i="1" dirty="0"/>
+              </a:p>
+            </p:txBody>
+          </p:sp>
+          <p:sp>
+            <p:nvSpPr>
+              <p:cNvPr id="53" name="TextBox 52">
+                <a:extLst>
+                  <a:ext uri="{FF2B5EF4-FFF2-40B4-BE49-F238E27FC236}">
+                    <a16:creationId xmlns:a16="http://schemas.microsoft.com/office/drawing/2014/main" id="{EF41DE36-5D2C-406C-BA3E-4802BC7D12FE}"/>
+                  </a:ext>
+                </a:extLst>
+              </p:cNvPr>
+              <p:cNvSpPr txBox="1"/>
+              <p:nvPr/>
+            </p:nvSpPr>
+            <p:spPr>
+              <a:xfrm>
+                <a:off x="3929372" y="413383"/>
+                <a:ext cx="261610" cy="369332"/>
+              </a:xfrm>
+              <a:prstGeom prst="rect">
+                <a:avLst/>
+              </a:prstGeom>
+              <a:noFill/>
+            </p:spPr>
+            <p:txBody>
+              <a:bodyPr wrap="none" rtlCol="0">
+                <a:spAutoFit/>
+              </a:bodyPr>
+              <a:lstStyle/>
+              <a:p>
+                <a:r>
+                  <a:rPr lang="en-US" i="1" dirty="0"/>
+                  <a:t>t</a:t>
+                </a:r>
+                <a:endParaRPr lang="en-AU" i="1" dirty="0"/>
+              </a:p>
+            </p:txBody>
+          </p:sp>
+          <p:sp>
+            <p:nvSpPr>
+              <p:cNvPr id="55" name="TextBox 54">
+                <a:extLst>
+                  <a:ext uri="{FF2B5EF4-FFF2-40B4-BE49-F238E27FC236}">
+                    <a16:creationId xmlns:a16="http://schemas.microsoft.com/office/drawing/2014/main" id="{F4D238DD-FAC3-44D5-ABF2-B3F4EDE67457}"/>
+                  </a:ext>
+                </a:extLst>
+              </p:cNvPr>
+              <p:cNvSpPr txBox="1"/>
+              <p:nvPr/>
+            </p:nvSpPr>
+            <p:spPr>
+              <a:xfrm>
+                <a:off x="5236155" y="2017405"/>
+                <a:ext cx="420308" cy="369332"/>
+              </a:xfrm>
+              <a:prstGeom prst="rect">
+                <a:avLst/>
+              </a:prstGeom>
+              <a:noFill/>
+            </p:spPr>
+            <p:txBody>
+              <a:bodyPr wrap="none" rtlCol="0">
+                <a:spAutoFit/>
+              </a:bodyPr>
+              <a:lstStyle/>
+              <a:p>
+                <a:r>
+                  <a:rPr lang="en-US" i="1" dirty="0"/>
+                  <a:t>p0</a:t>
+                </a:r>
+                <a:endParaRPr lang="en-AU" i="1" dirty="0"/>
+              </a:p>
+            </p:txBody>
+          </p:sp>
+          <p:sp>
+            <p:nvSpPr>
+              <p:cNvPr id="56" name="TextBox 55">
+                <a:extLst>
+                  <a:ext uri="{FF2B5EF4-FFF2-40B4-BE49-F238E27FC236}">
+                    <a16:creationId xmlns:a16="http://schemas.microsoft.com/office/drawing/2014/main" id="{AAF4FBF8-0748-46A5-864C-9AB064DB2157}"/>
+                  </a:ext>
+                </a:extLst>
+              </p:cNvPr>
+              <p:cNvSpPr txBox="1"/>
+              <p:nvPr/>
+            </p:nvSpPr>
+            <p:spPr>
+              <a:xfrm>
+                <a:off x="2532107" y="1434406"/>
+                <a:ext cx="423514" cy="369332"/>
+              </a:xfrm>
+              <a:prstGeom prst="rect">
+                <a:avLst/>
+              </a:prstGeom>
+              <a:noFill/>
+            </p:spPr>
+            <p:txBody>
+              <a:bodyPr wrap="none" rtlCol="0">
+                <a:spAutoFit/>
+              </a:bodyPr>
+              <a:lstStyle/>
+              <a:p>
+                <a:r>
+                  <a:rPr lang="en-US" i="1" dirty="0"/>
+                  <a:t>p1</a:t>
+                </a:r>
+                <a:endParaRPr lang="en-AU" i="1" dirty="0"/>
+              </a:p>
+            </p:txBody>
+          </p:sp>
+        </p:grpSp>
+        <p:sp>
+          <p:nvSpPr>
+            <p:cNvPr id="8" name="TextBox 7">
+              <a:extLst>
+                <a:ext uri="{FF2B5EF4-FFF2-40B4-BE49-F238E27FC236}">
+                  <a16:creationId xmlns:a16="http://schemas.microsoft.com/office/drawing/2014/main" id="{55245161-B48C-44AD-A8EC-B3A1EA85D9E5}"/>
+                </a:ext>
+              </a:extLst>
+            </p:cNvPr>
+            <p:cNvSpPr txBox="1"/>
+            <p:nvPr/>
+          </p:nvSpPr>
+          <p:spPr>
+            <a:xfrm>
+              <a:off x="2877931" y="1421706"/>
+              <a:ext cx="538930" cy="369332"/>
+            </a:xfrm>
+            <a:prstGeom prst="rect">
+              <a:avLst/>
+            </a:prstGeom>
+            <a:noFill/>
+          </p:spPr>
+          <p:txBody>
+            <a:bodyPr wrap="none" rtlCol="0">
+              <a:spAutoFit/>
+            </a:bodyPr>
+            <a:lstStyle/>
+            <a:p>
+              <a:r>
+                <a:rPr lang="en-US" b="1" dirty="0"/>
+                <a:t>B(</a:t>
+              </a:r>
+              <a:r>
+                <a:rPr lang="en-US" i="1" dirty="0"/>
+                <a:t>t</a:t>
+              </a:r>
+              <a:r>
+                <a:rPr lang="en-US" b="1" dirty="0"/>
+                <a:t>)</a:t>
+              </a:r>
+              <a:endParaRPr lang="en-AU" b="1" dirty="0"/>
+            </a:p>
+          </p:txBody>
+        </p:sp>
+      </p:grpSp>
+    </p:spTree>
+    <p:extLst>
+      <p:ext uri="{BB962C8B-B14F-4D97-AF65-F5344CB8AC3E}">
+        <p14:creationId xmlns:p14="http://schemas.microsoft.com/office/powerpoint/2010/main" val="3690627579"/>
       </p:ext>
     </p:extLst>
   </p:cSld>

</xml_diff>

<commit_message>
Report: Padded intro, related and discussion
Added references
Added skeleton to intro and related work
Added discussion elements
Updated system overview image
</commit_message>
<xml_diff>
--- a/Docs/Final/systemOverview.pptx
+++ b/Docs/Final/systemOverview.pptx
@@ -3699,7 +3699,7 @@
         <p:spPr>
           <a:xfrm>
             <a:off x="5055705" y="6266695"/>
-            <a:ext cx="1855305" cy="369332"/>
+            <a:ext cx="1855305" cy="646331"/>
           </a:xfrm>
           <a:prstGeom prst="rect">
             <a:avLst/>
@@ -3715,7 +3715,7 @@
             <a:pPr algn="ctr"/>
             <a:r>
               <a:rPr lang="en-AU" dirty="0"/>
-              <a:t>Road surface</a:t>
+              <a:t>Detected road surface</a:t>
             </a:r>
           </a:p>
         </p:txBody>
@@ -4144,7 +4144,7 @@
         </p:nvSpPr>
         <p:spPr>
           <a:xfrm>
-            <a:off x="8123582" y="367708"/>
+            <a:off x="-212034" y="1265041"/>
             <a:ext cx="2120348" cy="369332"/>
           </a:xfrm>
           <a:prstGeom prst="rect">
@@ -4177,15 +4177,14 @@
           </p:cNvPr>
           <p:cNvCxnSpPr>
             <a:cxnSpLocks/>
-            <a:stCxn id="31" idx="2"/>
-            <a:endCxn id="33" idx="0"/>
+            <a:stCxn id="31" idx="3"/>
           </p:cNvCxnSpPr>
           <p:nvPr/>
         </p:nvCxnSpPr>
         <p:spPr>
-          <a:xfrm flipH="1">
-            <a:off x="8322367" y="737040"/>
-            <a:ext cx="861389" cy="476005"/>
+          <a:xfrm>
+            <a:off x="1908314" y="1449707"/>
+            <a:ext cx="715994" cy="474998"/>
           </a:xfrm>
           <a:prstGeom prst="straightConnector1">
             <a:avLst/>
@@ -4226,7 +4225,7 @@
         </p:nvSpPr>
         <p:spPr>
           <a:xfrm>
-            <a:off x="7447723" y="1213045"/>
+            <a:off x="2968485" y="1324213"/>
             <a:ext cx="1749287" cy="1075649"/>
           </a:xfrm>
           <a:prstGeom prst="rect">
@@ -4273,65 +4272,21 @@
           </a:p>
         </p:txBody>
       </p:sp>
-      <p:cxnSp>
-        <p:nvCxnSpPr>
-          <p:cNvPr id="34" name="Straight Arrow Connector 33">
-            <a:extLst>
-              <a:ext uri="{FF2B5EF4-FFF2-40B4-BE49-F238E27FC236}">
-                <a16:creationId xmlns:a16="http://schemas.microsoft.com/office/drawing/2014/main" id="{8BFDC0DB-21C1-4780-B2A8-C7BB2A46DF65}"/>
-              </a:ext>
-            </a:extLst>
-          </p:cNvPr>
-          <p:cNvCxnSpPr>
-            <a:cxnSpLocks/>
-          </p:cNvCxnSpPr>
+      <p:sp>
+        <p:nvSpPr>
+          <p:cNvPr id="36" name="Rectangle 35">
+            <a:extLst>
+              <a:ext uri="{FF2B5EF4-FFF2-40B4-BE49-F238E27FC236}">
+                <a16:creationId xmlns:a16="http://schemas.microsoft.com/office/drawing/2014/main" id="{3D5E7EDB-0F05-46BA-9EDC-49BCE23C7DC3}"/>
+              </a:ext>
+            </a:extLst>
+          </p:cNvPr>
+          <p:cNvSpPr/>
           <p:nvPr/>
-        </p:nvCxnSpPr>
+        </p:nvSpPr>
         <p:spPr>
           <a:xfrm>
-            <a:off x="8275984" y="2327588"/>
-            <a:ext cx="0" cy="486729"/>
-          </a:xfrm>
-          <a:prstGeom prst="straightConnector1">
-            <a:avLst/>
-          </a:prstGeom>
-          <a:ln>
-            <a:solidFill>
-              <a:schemeClr val="tx1"/>
-            </a:solidFill>
-            <a:tailEnd type="triangle"/>
-          </a:ln>
-        </p:spPr>
-        <p:style>
-          <a:lnRef idx="1">
-            <a:schemeClr val="accent1"/>
-          </a:lnRef>
-          <a:fillRef idx="0">
-            <a:schemeClr val="accent1"/>
-          </a:fillRef>
-          <a:effectRef idx="0">
-            <a:schemeClr val="accent1"/>
-          </a:effectRef>
-          <a:fontRef idx="minor">
-            <a:schemeClr val="tx1"/>
-          </a:fontRef>
-        </p:style>
-      </p:cxnSp>
-      <p:sp>
-        <p:nvSpPr>
-          <p:cNvPr id="36" name="Rectangle 35">
-            <a:extLst>
-              <a:ext uri="{FF2B5EF4-FFF2-40B4-BE49-F238E27FC236}">
-                <a16:creationId xmlns:a16="http://schemas.microsoft.com/office/drawing/2014/main" id="{3D5E7EDB-0F05-46BA-9EDC-49BCE23C7DC3}"/>
-              </a:ext>
-            </a:extLst>
-          </p:cNvPr>
-          <p:cNvSpPr/>
-          <p:nvPr/>
-        </p:nvSpPr>
-        <p:spPr>
-          <a:xfrm>
-            <a:off x="9713842" y="1225508"/>
+            <a:off x="2974742" y="45584"/>
             <a:ext cx="1749287" cy="1075649"/>
           </a:xfrm>
           <a:prstGeom prst="rect">
@@ -4380,10 +4335,10 @@
       </p:sp>
       <p:cxnSp>
         <p:nvCxnSpPr>
-          <p:cNvPr id="39" name="Straight Arrow Connector 38">
-            <a:extLst>
-              <a:ext uri="{FF2B5EF4-FFF2-40B4-BE49-F238E27FC236}">
-                <a16:creationId xmlns:a16="http://schemas.microsoft.com/office/drawing/2014/main" id="{381C3585-2EA2-4C0B-8EAB-F429C84D2466}"/>
+          <p:cNvPr id="44" name="Straight Arrow Connector 43">
+            <a:extLst>
+              <a:ext uri="{FF2B5EF4-FFF2-40B4-BE49-F238E27FC236}">
+                <a16:creationId xmlns:a16="http://schemas.microsoft.com/office/drawing/2014/main" id="{364DCF59-B577-409D-A71C-26B1331DECAF}"/>
               </a:ext>
             </a:extLst>
           </p:cNvPr>
@@ -4393,98 +4348,9 @@
           <p:nvPr/>
         </p:nvCxnSpPr>
         <p:spPr>
-          <a:xfrm>
-            <a:off x="9929193" y="730455"/>
-            <a:ext cx="612910" cy="471765"/>
-          </a:xfrm>
-          <a:prstGeom prst="straightConnector1">
-            <a:avLst/>
-          </a:prstGeom>
-          <a:ln>
-            <a:solidFill>
-              <a:schemeClr val="tx1"/>
-            </a:solidFill>
-            <a:tailEnd type="triangle"/>
-          </a:ln>
-        </p:spPr>
-        <p:style>
-          <a:lnRef idx="1">
-            <a:schemeClr val="accent1"/>
-          </a:lnRef>
-          <a:fillRef idx="0">
-            <a:schemeClr val="accent1"/>
-          </a:fillRef>
-          <a:effectRef idx="0">
-            <a:schemeClr val="accent1"/>
-          </a:effectRef>
-          <a:fontRef idx="minor">
-            <a:schemeClr val="tx1"/>
-          </a:fontRef>
-        </p:style>
-      </p:cxnSp>
-      <p:cxnSp>
-        <p:nvCxnSpPr>
-          <p:cNvPr id="43" name="Straight Arrow Connector 42">
-            <a:extLst>
-              <a:ext uri="{FF2B5EF4-FFF2-40B4-BE49-F238E27FC236}">
-                <a16:creationId xmlns:a16="http://schemas.microsoft.com/office/drawing/2014/main" id="{C4EAD824-48A6-4EF0-82B5-DBC9F60CA1E9}"/>
-              </a:ext>
-            </a:extLst>
-          </p:cNvPr>
-          <p:cNvCxnSpPr>
-            <a:cxnSpLocks/>
-          </p:cNvCxnSpPr>
-          <p:nvPr/>
-        </p:nvCxnSpPr>
-        <p:spPr>
-          <a:xfrm>
-            <a:off x="10588485" y="2288694"/>
-            <a:ext cx="0" cy="486729"/>
-          </a:xfrm>
-          <a:prstGeom prst="straightConnector1">
-            <a:avLst/>
-          </a:prstGeom>
-          <a:ln>
-            <a:solidFill>
-              <a:schemeClr val="tx1"/>
-            </a:solidFill>
-            <a:tailEnd type="triangle"/>
-          </a:ln>
-        </p:spPr>
-        <p:style>
-          <a:lnRef idx="1">
-            <a:schemeClr val="accent1"/>
-          </a:lnRef>
-          <a:fillRef idx="0">
-            <a:schemeClr val="accent1"/>
-          </a:fillRef>
-          <a:effectRef idx="0">
-            <a:schemeClr val="accent1"/>
-          </a:effectRef>
-          <a:fontRef idx="minor">
-            <a:schemeClr val="tx1"/>
-          </a:fontRef>
-        </p:style>
-      </p:cxnSp>
-      <p:cxnSp>
-        <p:nvCxnSpPr>
-          <p:cNvPr id="44" name="Straight Arrow Connector 43">
-            <a:extLst>
-              <a:ext uri="{FF2B5EF4-FFF2-40B4-BE49-F238E27FC236}">
-                <a16:creationId xmlns:a16="http://schemas.microsoft.com/office/drawing/2014/main" id="{364DCF59-B577-409D-A71C-26B1331DECAF}"/>
-              </a:ext>
-            </a:extLst>
-          </p:cNvPr>
-          <p:cNvCxnSpPr>
-            <a:cxnSpLocks/>
-            <a:stCxn id="36" idx="2"/>
-          </p:cNvCxnSpPr>
-          <p:nvPr/>
-        </p:nvCxnSpPr>
-        <p:spPr>
-          <a:xfrm flipH="1">
-            <a:off x="8348872" y="2301157"/>
-            <a:ext cx="2239614" cy="468549"/>
+          <a:xfrm flipV="1">
+            <a:off x="1921566" y="767394"/>
+            <a:ext cx="781879" cy="682314"/>
           </a:xfrm>
           <a:prstGeom prst="straightConnector1">
             <a:avLst/>
@@ -4631,6 +4497,959 @@
           </a:prstGeom>
         </p:spPr>
       </p:pic>
+      <p:grpSp>
+        <p:nvGrpSpPr>
+          <p:cNvPr id="64" name="Group 63">
+            <a:extLst>
+              <a:ext uri="{FF2B5EF4-FFF2-40B4-BE49-F238E27FC236}">
+                <a16:creationId xmlns:a16="http://schemas.microsoft.com/office/drawing/2014/main" id="{A1059A24-91A1-4768-8024-A7CE14A6757A}"/>
+              </a:ext>
+            </a:extLst>
+          </p:cNvPr>
+          <p:cNvGrpSpPr/>
+          <p:nvPr/>
+        </p:nvGrpSpPr>
+        <p:grpSpPr>
+          <a:xfrm>
+            <a:off x="5350062" y="1441410"/>
+            <a:ext cx="1153133" cy="914426"/>
+            <a:chOff x="5194851" y="1416978"/>
+            <a:chExt cx="1630017" cy="1292592"/>
+          </a:xfrm>
+        </p:grpSpPr>
+        <p:sp>
+          <p:nvSpPr>
+            <p:cNvPr id="14" name="Rectangle 13">
+              <a:extLst>
+                <a:ext uri="{FF2B5EF4-FFF2-40B4-BE49-F238E27FC236}">
+                  <a16:creationId xmlns:a16="http://schemas.microsoft.com/office/drawing/2014/main" id="{EB87C9DA-200F-4525-8195-4A3DC0F1054C}"/>
+                </a:ext>
+              </a:extLst>
+            </p:cNvPr>
+            <p:cNvSpPr/>
+            <p:nvPr/>
+          </p:nvSpPr>
+          <p:spPr>
+            <a:xfrm>
+              <a:off x="5194851" y="1416978"/>
+              <a:ext cx="1630017" cy="1292592"/>
+            </a:xfrm>
+            <a:prstGeom prst="rect">
+              <a:avLst/>
+            </a:prstGeom>
+            <a:solidFill>
+              <a:schemeClr val="tx1"/>
+            </a:solidFill>
+            <a:ln>
+              <a:noFill/>
+            </a:ln>
+          </p:spPr>
+          <p:style>
+            <a:lnRef idx="2">
+              <a:schemeClr val="accent1">
+                <a:shade val="50000"/>
+              </a:schemeClr>
+            </a:lnRef>
+            <a:fillRef idx="1">
+              <a:schemeClr val="accent1"/>
+            </a:fillRef>
+            <a:effectRef idx="0">
+              <a:schemeClr val="accent1"/>
+            </a:effectRef>
+            <a:fontRef idx="minor">
+              <a:schemeClr val="lt1"/>
+            </a:fontRef>
+          </p:style>
+          <p:txBody>
+            <a:bodyPr rtlCol="0" anchor="ctr"/>
+            <a:lstStyle/>
+            <a:p>
+              <a:pPr algn="ctr"/>
+              <a:endParaRPr lang="en-AU"/>
+            </a:p>
+          </p:txBody>
+        </p:sp>
+        <p:sp>
+          <p:nvSpPr>
+            <p:cNvPr id="15" name="Rectangle 14">
+              <a:extLst>
+                <a:ext uri="{FF2B5EF4-FFF2-40B4-BE49-F238E27FC236}">
+                  <a16:creationId xmlns:a16="http://schemas.microsoft.com/office/drawing/2014/main" id="{14FDE9D7-DF8C-4C09-BDA7-11E13AD63773}"/>
+                </a:ext>
+              </a:extLst>
+            </p:cNvPr>
+            <p:cNvSpPr/>
+            <p:nvPr/>
+          </p:nvSpPr>
+          <p:spPr>
+            <a:xfrm rot="340870">
+              <a:off x="5574930" y="1644532"/>
+              <a:ext cx="958391" cy="185439"/>
+            </a:xfrm>
+            <a:prstGeom prst="rect">
+              <a:avLst/>
+            </a:prstGeom>
+            <a:solidFill>
+              <a:schemeClr val="bg1"/>
+            </a:solidFill>
+            <a:ln>
+              <a:noFill/>
+            </a:ln>
+          </p:spPr>
+          <p:style>
+            <a:lnRef idx="2">
+              <a:schemeClr val="accent1">
+                <a:shade val="50000"/>
+              </a:schemeClr>
+            </a:lnRef>
+            <a:fillRef idx="1">
+              <a:schemeClr val="accent1"/>
+            </a:fillRef>
+            <a:effectRef idx="0">
+              <a:schemeClr val="accent1"/>
+            </a:effectRef>
+            <a:fontRef idx="minor">
+              <a:schemeClr val="lt1"/>
+            </a:fontRef>
+          </p:style>
+          <p:txBody>
+            <a:bodyPr rtlCol="0" anchor="ctr"/>
+            <a:lstStyle/>
+            <a:p>
+              <a:pPr algn="ctr"/>
+              <a:endParaRPr lang="en-AU"/>
+            </a:p>
+          </p:txBody>
+        </p:sp>
+        <p:sp>
+          <p:nvSpPr>
+            <p:cNvPr id="40" name="Rectangle 39">
+              <a:extLst>
+                <a:ext uri="{FF2B5EF4-FFF2-40B4-BE49-F238E27FC236}">
+                  <a16:creationId xmlns:a16="http://schemas.microsoft.com/office/drawing/2014/main" id="{142F6461-9E1F-48F6-AEA1-3866B0C983FF}"/>
+                </a:ext>
+              </a:extLst>
+            </p:cNvPr>
+            <p:cNvSpPr/>
+            <p:nvPr/>
+          </p:nvSpPr>
+          <p:spPr>
+            <a:xfrm rot="5400000">
+              <a:off x="5636992" y="1986965"/>
+              <a:ext cx="746285" cy="198583"/>
+            </a:xfrm>
+            <a:prstGeom prst="rect">
+              <a:avLst/>
+            </a:prstGeom>
+            <a:solidFill>
+              <a:schemeClr val="bg1"/>
+            </a:solidFill>
+            <a:ln>
+              <a:noFill/>
+            </a:ln>
+          </p:spPr>
+          <p:style>
+            <a:lnRef idx="2">
+              <a:schemeClr val="accent1">
+                <a:shade val="50000"/>
+              </a:schemeClr>
+            </a:lnRef>
+            <a:fillRef idx="1">
+              <a:schemeClr val="accent1"/>
+            </a:fillRef>
+            <a:effectRef idx="0">
+              <a:schemeClr val="accent1"/>
+            </a:effectRef>
+            <a:fontRef idx="minor">
+              <a:schemeClr val="lt1"/>
+            </a:fontRef>
+          </p:style>
+          <p:txBody>
+            <a:bodyPr rtlCol="0" anchor="ctr"/>
+            <a:lstStyle/>
+            <a:p>
+              <a:pPr algn="ctr"/>
+              <a:endParaRPr lang="en-AU"/>
+            </a:p>
+          </p:txBody>
+        </p:sp>
+      </p:grpSp>
+      <p:cxnSp>
+        <p:nvCxnSpPr>
+          <p:cNvPr id="41" name="Straight Arrow Connector 40">
+            <a:extLst>
+              <a:ext uri="{FF2B5EF4-FFF2-40B4-BE49-F238E27FC236}">
+                <a16:creationId xmlns:a16="http://schemas.microsoft.com/office/drawing/2014/main" id="{C95A49DE-72A6-4CE6-9984-94C80D0F402A}"/>
+              </a:ext>
+            </a:extLst>
+          </p:cNvPr>
+          <p:cNvCxnSpPr/>
+          <p:nvPr/>
+        </p:nvCxnSpPr>
+        <p:spPr>
+          <a:xfrm>
+            <a:off x="4823788" y="1943374"/>
+            <a:ext cx="530087" cy="0"/>
+          </a:xfrm>
+          <a:prstGeom prst="straightConnector1">
+            <a:avLst/>
+          </a:prstGeom>
+          <a:ln>
+            <a:solidFill>
+              <a:schemeClr val="tx1"/>
+            </a:solidFill>
+            <a:tailEnd type="triangle"/>
+          </a:ln>
+        </p:spPr>
+        <p:style>
+          <a:lnRef idx="1">
+            <a:schemeClr val="accent1"/>
+          </a:lnRef>
+          <a:fillRef idx="0">
+            <a:schemeClr val="accent1"/>
+          </a:fillRef>
+          <a:effectRef idx="0">
+            <a:schemeClr val="accent1"/>
+          </a:effectRef>
+          <a:fontRef idx="minor">
+            <a:schemeClr val="tx1"/>
+          </a:fontRef>
+        </p:style>
+      </p:cxnSp>
+      <p:grpSp>
+        <p:nvGrpSpPr>
+          <p:cNvPr id="63" name="Group 62">
+            <a:extLst>
+              <a:ext uri="{FF2B5EF4-FFF2-40B4-BE49-F238E27FC236}">
+                <a16:creationId xmlns:a16="http://schemas.microsoft.com/office/drawing/2014/main" id="{C7B2FC38-1A21-4755-8A7C-D8FAF5CF3ACC}"/>
+              </a:ext>
+            </a:extLst>
+          </p:cNvPr>
+          <p:cNvGrpSpPr/>
+          <p:nvPr/>
+        </p:nvGrpSpPr>
+        <p:grpSpPr>
+          <a:xfrm>
+            <a:off x="5350063" y="100636"/>
+            <a:ext cx="1153132" cy="939001"/>
+            <a:chOff x="5194851" y="76203"/>
+            <a:chExt cx="1630017" cy="1327331"/>
+          </a:xfrm>
+        </p:grpSpPr>
+        <p:sp>
+          <p:nvSpPr>
+            <p:cNvPr id="45" name="Rectangle 44">
+              <a:extLst>
+                <a:ext uri="{FF2B5EF4-FFF2-40B4-BE49-F238E27FC236}">
+                  <a16:creationId xmlns:a16="http://schemas.microsoft.com/office/drawing/2014/main" id="{FF332222-6676-4CCE-A6E7-AE2073ACBAA2}"/>
+                </a:ext>
+              </a:extLst>
+            </p:cNvPr>
+            <p:cNvSpPr/>
+            <p:nvPr/>
+          </p:nvSpPr>
+          <p:spPr>
+            <a:xfrm>
+              <a:off x="5194851" y="76203"/>
+              <a:ext cx="1630017" cy="1292592"/>
+            </a:xfrm>
+            <a:prstGeom prst="rect">
+              <a:avLst/>
+            </a:prstGeom>
+            <a:solidFill>
+              <a:schemeClr val="tx1"/>
+            </a:solidFill>
+            <a:ln>
+              <a:noFill/>
+            </a:ln>
+          </p:spPr>
+          <p:style>
+            <a:lnRef idx="2">
+              <a:schemeClr val="accent1">
+                <a:shade val="50000"/>
+              </a:schemeClr>
+            </a:lnRef>
+            <a:fillRef idx="1">
+              <a:schemeClr val="accent1"/>
+            </a:fillRef>
+            <a:effectRef idx="0">
+              <a:schemeClr val="accent1"/>
+            </a:effectRef>
+            <a:fontRef idx="minor">
+              <a:schemeClr val="lt1"/>
+            </a:fontRef>
+          </p:style>
+          <p:txBody>
+            <a:bodyPr rtlCol="0" anchor="ctr"/>
+            <a:lstStyle/>
+            <a:p>
+              <a:pPr algn="ctr"/>
+              <a:endParaRPr lang="en-AU"/>
+            </a:p>
+          </p:txBody>
+        </p:sp>
+        <p:sp>
+          <p:nvSpPr>
+            <p:cNvPr id="25" name="Arc 24">
+              <a:extLst>
+                <a:ext uri="{FF2B5EF4-FFF2-40B4-BE49-F238E27FC236}">
+                  <a16:creationId xmlns:a16="http://schemas.microsoft.com/office/drawing/2014/main" id="{6293D2C6-F9BF-4ACD-9F62-C0A4EBD250E7}"/>
+                </a:ext>
+              </a:extLst>
+            </p:cNvPr>
+            <p:cNvSpPr/>
+            <p:nvPr/>
+          </p:nvSpPr>
+          <p:spPr>
+            <a:xfrm>
+              <a:off x="5201108" y="495215"/>
+              <a:ext cx="908319" cy="908319"/>
+            </a:xfrm>
+            <a:prstGeom prst="arc">
+              <a:avLst/>
+            </a:prstGeom>
+            <a:noFill/>
+            <a:ln w="101600">
+              <a:solidFill>
+                <a:schemeClr val="bg1"/>
+              </a:solidFill>
+            </a:ln>
+          </p:spPr>
+          <p:style>
+            <a:lnRef idx="1">
+              <a:schemeClr val="accent1"/>
+            </a:lnRef>
+            <a:fillRef idx="0">
+              <a:schemeClr val="accent1"/>
+            </a:fillRef>
+            <a:effectRef idx="0">
+              <a:schemeClr val="accent1"/>
+            </a:effectRef>
+            <a:fontRef idx="minor">
+              <a:schemeClr val="tx1"/>
+            </a:fontRef>
+          </p:style>
+          <p:txBody>
+            <a:bodyPr rtlCol="0" anchor="ctr"/>
+            <a:lstStyle/>
+            <a:p>
+              <a:pPr algn="ctr"/>
+              <a:endParaRPr lang="en-AU"/>
+            </a:p>
+          </p:txBody>
+        </p:sp>
+      </p:grpSp>
+      <p:cxnSp>
+        <p:nvCxnSpPr>
+          <p:cNvPr id="47" name="Straight Arrow Connector 46">
+            <a:extLst>
+              <a:ext uri="{FF2B5EF4-FFF2-40B4-BE49-F238E27FC236}">
+                <a16:creationId xmlns:a16="http://schemas.microsoft.com/office/drawing/2014/main" id="{F778086B-7E67-4FDC-B203-62FA5A529318}"/>
+              </a:ext>
+            </a:extLst>
+          </p:cNvPr>
+          <p:cNvCxnSpPr/>
+          <p:nvPr/>
+        </p:nvCxnSpPr>
+        <p:spPr>
+          <a:xfrm>
+            <a:off x="4784032" y="551896"/>
+            <a:ext cx="530087" cy="0"/>
+          </a:xfrm>
+          <a:prstGeom prst="straightConnector1">
+            <a:avLst/>
+          </a:prstGeom>
+          <a:ln>
+            <a:solidFill>
+              <a:schemeClr val="tx1"/>
+            </a:solidFill>
+            <a:tailEnd type="triangle"/>
+          </a:ln>
+        </p:spPr>
+        <p:style>
+          <a:lnRef idx="1">
+            <a:schemeClr val="accent1"/>
+          </a:lnRef>
+          <a:fillRef idx="0">
+            <a:schemeClr val="accent1"/>
+          </a:fillRef>
+          <a:effectRef idx="0">
+            <a:schemeClr val="accent1"/>
+          </a:effectRef>
+          <a:fontRef idx="minor">
+            <a:schemeClr val="tx1"/>
+          </a:fontRef>
+        </p:style>
+      </p:cxnSp>
+      <p:sp>
+        <p:nvSpPr>
+          <p:cNvPr id="37" name="Right Brace 36">
+            <a:extLst>
+              <a:ext uri="{FF2B5EF4-FFF2-40B4-BE49-F238E27FC236}">
+                <a16:creationId xmlns:a16="http://schemas.microsoft.com/office/drawing/2014/main" id="{866CF1A3-A2FC-4006-8943-B29AE9401BF3}"/>
+              </a:ext>
+            </a:extLst>
+          </p:cNvPr>
+          <p:cNvSpPr/>
+          <p:nvPr/>
+        </p:nvSpPr>
+        <p:spPr>
+          <a:xfrm>
+            <a:off x="6773645" y="138348"/>
+            <a:ext cx="482495" cy="2249734"/>
+          </a:xfrm>
+          <a:prstGeom prst="rightBrace">
+            <a:avLst/>
+          </a:prstGeom>
+          <a:ln w="28575">
+            <a:solidFill>
+              <a:schemeClr val="tx1"/>
+            </a:solidFill>
+          </a:ln>
+        </p:spPr>
+        <p:style>
+          <a:lnRef idx="1">
+            <a:schemeClr val="accent1"/>
+          </a:lnRef>
+          <a:fillRef idx="0">
+            <a:schemeClr val="accent1"/>
+          </a:fillRef>
+          <a:effectRef idx="0">
+            <a:schemeClr val="accent1"/>
+          </a:effectRef>
+          <a:fontRef idx="minor">
+            <a:schemeClr val="tx1"/>
+          </a:fontRef>
+        </p:style>
+        <p:txBody>
+          <a:bodyPr rtlCol="0" anchor="ctr"/>
+          <a:lstStyle/>
+          <a:p>
+            <a:pPr algn="ctr"/>
+            <a:endParaRPr lang="en-AU"/>
+          </a:p>
+        </p:txBody>
+      </p:sp>
+      <p:grpSp>
+        <p:nvGrpSpPr>
+          <p:cNvPr id="62" name="Group 61">
+            <a:extLst>
+              <a:ext uri="{FF2B5EF4-FFF2-40B4-BE49-F238E27FC236}">
+                <a16:creationId xmlns:a16="http://schemas.microsoft.com/office/drawing/2014/main" id="{A438E95F-EA56-431E-A559-D55A63441B52}"/>
+              </a:ext>
+            </a:extLst>
+          </p:cNvPr>
+          <p:cNvGrpSpPr/>
+          <p:nvPr/>
+        </p:nvGrpSpPr>
+        <p:grpSpPr>
+          <a:xfrm>
+            <a:off x="7514926" y="792954"/>
+            <a:ext cx="1614880" cy="1243183"/>
+            <a:chOff x="7467514" y="632113"/>
+            <a:chExt cx="1679062" cy="1292592"/>
+          </a:xfrm>
+        </p:grpSpPr>
+        <p:sp>
+          <p:nvSpPr>
+            <p:cNvPr id="49" name="Rectangle 48">
+              <a:extLst>
+                <a:ext uri="{FF2B5EF4-FFF2-40B4-BE49-F238E27FC236}">
+                  <a16:creationId xmlns:a16="http://schemas.microsoft.com/office/drawing/2014/main" id="{09EC2AA9-8F49-4799-8A45-F2CBF14D317B}"/>
+                </a:ext>
+              </a:extLst>
+            </p:cNvPr>
+            <p:cNvSpPr/>
+            <p:nvPr/>
+          </p:nvSpPr>
+          <p:spPr>
+            <a:xfrm>
+              <a:off x="7516559" y="632113"/>
+              <a:ext cx="1630017" cy="1292592"/>
+            </a:xfrm>
+            <a:prstGeom prst="rect">
+              <a:avLst/>
+            </a:prstGeom>
+            <a:solidFill>
+              <a:schemeClr val="tx1"/>
+            </a:solidFill>
+            <a:ln>
+              <a:noFill/>
+            </a:ln>
+          </p:spPr>
+          <p:style>
+            <a:lnRef idx="2">
+              <a:schemeClr val="accent1">
+                <a:shade val="50000"/>
+              </a:schemeClr>
+            </a:lnRef>
+            <a:fillRef idx="1">
+              <a:schemeClr val="accent1"/>
+            </a:fillRef>
+            <a:effectRef idx="0">
+              <a:schemeClr val="accent1"/>
+            </a:effectRef>
+            <a:fontRef idx="minor">
+              <a:schemeClr val="lt1"/>
+            </a:fontRef>
+          </p:style>
+          <p:txBody>
+            <a:bodyPr rtlCol="0" anchor="ctr"/>
+            <a:lstStyle/>
+            <a:p>
+              <a:pPr algn="ctr"/>
+              <a:endParaRPr lang="en-AU"/>
+            </a:p>
+          </p:txBody>
+        </p:sp>
+        <p:sp>
+          <p:nvSpPr>
+            <p:cNvPr id="50" name="Rectangle 49">
+              <a:extLst>
+                <a:ext uri="{FF2B5EF4-FFF2-40B4-BE49-F238E27FC236}">
+                  <a16:creationId xmlns:a16="http://schemas.microsoft.com/office/drawing/2014/main" id="{4C5204A0-9512-43AE-B034-D10EDA5DFA46}"/>
+                </a:ext>
+              </a:extLst>
+            </p:cNvPr>
+            <p:cNvSpPr/>
+            <p:nvPr/>
+          </p:nvSpPr>
+          <p:spPr>
+            <a:xfrm rot="340870">
+              <a:off x="7896638" y="859667"/>
+              <a:ext cx="958391" cy="185439"/>
+            </a:xfrm>
+            <a:prstGeom prst="rect">
+              <a:avLst/>
+            </a:prstGeom>
+            <a:solidFill>
+              <a:schemeClr val="bg1"/>
+            </a:solidFill>
+            <a:ln>
+              <a:noFill/>
+            </a:ln>
+          </p:spPr>
+          <p:style>
+            <a:lnRef idx="2">
+              <a:schemeClr val="accent1">
+                <a:shade val="50000"/>
+              </a:schemeClr>
+            </a:lnRef>
+            <a:fillRef idx="1">
+              <a:schemeClr val="accent1"/>
+            </a:fillRef>
+            <a:effectRef idx="0">
+              <a:schemeClr val="accent1"/>
+            </a:effectRef>
+            <a:fontRef idx="minor">
+              <a:schemeClr val="lt1"/>
+            </a:fontRef>
+          </p:style>
+          <p:txBody>
+            <a:bodyPr rtlCol="0" anchor="ctr"/>
+            <a:lstStyle/>
+            <a:p>
+              <a:pPr algn="ctr"/>
+              <a:endParaRPr lang="en-AU"/>
+            </a:p>
+          </p:txBody>
+        </p:sp>
+        <p:sp>
+          <p:nvSpPr>
+            <p:cNvPr id="51" name="Rectangle 50">
+              <a:extLst>
+                <a:ext uri="{FF2B5EF4-FFF2-40B4-BE49-F238E27FC236}">
+                  <a16:creationId xmlns:a16="http://schemas.microsoft.com/office/drawing/2014/main" id="{F9702FDA-A0FB-45CB-8526-80E4C9335029}"/>
+                </a:ext>
+              </a:extLst>
+            </p:cNvPr>
+            <p:cNvSpPr/>
+            <p:nvPr/>
+          </p:nvSpPr>
+          <p:spPr>
+            <a:xfrm rot="5400000">
+              <a:off x="7961180" y="1243052"/>
+              <a:ext cx="784865" cy="155260"/>
+            </a:xfrm>
+            <a:prstGeom prst="rect">
+              <a:avLst/>
+            </a:prstGeom>
+            <a:solidFill>
+              <a:schemeClr val="bg1"/>
+            </a:solidFill>
+            <a:ln>
+              <a:noFill/>
+            </a:ln>
+          </p:spPr>
+          <p:style>
+            <a:lnRef idx="2">
+              <a:schemeClr val="accent1">
+                <a:shade val="50000"/>
+              </a:schemeClr>
+            </a:lnRef>
+            <a:fillRef idx="1">
+              <a:schemeClr val="accent1"/>
+            </a:fillRef>
+            <a:effectRef idx="0">
+              <a:schemeClr val="accent1"/>
+            </a:effectRef>
+            <a:fontRef idx="minor">
+              <a:schemeClr val="lt1"/>
+            </a:fontRef>
+          </p:style>
+          <p:txBody>
+            <a:bodyPr rtlCol="0" anchor="ctr"/>
+            <a:lstStyle/>
+            <a:p>
+              <a:pPr algn="ctr"/>
+              <a:endParaRPr lang="en-AU"/>
+            </a:p>
+          </p:txBody>
+        </p:sp>
+        <p:sp>
+          <p:nvSpPr>
+            <p:cNvPr id="56" name="Arc 55">
+              <a:extLst>
+                <a:ext uri="{FF2B5EF4-FFF2-40B4-BE49-F238E27FC236}">
+                  <a16:creationId xmlns:a16="http://schemas.microsoft.com/office/drawing/2014/main" id="{9043A55B-AB94-4EA0-B7AA-A8CDF7BB62FF}"/>
+                </a:ext>
+              </a:extLst>
+            </p:cNvPr>
+            <p:cNvSpPr/>
+            <p:nvPr/>
+          </p:nvSpPr>
+          <p:spPr>
+            <a:xfrm>
+              <a:off x="7467514" y="956178"/>
+              <a:ext cx="908319" cy="908319"/>
+            </a:xfrm>
+            <a:prstGeom prst="arc">
+              <a:avLst/>
+            </a:prstGeom>
+            <a:noFill/>
+            <a:ln w="101600">
+              <a:solidFill>
+                <a:schemeClr val="bg1"/>
+              </a:solidFill>
+            </a:ln>
+          </p:spPr>
+          <p:style>
+            <a:lnRef idx="1">
+              <a:schemeClr val="accent1"/>
+            </a:lnRef>
+            <a:fillRef idx="0">
+              <a:schemeClr val="accent1"/>
+            </a:fillRef>
+            <a:effectRef idx="0">
+              <a:schemeClr val="accent1"/>
+            </a:effectRef>
+            <a:fontRef idx="minor">
+              <a:schemeClr val="tx1"/>
+            </a:fontRef>
+          </p:style>
+          <p:txBody>
+            <a:bodyPr rtlCol="0" anchor="ctr"/>
+            <a:lstStyle/>
+            <a:p>
+              <a:pPr algn="ctr"/>
+              <a:endParaRPr lang="en-AU"/>
+            </a:p>
+          </p:txBody>
+        </p:sp>
+      </p:grpSp>
+      <p:cxnSp>
+        <p:nvCxnSpPr>
+          <p:cNvPr id="42" name="Straight Arrow Connector 41">
+            <a:extLst>
+              <a:ext uri="{FF2B5EF4-FFF2-40B4-BE49-F238E27FC236}">
+                <a16:creationId xmlns:a16="http://schemas.microsoft.com/office/drawing/2014/main" id="{EB55AAEC-2200-44EC-985D-DC06468317ED}"/>
+              </a:ext>
+            </a:extLst>
+          </p:cNvPr>
+          <p:cNvCxnSpPr>
+            <a:cxnSpLocks/>
+          </p:cNvCxnSpPr>
+          <p:nvPr/>
+        </p:nvCxnSpPr>
+        <p:spPr>
+          <a:xfrm>
+            <a:off x="8338524" y="2036138"/>
+            <a:ext cx="0" cy="673432"/>
+          </a:xfrm>
+          <a:prstGeom prst="straightConnector1">
+            <a:avLst/>
+          </a:prstGeom>
+          <a:ln>
+            <a:solidFill>
+              <a:schemeClr val="tx1"/>
+            </a:solidFill>
+            <a:tailEnd type="triangle"/>
+          </a:ln>
+        </p:spPr>
+        <p:style>
+          <a:lnRef idx="1">
+            <a:schemeClr val="accent1"/>
+          </a:lnRef>
+          <a:fillRef idx="0">
+            <a:schemeClr val="accent1"/>
+          </a:fillRef>
+          <a:effectRef idx="0">
+            <a:schemeClr val="accent1"/>
+          </a:effectRef>
+          <a:fontRef idx="minor">
+            <a:schemeClr val="tx1"/>
+          </a:fontRef>
+        </p:style>
+      </p:cxnSp>
+      <p:cxnSp>
+        <p:nvCxnSpPr>
+          <p:cNvPr id="57" name="Straight Arrow Connector 56">
+            <a:extLst>
+              <a:ext uri="{FF2B5EF4-FFF2-40B4-BE49-F238E27FC236}">
+                <a16:creationId xmlns:a16="http://schemas.microsoft.com/office/drawing/2014/main" id="{48ADF1AA-DB11-43A3-BCAC-5973EEB38072}"/>
+              </a:ext>
+            </a:extLst>
+          </p:cNvPr>
+          <p:cNvCxnSpPr/>
+          <p:nvPr/>
+        </p:nvCxnSpPr>
+        <p:spPr>
+          <a:xfrm>
+            <a:off x="10542103" y="2192309"/>
+            <a:ext cx="0" cy="517261"/>
+          </a:xfrm>
+          <a:prstGeom prst="straightConnector1">
+            <a:avLst/>
+          </a:prstGeom>
+          <a:ln>
+            <a:solidFill>
+              <a:schemeClr val="tx1"/>
+            </a:solidFill>
+            <a:tailEnd type="triangle"/>
+          </a:ln>
+        </p:spPr>
+        <p:style>
+          <a:lnRef idx="1">
+            <a:schemeClr val="accent1"/>
+          </a:lnRef>
+          <a:fillRef idx="0">
+            <a:schemeClr val="accent1"/>
+          </a:fillRef>
+          <a:effectRef idx="0">
+            <a:schemeClr val="accent1"/>
+          </a:effectRef>
+          <a:fontRef idx="minor">
+            <a:schemeClr val="tx1"/>
+          </a:fontRef>
+        </p:style>
+      </p:cxnSp>
+      <p:cxnSp>
+        <p:nvCxnSpPr>
+          <p:cNvPr id="58" name="Straight Connector 57">
+            <a:extLst>
+              <a:ext uri="{FF2B5EF4-FFF2-40B4-BE49-F238E27FC236}">
+                <a16:creationId xmlns:a16="http://schemas.microsoft.com/office/drawing/2014/main" id="{97F89AF3-C417-408A-8A17-49C1960E4D3C}"/>
+              </a:ext>
+            </a:extLst>
+          </p:cNvPr>
+          <p:cNvCxnSpPr/>
+          <p:nvPr/>
+        </p:nvCxnSpPr>
+        <p:spPr>
+          <a:xfrm flipH="1">
+            <a:off x="8338524" y="2192309"/>
+            <a:ext cx="2203579" cy="0"/>
+          </a:xfrm>
+          <a:prstGeom prst="line">
+            <a:avLst/>
+          </a:prstGeom>
+          <a:ln>
+            <a:solidFill>
+              <a:schemeClr val="tx1"/>
+            </a:solidFill>
+          </a:ln>
+        </p:spPr>
+        <p:style>
+          <a:lnRef idx="1">
+            <a:schemeClr val="accent1"/>
+          </a:lnRef>
+          <a:fillRef idx="0">
+            <a:schemeClr val="accent1"/>
+          </a:fillRef>
+          <a:effectRef idx="0">
+            <a:schemeClr val="accent1"/>
+          </a:effectRef>
+          <a:fontRef idx="minor">
+            <a:schemeClr val="tx1"/>
+          </a:fontRef>
+        </p:style>
+      </p:cxnSp>
+      <p:sp>
+        <p:nvSpPr>
+          <p:cNvPr id="59" name="Rectangle 58">
+            <a:extLst>
+              <a:ext uri="{FF2B5EF4-FFF2-40B4-BE49-F238E27FC236}">
+                <a16:creationId xmlns:a16="http://schemas.microsoft.com/office/drawing/2014/main" id="{B88BB180-765E-4AD8-903F-37E8BC9527F1}"/>
+              </a:ext>
+            </a:extLst>
+          </p:cNvPr>
+          <p:cNvSpPr/>
+          <p:nvPr/>
+        </p:nvSpPr>
+        <p:spPr>
+          <a:xfrm>
+            <a:off x="5168348" y="4469917"/>
+            <a:ext cx="1749287" cy="1735273"/>
+          </a:xfrm>
+          <a:prstGeom prst="rect">
+            <a:avLst/>
+          </a:prstGeom>
+          <a:solidFill>
+            <a:schemeClr val="tx1"/>
+          </a:solidFill>
+          <a:ln>
+            <a:noFill/>
+          </a:ln>
+        </p:spPr>
+        <p:style>
+          <a:lnRef idx="2">
+            <a:schemeClr val="accent1">
+              <a:shade val="50000"/>
+            </a:schemeClr>
+          </a:lnRef>
+          <a:fillRef idx="1">
+            <a:schemeClr val="accent1"/>
+          </a:fillRef>
+          <a:effectRef idx="0">
+            <a:schemeClr val="accent1"/>
+          </a:effectRef>
+          <a:fontRef idx="minor">
+            <a:schemeClr val="lt1"/>
+          </a:fontRef>
+        </p:style>
+        <p:txBody>
+          <a:bodyPr rtlCol="0" anchor="ctr"/>
+          <a:lstStyle/>
+          <a:p>
+            <a:pPr algn="ctr"/>
+            <a:endParaRPr lang="en-AU"/>
+          </a:p>
+        </p:txBody>
+      </p:sp>
+      <p:sp>
+        <p:nvSpPr>
+          <p:cNvPr id="60" name="Rectangle 59">
+            <a:extLst>
+              <a:ext uri="{FF2B5EF4-FFF2-40B4-BE49-F238E27FC236}">
+                <a16:creationId xmlns:a16="http://schemas.microsoft.com/office/drawing/2014/main" id="{BB8CE54A-DA6A-40BF-BD93-79B468001577}"/>
+              </a:ext>
+            </a:extLst>
+          </p:cNvPr>
+          <p:cNvSpPr/>
+          <p:nvPr/>
+        </p:nvSpPr>
+        <p:spPr>
+          <a:xfrm rot="340870">
+            <a:off x="5588073" y="5179794"/>
+            <a:ext cx="958391" cy="185439"/>
+          </a:xfrm>
+          <a:prstGeom prst="rect">
+            <a:avLst/>
+          </a:prstGeom>
+          <a:pattFill prst="lgConfetti">
+            <a:fgClr>
+              <a:schemeClr val="accent1"/>
+            </a:fgClr>
+            <a:bgClr>
+              <a:schemeClr val="bg1"/>
+            </a:bgClr>
+          </a:pattFill>
+          <a:ln>
+            <a:noFill/>
+          </a:ln>
+        </p:spPr>
+        <p:style>
+          <a:lnRef idx="2">
+            <a:schemeClr val="accent1">
+              <a:shade val="50000"/>
+            </a:schemeClr>
+          </a:lnRef>
+          <a:fillRef idx="1">
+            <a:schemeClr val="accent1"/>
+          </a:fillRef>
+          <a:effectRef idx="0">
+            <a:schemeClr val="accent1"/>
+          </a:effectRef>
+          <a:fontRef idx="minor">
+            <a:schemeClr val="lt1"/>
+          </a:fontRef>
+        </p:style>
+        <p:txBody>
+          <a:bodyPr rtlCol="0" anchor="ctr"/>
+          <a:lstStyle/>
+          <a:p>
+            <a:pPr algn="ctr"/>
+            <a:endParaRPr lang="en-AU"/>
+          </a:p>
+        </p:txBody>
+      </p:sp>
+      <p:sp>
+        <p:nvSpPr>
+          <p:cNvPr id="61" name="Rectangle 60">
+            <a:extLst>
+              <a:ext uri="{FF2B5EF4-FFF2-40B4-BE49-F238E27FC236}">
+                <a16:creationId xmlns:a16="http://schemas.microsoft.com/office/drawing/2014/main" id="{0361AB74-2D38-4E18-82FF-BF1D56D774AD}"/>
+              </a:ext>
+            </a:extLst>
+          </p:cNvPr>
+          <p:cNvSpPr/>
+          <p:nvPr/>
+        </p:nvSpPr>
+        <p:spPr>
+          <a:xfrm rot="5400000">
+            <a:off x="5537512" y="5634852"/>
+            <a:ext cx="958391" cy="185439"/>
+          </a:xfrm>
+          <a:prstGeom prst="rect">
+            <a:avLst/>
+          </a:prstGeom>
+          <a:pattFill prst="lgConfetti">
+            <a:fgClr>
+              <a:schemeClr val="accent1"/>
+            </a:fgClr>
+            <a:bgClr>
+              <a:schemeClr val="bg1"/>
+            </a:bgClr>
+          </a:pattFill>
+          <a:ln>
+            <a:noFill/>
+          </a:ln>
+        </p:spPr>
+        <p:style>
+          <a:lnRef idx="2">
+            <a:schemeClr val="accent1">
+              <a:shade val="50000"/>
+            </a:schemeClr>
+          </a:lnRef>
+          <a:fillRef idx="1">
+            <a:schemeClr val="accent1"/>
+          </a:fillRef>
+          <a:effectRef idx="0">
+            <a:schemeClr val="accent1"/>
+          </a:effectRef>
+          <a:fontRef idx="minor">
+            <a:schemeClr val="lt1"/>
+          </a:fontRef>
+        </p:style>
+        <p:txBody>
+          <a:bodyPr rtlCol="0" anchor="ctr"/>
+          <a:lstStyle/>
+          <a:p>
+            <a:pPr algn="ctr"/>
+            <a:endParaRPr lang="en-AU"/>
+          </a:p>
+        </p:txBody>
+      </p:sp>
     </p:spTree>
     <p:extLst>
       <p:ext uri="{BB962C8B-B14F-4D97-AF65-F5344CB8AC3E}">

</xml_diff>

<commit_message>
Added dashcam images for IPM comparison
</commit_message>
<xml_diff>
--- a/Docs/Final/systemOverview.pptx
+++ b/Docs/Final/systemOverview.pptx
@@ -7,6 +7,9 @@
   <p:sldIdLst>
     <p:sldId id="256" r:id="rId2"/>
     <p:sldId id="257" r:id="rId3"/>
+    <p:sldId id="258" r:id="rId4"/>
+    <p:sldId id="260" r:id="rId5"/>
+    <p:sldId id="261" r:id="rId6"/>
   </p:sldIdLst>
   <p:sldSz cx="12192000" cy="6858000"/>
   <p:notesSz cx="6858000" cy="9144000"/>
@@ -7091,6 +7094,896 @@
 </p:sld>
 </file>
 
+<file path=ppt/slides/slide3.xml><?xml version="1.0" encoding="utf-8"?>
+<p:sld xmlns:a="http://schemas.openxmlformats.org/drawingml/2006/main" xmlns:r="http://schemas.openxmlformats.org/officeDocument/2006/relationships" xmlns:p="http://schemas.openxmlformats.org/presentationml/2006/main">
+  <p:cSld>
+    <p:spTree>
+      <p:nvGrpSpPr>
+        <p:cNvPr id="1" name=""/>
+        <p:cNvGrpSpPr/>
+        <p:nvPr/>
+      </p:nvGrpSpPr>
+      <p:grpSpPr>
+        <a:xfrm>
+          <a:off x="0" y="0"/>
+          <a:ext cx="0" cy="0"/>
+          <a:chOff x="0" y="0"/>
+          <a:chExt cx="0" cy="0"/>
+        </a:xfrm>
+      </p:grpSpPr>
+      <p:pic>
+        <p:nvPicPr>
+          <p:cNvPr id="5" name="Picture 4">
+            <a:extLst>
+              <a:ext uri="{FF2B5EF4-FFF2-40B4-BE49-F238E27FC236}">
+                <a16:creationId xmlns:a16="http://schemas.microsoft.com/office/drawing/2014/main" id="{5601E45C-1A0E-48E2-A0E0-28B7CEE8CAC0}"/>
+              </a:ext>
+            </a:extLst>
+          </p:cNvPr>
+          <p:cNvPicPr>
+            <a:picLocks noChangeAspect="1"/>
+          </p:cNvPicPr>
+          <p:nvPr/>
+        </p:nvPicPr>
+        <p:blipFill>
+          <a:blip r:embed="rId2">
+            <a:extLst>
+              <a:ext uri="{28A0092B-C50C-407E-A947-70E740481C1C}">
+                <a14:useLocalDpi xmlns:a14="http://schemas.microsoft.com/office/drawing/2010/main" val="0"/>
+              </a:ext>
+            </a:extLst>
+          </a:blip>
+          <a:stretch>
+            <a:fillRect/>
+          </a:stretch>
+        </p:blipFill>
+        <p:spPr>
+          <a:xfrm>
+            <a:off x="0" y="0"/>
+            <a:ext cx="12192000" cy="1414272"/>
+          </a:xfrm>
+          <a:prstGeom prst="rect">
+            <a:avLst/>
+          </a:prstGeom>
+        </p:spPr>
+      </p:pic>
+      <p:pic>
+        <p:nvPicPr>
+          <p:cNvPr id="7" name="Picture 6">
+            <a:extLst>
+              <a:ext uri="{FF2B5EF4-FFF2-40B4-BE49-F238E27FC236}">
+                <a16:creationId xmlns:a16="http://schemas.microsoft.com/office/drawing/2014/main" id="{02CE9DDF-60EA-49FF-AB49-C79148F9EFFA}"/>
+              </a:ext>
+            </a:extLst>
+          </p:cNvPr>
+          <p:cNvPicPr>
+            <a:picLocks noChangeAspect="1"/>
+          </p:cNvPicPr>
+          <p:nvPr/>
+        </p:nvPicPr>
+        <p:blipFill>
+          <a:blip r:embed="rId3">
+            <a:extLst>
+              <a:ext uri="{28A0092B-C50C-407E-A947-70E740481C1C}">
+                <a14:useLocalDpi xmlns:a14="http://schemas.microsoft.com/office/drawing/2010/main" val="0"/>
+              </a:ext>
+            </a:extLst>
+          </a:blip>
+          <a:stretch>
+            <a:fillRect/>
+          </a:stretch>
+        </p:blipFill>
+        <p:spPr>
+          <a:xfrm>
+            <a:off x="0" y="1414272"/>
+            <a:ext cx="12192000" cy="1414272"/>
+          </a:xfrm>
+          <a:prstGeom prst="rect">
+            <a:avLst/>
+          </a:prstGeom>
+        </p:spPr>
+      </p:pic>
+      <p:pic>
+        <p:nvPicPr>
+          <p:cNvPr id="9" name="Picture 8">
+            <a:extLst>
+              <a:ext uri="{FF2B5EF4-FFF2-40B4-BE49-F238E27FC236}">
+                <a16:creationId xmlns:a16="http://schemas.microsoft.com/office/drawing/2014/main" id="{BFF4B5F9-2C76-4E57-BD06-7973644F0877}"/>
+              </a:ext>
+            </a:extLst>
+          </p:cNvPr>
+          <p:cNvPicPr>
+            <a:picLocks noChangeAspect="1"/>
+          </p:cNvPicPr>
+          <p:nvPr/>
+        </p:nvPicPr>
+        <p:blipFill>
+          <a:blip r:embed="rId4">
+            <a:extLst>
+              <a:ext uri="{28A0092B-C50C-407E-A947-70E740481C1C}">
+                <a14:useLocalDpi xmlns:a14="http://schemas.microsoft.com/office/drawing/2010/main" val="0"/>
+              </a:ext>
+            </a:extLst>
+          </a:blip>
+          <a:stretch>
+            <a:fillRect/>
+          </a:stretch>
+        </p:blipFill>
+        <p:spPr>
+          <a:xfrm>
+            <a:off x="0" y="2721864"/>
+            <a:ext cx="12192000" cy="1414272"/>
+          </a:xfrm>
+          <a:prstGeom prst="rect">
+            <a:avLst/>
+          </a:prstGeom>
+        </p:spPr>
+      </p:pic>
+      <p:pic>
+        <p:nvPicPr>
+          <p:cNvPr id="11" name="Picture 10">
+            <a:extLst>
+              <a:ext uri="{FF2B5EF4-FFF2-40B4-BE49-F238E27FC236}">
+                <a16:creationId xmlns:a16="http://schemas.microsoft.com/office/drawing/2014/main" id="{918C0528-506A-41FF-B810-6C21FA905061}"/>
+              </a:ext>
+            </a:extLst>
+          </p:cNvPr>
+          <p:cNvPicPr>
+            <a:picLocks noChangeAspect="1"/>
+          </p:cNvPicPr>
+          <p:nvPr/>
+        </p:nvPicPr>
+        <p:blipFill>
+          <a:blip r:embed="rId5">
+            <a:extLst>
+              <a:ext uri="{28A0092B-C50C-407E-A947-70E740481C1C}">
+                <a14:useLocalDpi xmlns:a14="http://schemas.microsoft.com/office/drawing/2010/main" val="0"/>
+              </a:ext>
+            </a:extLst>
+          </a:blip>
+          <a:stretch>
+            <a:fillRect/>
+          </a:stretch>
+        </p:blipFill>
+        <p:spPr>
+          <a:xfrm>
+            <a:off x="0" y="4136136"/>
+            <a:ext cx="12192000" cy="1414272"/>
+          </a:xfrm>
+          <a:prstGeom prst="rect">
+            <a:avLst/>
+          </a:prstGeom>
+        </p:spPr>
+      </p:pic>
+      <p:pic>
+        <p:nvPicPr>
+          <p:cNvPr id="13" name="Picture 12">
+            <a:extLst>
+              <a:ext uri="{FF2B5EF4-FFF2-40B4-BE49-F238E27FC236}">
+                <a16:creationId xmlns:a16="http://schemas.microsoft.com/office/drawing/2014/main" id="{163E612A-F467-4008-B9F8-0A72F894E01C}"/>
+              </a:ext>
+            </a:extLst>
+          </p:cNvPr>
+          <p:cNvPicPr>
+            <a:picLocks noChangeAspect="1"/>
+          </p:cNvPicPr>
+          <p:nvPr/>
+        </p:nvPicPr>
+        <p:blipFill>
+          <a:blip r:embed="rId6">
+            <a:extLst>
+              <a:ext uri="{28A0092B-C50C-407E-A947-70E740481C1C}">
+                <a14:useLocalDpi xmlns:a14="http://schemas.microsoft.com/office/drawing/2010/main" val="0"/>
+              </a:ext>
+            </a:extLst>
+          </a:blip>
+          <a:stretch>
+            <a:fillRect/>
+          </a:stretch>
+        </p:blipFill>
+        <p:spPr>
+          <a:xfrm>
+            <a:off x="0" y="5492028"/>
+            <a:ext cx="12192000" cy="1414272"/>
+          </a:xfrm>
+          <a:prstGeom prst="rect">
+            <a:avLst/>
+          </a:prstGeom>
+        </p:spPr>
+      </p:pic>
+    </p:spTree>
+    <p:extLst>
+      <p:ext uri="{BB962C8B-B14F-4D97-AF65-F5344CB8AC3E}">
+        <p14:creationId xmlns:p14="http://schemas.microsoft.com/office/powerpoint/2010/main" val="2577713261"/>
+      </p:ext>
+    </p:extLst>
+  </p:cSld>
+  <p:clrMapOvr>
+    <a:masterClrMapping/>
+  </p:clrMapOvr>
+</p:sld>
+</file>
+
+<file path=ppt/slides/slide4.xml><?xml version="1.0" encoding="utf-8"?>
+<p:sld xmlns:a="http://schemas.openxmlformats.org/drawingml/2006/main" xmlns:r="http://schemas.openxmlformats.org/officeDocument/2006/relationships" xmlns:p="http://schemas.openxmlformats.org/presentationml/2006/main">
+  <p:cSld>
+    <p:spTree>
+      <p:nvGrpSpPr>
+        <p:cNvPr id="1" name=""/>
+        <p:cNvGrpSpPr/>
+        <p:nvPr/>
+      </p:nvGrpSpPr>
+      <p:grpSpPr>
+        <a:xfrm>
+          <a:off x="0" y="0"/>
+          <a:ext cx="0" cy="0"/>
+          <a:chOff x="0" y="0"/>
+          <a:chExt cx="0" cy="0"/>
+        </a:xfrm>
+      </p:grpSpPr>
+      <p:grpSp>
+        <p:nvGrpSpPr>
+          <p:cNvPr id="2" name="Group 1">
+            <a:extLst>
+              <a:ext uri="{FF2B5EF4-FFF2-40B4-BE49-F238E27FC236}">
+                <a16:creationId xmlns:a16="http://schemas.microsoft.com/office/drawing/2014/main" id="{22E74AA6-1A33-4C9F-A9C2-1FA8E4FF394B}"/>
+              </a:ext>
+            </a:extLst>
+          </p:cNvPr>
+          <p:cNvGrpSpPr/>
+          <p:nvPr/>
+        </p:nvGrpSpPr>
+        <p:grpSpPr>
+          <a:xfrm>
+            <a:off x="-185533" y="26504"/>
+            <a:ext cx="12377533" cy="6858000"/>
+            <a:chOff x="-185533" y="26504"/>
+            <a:chExt cx="12377533" cy="6858000"/>
+          </a:xfrm>
+        </p:grpSpPr>
+        <p:pic>
+          <p:nvPicPr>
+            <p:cNvPr id="4" name="Picture 3">
+              <a:extLst>
+                <a:ext uri="{FF2B5EF4-FFF2-40B4-BE49-F238E27FC236}">
+                  <a16:creationId xmlns:a16="http://schemas.microsoft.com/office/drawing/2014/main" id="{190A7426-EC45-41B6-9C84-D7A40CCE6D5C}"/>
+                </a:ext>
+              </a:extLst>
+            </p:cNvPr>
+            <p:cNvPicPr>
+              <a:picLocks noChangeAspect="1"/>
+            </p:cNvPicPr>
+            <p:nvPr/>
+          </p:nvPicPr>
+          <p:blipFill rotWithShape="1">
+            <a:blip r:embed="rId2"/>
+            <a:srcRect t="386"/>
+            <a:stretch/>
+          </p:blipFill>
+          <p:spPr>
+            <a:xfrm>
+              <a:off x="3874660" y="26504"/>
+              <a:ext cx="8317340" cy="6831496"/>
+            </a:xfrm>
+            <a:prstGeom prst="rect">
+              <a:avLst/>
+            </a:prstGeom>
+          </p:spPr>
+        </p:pic>
+        <p:pic>
+          <p:nvPicPr>
+            <p:cNvPr id="5" name="Picture 4">
+              <a:extLst>
+                <a:ext uri="{FF2B5EF4-FFF2-40B4-BE49-F238E27FC236}">
+                  <a16:creationId xmlns:a16="http://schemas.microsoft.com/office/drawing/2014/main" id="{02B0E408-5ED1-45EA-9E6D-9145F98EBCCD}"/>
+                </a:ext>
+              </a:extLst>
+            </p:cNvPr>
+            <p:cNvPicPr>
+              <a:picLocks noChangeAspect="1"/>
+            </p:cNvPicPr>
+            <p:nvPr/>
+          </p:nvPicPr>
+          <p:blipFill>
+            <a:blip r:embed="rId3"/>
+            <a:stretch>
+              <a:fillRect/>
+            </a:stretch>
+          </p:blipFill>
+          <p:spPr>
+            <a:xfrm>
+              <a:off x="-185533" y="26504"/>
+              <a:ext cx="4054079" cy="6858000"/>
+            </a:xfrm>
+            <a:prstGeom prst="rect">
+              <a:avLst/>
+            </a:prstGeom>
+          </p:spPr>
+        </p:pic>
+      </p:grpSp>
+      <p:sp>
+        <p:nvSpPr>
+          <p:cNvPr id="6" name="Rectangle 5">
+            <a:extLst>
+              <a:ext uri="{FF2B5EF4-FFF2-40B4-BE49-F238E27FC236}">
+                <a16:creationId xmlns:a16="http://schemas.microsoft.com/office/drawing/2014/main" id="{7F93D325-6FC1-4082-9601-70F4C0A5E8A6}"/>
+              </a:ext>
+            </a:extLst>
+          </p:cNvPr>
+          <p:cNvSpPr/>
+          <p:nvPr/>
+        </p:nvSpPr>
+        <p:spPr>
+          <a:xfrm>
+            <a:off x="5724939" y="808383"/>
+            <a:ext cx="689113" cy="596347"/>
+          </a:xfrm>
+          <a:prstGeom prst="rect">
+            <a:avLst/>
+          </a:prstGeom>
+          <a:noFill/>
+          <a:ln w="57150">
+            <a:solidFill>
+              <a:schemeClr val="tx1"/>
+            </a:solidFill>
+            <a:prstDash val="sysDot"/>
+          </a:ln>
+        </p:spPr>
+        <p:style>
+          <a:lnRef idx="2">
+            <a:schemeClr val="accent1">
+              <a:shade val="50000"/>
+            </a:schemeClr>
+          </a:lnRef>
+          <a:fillRef idx="1">
+            <a:schemeClr val="accent1"/>
+          </a:fillRef>
+          <a:effectRef idx="0">
+            <a:schemeClr val="accent1"/>
+          </a:effectRef>
+          <a:fontRef idx="minor">
+            <a:schemeClr val="lt1"/>
+          </a:fontRef>
+        </p:style>
+        <p:txBody>
+          <a:bodyPr rtlCol="0" anchor="ctr"/>
+          <a:lstStyle/>
+          <a:p>
+            <a:pPr algn="ctr"/>
+            <a:endParaRPr lang="en-AU"/>
+          </a:p>
+        </p:txBody>
+      </p:sp>
+      <p:sp>
+        <p:nvSpPr>
+          <p:cNvPr id="7" name="Rectangle 6">
+            <a:extLst>
+              <a:ext uri="{FF2B5EF4-FFF2-40B4-BE49-F238E27FC236}">
+                <a16:creationId xmlns:a16="http://schemas.microsoft.com/office/drawing/2014/main" id="{CF1F7371-9334-4B96-B348-966C313499B3}"/>
+              </a:ext>
+            </a:extLst>
+          </p:cNvPr>
+          <p:cNvSpPr/>
+          <p:nvPr/>
+        </p:nvSpPr>
+        <p:spPr>
+          <a:xfrm>
+            <a:off x="5724939" y="2213113"/>
+            <a:ext cx="689113" cy="596347"/>
+          </a:xfrm>
+          <a:prstGeom prst="rect">
+            <a:avLst/>
+          </a:prstGeom>
+          <a:noFill/>
+          <a:ln w="57150">
+            <a:solidFill>
+              <a:schemeClr val="tx1"/>
+            </a:solidFill>
+            <a:prstDash val="sysDot"/>
+          </a:ln>
+        </p:spPr>
+        <p:style>
+          <a:lnRef idx="2">
+            <a:schemeClr val="accent1">
+              <a:shade val="50000"/>
+            </a:schemeClr>
+          </a:lnRef>
+          <a:fillRef idx="1">
+            <a:schemeClr val="accent1"/>
+          </a:fillRef>
+          <a:effectRef idx="0">
+            <a:schemeClr val="accent1"/>
+          </a:effectRef>
+          <a:fontRef idx="minor">
+            <a:schemeClr val="lt1"/>
+          </a:fontRef>
+        </p:style>
+        <p:txBody>
+          <a:bodyPr rtlCol="0" anchor="ctr"/>
+          <a:lstStyle/>
+          <a:p>
+            <a:pPr algn="ctr"/>
+            <a:endParaRPr lang="en-AU"/>
+          </a:p>
+        </p:txBody>
+      </p:sp>
+      <p:sp>
+        <p:nvSpPr>
+          <p:cNvPr id="8" name="Rectangle 7">
+            <a:extLst>
+              <a:ext uri="{FF2B5EF4-FFF2-40B4-BE49-F238E27FC236}">
+                <a16:creationId xmlns:a16="http://schemas.microsoft.com/office/drawing/2014/main" id="{AE9D47F6-2628-4D59-AC32-1AC710E2F597}"/>
+              </a:ext>
+            </a:extLst>
+          </p:cNvPr>
+          <p:cNvSpPr/>
+          <p:nvPr/>
+        </p:nvSpPr>
+        <p:spPr>
+          <a:xfrm>
+            <a:off x="5724939" y="3617843"/>
+            <a:ext cx="689113" cy="596347"/>
+          </a:xfrm>
+          <a:prstGeom prst="rect">
+            <a:avLst/>
+          </a:prstGeom>
+          <a:noFill/>
+          <a:ln w="57150">
+            <a:solidFill>
+              <a:schemeClr val="tx1"/>
+            </a:solidFill>
+            <a:prstDash val="sysDot"/>
+          </a:ln>
+        </p:spPr>
+        <p:style>
+          <a:lnRef idx="2">
+            <a:schemeClr val="accent1">
+              <a:shade val="50000"/>
+            </a:schemeClr>
+          </a:lnRef>
+          <a:fillRef idx="1">
+            <a:schemeClr val="accent1"/>
+          </a:fillRef>
+          <a:effectRef idx="0">
+            <a:schemeClr val="accent1"/>
+          </a:effectRef>
+          <a:fontRef idx="minor">
+            <a:schemeClr val="lt1"/>
+          </a:fontRef>
+        </p:style>
+        <p:txBody>
+          <a:bodyPr rtlCol="0" anchor="ctr"/>
+          <a:lstStyle/>
+          <a:p>
+            <a:pPr algn="ctr"/>
+            <a:endParaRPr lang="en-AU"/>
+          </a:p>
+        </p:txBody>
+      </p:sp>
+      <p:sp>
+        <p:nvSpPr>
+          <p:cNvPr id="9" name="Rectangle 8">
+            <a:extLst>
+              <a:ext uri="{FF2B5EF4-FFF2-40B4-BE49-F238E27FC236}">
+                <a16:creationId xmlns:a16="http://schemas.microsoft.com/office/drawing/2014/main" id="{2066304B-94A9-4571-B3C5-4AADFAA5E6FA}"/>
+              </a:ext>
+            </a:extLst>
+          </p:cNvPr>
+          <p:cNvSpPr/>
+          <p:nvPr/>
+        </p:nvSpPr>
+        <p:spPr>
+          <a:xfrm>
+            <a:off x="5724939" y="5049076"/>
+            <a:ext cx="689113" cy="596347"/>
+          </a:xfrm>
+          <a:prstGeom prst="rect">
+            <a:avLst/>
+          </a:prstGeom>
+          <a:noFill/>
+          <a:ln w="57150">
+            <a:solidFill>
+              <a:schemeClr val="tx1"/>
+            </a:solidFill>
+            <a:prstDash val="sysDot"/>
+          </a:ln>
+        </p:spPr>
+        <p:style>
+          <a:lnRef idx="2">
+            <a:schemeClr val="accent1">
+              <a:shade val="50000"/>
+            </a:schemeClr>
+          </a:lnRef>
+          <a:fillRef idx="1">
+            <a:schemeClr val="accent1"/>
+          </a:fillRef>
+          <a:effectRef idx="0">
+            <a:schemeClr val="accent1"/>
+          </a:effectRef>
+          <a:fontRef idx="minor">
+            <a:schemeClr val="lt1"/>
+          </a:fontRef>
+        </p:style>
+        <p:txBody>
+          <a:bodyPr rtlCol="0" anchor="ctr"/>
+          <a:lstStyle/>
+          <a:p>
+            <a:pPr algn="ctr"/>
+            <a:endParaRPr lang="en-AU"/>
+          </a:p>
+        </p:txBody>
+      </p:sp>
+      <p:sp>
+        <p:nvSpPr>
+          <p:cNvPr id="10" name="Rectangle 9">
+            <a:extLst>
+              <a:ext uri="{FF2B5EF4-FFF2-40B4-BE49-F238E27FC236}">
+                <a16:creationId xmlns:a16="http://schemas.microsoft.com/office/drawing/2014/main" id="{16213756-BAEB-408F-848D-273F62069AE5}"/>
+              </a:ext>
+            </a:extLst>
+          </p:cNvPr>
+          <p:cNvSpPr/>
+          <p:nvPr/>
+        </p:nvSpPr>
+        <p:spPr>
+          <a:xfrm>
+            <a:off x="5724939" y="6274902"/>
+            <a:ext cx="689113" cy="596347"/>
+          </a:xfrm>
+          <a:prstGeom prst="rect">
+            <a:avLst/>
+          </a:prstGeom>
+          <a:noFill/>
+          <a:ln w="57150">
+            <a:solidFill>
+              <a:schemeClr val="tx1"/>
+            </a:solidFill>
+            <a:prstDash val="sysDot"/>
+          </a:ln>
+        </p:spPr>
+        <p:style>
+          <a:lnRef idx="2">
+            <a:schemeClr val="accent1">
+              <a:shade val="50000"/>
+            </a:schemeClr>
+          </a:lnRef>
+          <a:fillRef idx="1">
+            <a:schemeClr val="accent1"/>
+          </a:fillRef>
+          <a:effectRef idx="0">
+            <a:schemeClr val="accent1"/>
+          </a:effectRef>
+          <a:fontRef idx="minor">
+            <a:schemeClr val="lt1"/>
+          </a:fontRef>
+        </p:style>
+        <p:txBody>
+          <a:bodyPr rtlCol="0" anchor="ctr"/>
+          <a:lstStyle/>
+          <a:p>
+            <a:pPr algn="ctr"/>
+            <a:endParaRPr lang="en-AU"/>
+          </a:p>
+        </p:txBody>
+      </p:sp>
+    </p:spTree>
+    <p:extLst>
+      <p:ext uri="{BB962C8B-B14F-4D97-AF65-F5344CB8AC3E}">
+        <p14:creationId xmlns:p14="http://schemas.microsoft.com/office/powerpoint/2010/main" val="185227823"/>
+      </p:ext>
+    </p:extLst>
+  </p:cSld>
+  <p:clrMapOvr>
+    <a:masterClrMapping/>
+  </p:clrMapOvr>
+</p:sld>
+</file>
+
+<file path=ppt/slides/slide5.xml><?xml version="1.0" encoding="utf-8"?>
+<p:sld xmlns:a="http://schemas.openxmlformats.org/drawingml/2006/main" xmlns:r="http://schemas.openxmlformats.org/officeDocument/2006/relationships" xmlns:p="http://schemas.openxmlformats.org/presentationml/2006/main">
+  <p:cSld>
+    <p:spTree>
+      <p:nvGrpSpPr>
+        <p:cNvPr id="1" name=""/>
+        <p:cNvGrpSpPr/>
+        <p:nvPr/>
+      </p:nvGrpSpPr>
+      <p:grpSpPr>
+        <a:xfrm>
+          <a:off x="0" y="0"/>
+          <a:ext cx="0" cy="0"/>
+          <a:chOff x="0" y="0"/>
+          <a:chExt cx="0" cy="0"/>
+        </a:xfrm>
+      </p:grpSpPr>
+      <p:pic>
+        <p:nvPicPr>
+          <p:cNvPr id="4" name="Picture 3">
+            <a:extLst>
+              <a:ext uri="{FF2B5EF4-FFF2-40B4-BE49-F238E27FC236}">
+                <a16:creationId xmlns:a16="http://schemas.microsoft.com/office/drawing/2014/main" id="{190A7426-EC45-41B6-9C84-D7A40CCE6D5C}"/>
+              </a:ext>
+            </a:extLst>
+          </p:cNvPr>
+          <p:cNvPicPr>
+            <a:picLocks noChangeAspect="1"/>
+          </p:cNvPicPr>
+          <p:nvPr/>
+        </p:nvPicPr>
+        <p:blipFill rotWithShape="1">
+          <a:blip r:embed="rId2"/>
+          <a:srcRect t="21160" b="59034"/>
+          <a:stretch/>
+        </p:blipFill>
+        <p:spPr>
+          <a:xfrm>
+            <a:off x="4019014" y="92771"/>
+            <a:ext cx="8317340" cy="1358345"/>
+          </a:xfrm>
+          <a:prstGeom prst="rect">
+            <a:avLst/>
+          </a:prstGeom>
+        </p:spPr>
+      </p:pic>
+      <p:pic>
+        <p:nvPicPr>
+          <p:cNvPr id="5" name="Picture 4">
+            <a:extLst>
+              <a:ext uri="{FF2B5EF4-FFF2-40B4-BE49-F238E27FC236}">
+                <a16:creationId xmlns:a16="http://schemas.microsoft.com/office/drawing/2014/main" id="{02B0E408-5ED1-45EA-9E6D-9145F98EBCCD}"/>
+              </a:ext>
+            </a:extLst>
+          </p:cNvPr>
+          <p:cNvPicPr>
+            <a:picLocks noChangeAspect="1"/>
+          </p:cNvPicPr>
+          <p:nvPr/>
+        </p:nvPicPr>
+        <p:blipFill rotWithShape="1">
+          <a:blip r:embed="rId3"/>
+          <a:srcRect t="20097" b="60096"/>
+          <a:stretch/>
+        </p:blipFill>
+        <p:spPr>
+          <a:xfrm>
+            <a:off x="-39761" y="92773"/>
+            <a:ext cx="4054079" cy="1358344"/>
+          </a:xfrm>
+          <a:prstGeom prst="rect">
+            <a:avLst/>
+          </a:prstGeom>
+        </p:spPr>
+      </p:pic>
+      <p:sp>
+        <p:nvSpPr>
+          <p:cNvPr id="7" name="Rectangle 6">
+            <a:extLst>
+              <a:ext uri="{FF2B5EF4-FFF2-40B4-BE49-F238E27FC236}">
+                <a16:creationId xmlns:a16="http://schemas.microsoft.com/office/drawing/2014/main" id="{CF1F7371-9334-4B96-B348-966C313499B3}"/>
+              </a:ext>
+            </a:extLst>
+          </p:cNvPr>
+          <p:cNvSpPr/>
+          <p:nvPr/>
+        </p:nvSpPr>
+        <p:spPr>
+          <a:xfrm>
+            <a:off x="5870711" y="834895"/>
+            <a:ext cx="689113" cy="596347"/>
+          </a:xfrm>
+          <a:prstGeom prst="rect">
+            <a:avLst/>
+          </a:prstGeom>
+          <a:noFill/>
+          <a:ln w="57150">
+            <a:solidFill>
+              <a:schemeClr val="tx1"/>
+            </a:solidFill>
+            <a:prstDash val="sysDot"/>
+          </a:ln>
+        </p:spPr>
+        <p:style>
+          <a:lnRef idx="2">
+            <a:schemeClr val="accent1">
+              <a:shade val="50000"/>
+            </a:schemeClr>
+          </a:lnRef>
+          <a:fillRef idx="1">
+            <a:schemeClr val="accent1"/>
+          </a:fillRef>
+          <a:effectRef idx="0">
+            <a:schemeClr val="accent1"/>
+          </a:effectRef>
+          <a:fontRef idx="minor">
+            <a:schemeClr val="lt1"/>
+          </a:fontRef>
+        </p:style>
+        <p:txBody>
+          <a:bodyPr rtlCol="0" anchor="ctr"/>
+          <a:lstStyle/>
+          <a:p>
+            <a:pPr algn="ctr"/>
+            <a:endParaRPr lang="en-AU"/>
+          </a:p>
+        </p:txBody>
+      </p:sp>
+      <p:pic>
+        <p:nvPicPr>
+          <p:cNvPr id="11" name="Picture 10">
+            <a:extLst>
+              <a:ext uri="{FF2B5EF4-FFF2-40B4-BE49-F238E27FC236}">
+                <a16:creationId xmlns:a16="http://schemas.microsoft.com/office/drawing/2014/main" id="{3498DB6F-B385-431F-A9E2-0C163B9FE2A9}"/>
+              </a:ext>
+            </a:extLst>
+          </p:cNvPr>
+          <p:cNvPicPr>
+            <a:picLocks noChangeAspect="1"/>
+          </p:cNvPicPr>
+          <p:nvPr/>
+        </p:nvPicPr>
+        <p:blipFill rotWithShape="1">
+          <a:blip r:embed="rId2"/>
+          <a:srcRect t="61885" b="-1"/>
+          <a:stretch/>
+        </p:blipFill>
+        <p:spPr>
+          <a:xfrm>
+            <a:off x="4014317" y="1451116"/>
+            <a:ext cx="8317340" cy="2613998"/>
+          </a:xfrm>
+          <a:prstGeom prst="rect">
+            <a:avLst/>
+          </a:prstGeom>
+        </p:spPr>
+      </p:pic>
+      <p:pic>
+        <p:nvPicPr>
+          <p:cNvPr id="12" name="Picture 11">
+            <a:extLst>
+              <a:ext uri="{FF2B5EF4-FFF2-40B4-BE49-F238E27FC236}">
+                <a16:creationId xmlns:a16="http://schemas.microsoft.com/office/drawing/2014/main" id="{3B58D29F-7DBD-4DB7-ABC2-E01F387F2733}"/>
+              </a:ext>
+            </a:extLst>
+          </p:cNvPr>
+          <p:cNvPicPr>
+            <a:picLocks noChangeAspect="1"/>
+          </p:cNvPicPr>
+          <p:nvPr/>
+        </p:nvPicPr>
+        <p:blipFill rotWithShape="1">
+          <a:blip r:embed="rId3"/>
+          <a:srcRect t="60193" b="1401"/>
+          <a:stretch/>
+        </p:blipFill>
+        <p:spPr>
+          <a:xfrm>
+            <a:off x="-44459" y="1431243"/>
+            <a:ext cx="4054079" cy="2633872"/>
+          </a:xfrm>
+          <a:prstGeom prst="rect">
+            <a:avLst/>
+          </a:prstGeom>
+        </p:spPr>
+      </p:pic>
+      <p:sp>
+        <p:nvSpPr>
+          <p:cNvPr id="13" name="Rectangle 12">
+            <a:extLst>
+              <a:ext uri="{FF2B5EF4-FFF2-40B4-BE49-F238E27FC236}">
+                <a16:creationId xmlns:a16="http://schemas.microsoft.com/office/drawing/2014/main" id="{F59D3174-A455-4325-A268-F2DD05198D3B}"/>
+              </a:ext>
+            </a:extLst>
+          </p:cNvPr>
+          <p:cNvSpPr/>
+          <p:nvPr/>
+        </p:nvSpPr>
+        <p:spPr>
+          <a:xfrm>
+            <a:off x="5870710" y="3435627"/>
+            <a:ext cx="689113" cy="596347"/>
+          </a:xfrm>
+          <a:prstGeom prst="rect">
+            <a:avLst/>
+          </a:prstGeom>
+          <a:noFill/>
+          <a:ln w="57150">
+            <a:solidFill>
+              <a:schemeClr val="tx1"/>
+            </a:solidFill>
+            <a:prstDash val="sysDot"/>
+          </a:ln>
+        </p:spPr>
+        <p:style>
+          <a:lnRef idx="2">
+            <a:schemeClr val="accent1">
+              <a:shade val="50000"/>
+            </a:schemeClr>
+          </a:lnRef>
+          <a:fillRef idx="1">
+            <a:schemeClr val="accent1"/>
+          </a:fillRef>
+          <a:effectRef idx="0">
+            <a:schemeClr val="accent1"/>
+          </a:effectRef>
+          <a:fontRef idx="minor">
+            <a:schemeClr val="lt1"/>
+          </a:fontRef>
+        </p:style>
+        <p:txBody>
+          <a:bodyPr rtlCol="0" anchor="ctr"/>
+          <a:lstStyle/>
+          <a:p>
+            <a:pPr algn="ctr"/>
+            <a:endParaRPr lang="en-AU"/>
+          </a:p>
+        </p:txBody>
+      </p:sp>
+      <p:sp>
+        <p:nvSpPr>
+          <p:cNvPr id="17" name="Rectangle 16">
+            <a:extLst>
+              <a:ext uri="{FF2B5EF4-FFF2-40B4-BE49-F238E27FC236}">
+                <a16:creationId xmlns:a16="http://schemas.microsoft.com/office/drawing/2014/main" id="{D0B690BB-9E1A-435F-ACBA-BB474CA0BD90}"/>
+              </a:ext>
+            </a:extLst>
+          </p:cNvPr>
+          <p:cNvSpPr/>
+          <p:nvPr/>
+        </p:nvSpPr>
+        <p:spPr>
+          <a:xfrm>
+            <a:off x="5870710" y="2262809"/>
+            <a:ext cx="689113" cy="596347"/>
+          </a:xfrm>
+          <a:prstGeom prst="rect">
+            <a:avLst/>
+          </a:prstGeom>
+          <a:noFill/>
+          <a:ln w="57150">
+            <a:solidFill>
+              <a:schemeClr val="tx1"/>
+            </a:solidFill>
+            <a:prstDash val="sysDot"/>
+          </a:ln>
+        </p:spPr>
+        <p:style>
+          <a:lnRef idx="2">
+            <a:schemeClr val="accent1">
+              <a:shade val="50000"/>
+            </a:schemeClr>
+          </a:lnRef>
+          <a:fillRef idx="1">
+            <a:schemeClr val="accent1"/>
+          </a:fillRef>
+          <a:effectRef idx="0">
+            <a:schemeClr val="accent1"/>
+          </a:effectRef>
+          <a:fontRef idx="minor">
+            <a:schemeClr val="lt1"/>
+          </a:fontRef>
+        </p:style>
+        <p:txBody>
+          <a:bodyPr rtlCol="0" anchor="ctr"/>
+          <a:lstStyle/>
+          <a:p>
+            <a:pPr algn="ctr"/>
+            <a:endParaRPr lang="en-AU"/>
+          </a:p>
+        </p:txBody>
+      </p:sp>
+    </p:spTree>
+    <p:extLst>
+      <p:ext uri="{BB962C8B-B14F-4D97-AF65-F5344CB8AC3E}">
+        <p14:creationId xmlns:p14="http://schemas.microsoft.com/office/powerpoint/2010/main" val="350504631"/>
+      </p:ext>
+    </p:extLst>
+  </p:cSld>
+  <p:clrMapOvr>
+    <a:masterClrMapping/>
+  </p:clrMapOvr>
+</p:sld>
+</file>
+
 <file path=ppt/theme/theme1.xml><?xml version="1.0" encoding="utf-8"?>
 <a:theme xmlns:a="http://schemas.openxmlformats.org/drawingml/2006/main" name="Office Theme">
   <a:themeElements>

</xml_diff>

<commit_message>
REPORT - FULL FIRST DRAFT COMPLETE
</commit_message>
<xml_diff>
--- a/Docs/Final/systemOverview.pptx
+++ b/Docs/Final/systemOverview.pptx
@@ -5287,172 +5287,36 @@
           </a:fontRef>
         </p:style>
       </p:cxnSp>
-      <p:sp>
-        <p:nvSpPr>
-          <p:cNvPr id="59" name="Rectangle 58">
-            <a:extLst>
-              <a:ext uri="{FF2B5EF4-FFF2-40B4-BE49-F238E27FC236}">
-                <a16:creationId xmlns:a16="http://schemas.microsoft.com/office/drawing/2014/main" id="{B88BB180-765E-4AD8-903F-37E8BC9527F1}"/>
-              </a:ext>
-            </a:extLst>
-          </p:cNvPr>
-          <p:cNvSpPr/>
+      <p:pic>
+        <p:nvPicPr>
+          <p:cNvPr id="2" name="Picture 1">
+            <a:extLst>
+              <a:ext uri="{FF2B5EF4-FFF2-40B4-BE49-F238E27FC236}">
+                <a16:creationId xmlns:a16="http://schemas.microsoft.com/office/drawing/2014/main" id="{19C98FB1-4AE9-437E-B769-F9ADD983A0C1}"/>
+              </a:ext>
+            </a:extLst>
+          </p:cNvPr>
+          <p:cNvPicPr>
+            <a:picLocks noChangeAspect="1"/>
+          </p:cNvPicPr>
           <p:nvPr/>
-        </p:nvSpPr>
+        </p:nvPicPr>
+        <p:blipFill>
+          <a:blip r:embed="rId6"/>
+          <a:stretch>
+            <a:fillRect/>
+          </a:stretch>
+        </p:blipFill>
         <p:spPr>
           <a:xfrm>
-            <a:off x="5168348" y="4469917"/>
-            <a:ext cx="1749287" cy="1735273"/>
+            <a:off x="5154053" y="4441702"/>
+            <a:ext cx="1805876" cy="1805876"/>
           </a:xfrm>
           <a:prstGeom prst="rect">
             <a:avLst/>
           </a:prstGeom>
-          <a:solidFill>
-            <a:schemeClr val="tx1"/>
-          </a:solidFill>
-          <a:ln>
-            <a:noFill/>
-          </a:ln>
         </p:spPr>
-        <p:style>
-          <a:lnRef idx="2">
-            <a:schemeClr val="accent1">
-              <a:shade val="50000"/>
-            </a:schemeClr>
-          </a:lnRef>
-          <a:fillRef idx="1">
-            <a:schemeClr val="accent1"/>
-          </a:fillRef>
-          <a:effectRef idx="0">
-            <a:schemeClr val="accent1"/>
-          </a:effectRef>
-          <a:fontRef idx="minor">
-            <a:schemeClr val="lt1"/>
-          </a:fontRef>
-        </p:style>
-        <p:txBody>
-          <a:bodyPr rtlCol="0" anchor="ctr"/>
-          <a:lstStyle/>
-          <a:p>
-            <a:pPr algn="ctr"/>
-            <a:endParaRPr lang="en-AU"/>
-          </a:p>
-        </p:txBody>
-      </p:sp>
-      <p:sp>
-        <p:nvSpPr>
-          <p:cNvPr id="60" name="Rectangle 59">
-            <a:extLst>
-              <a:ext uri="{FF2B5EF4-FFF2-40B4-BE49-F238E27FC236}">
-                <a16:creationId xmlns:a16="http://schemas.microsoft.com/office/drawing/2014/main" id="{BB8CE54A-DA6A-40BF-BD93-79B468001577}"/>
-              </a:ext>
-            </a:extLst>
-          </p:cNvPr>
-          <p:cNvSpPr/>
-          <p:nvPr/>
-        </p:nvSpPr>
-        <p:spPr>
-          <a:xfrm rot="340870">
-            <a:off x="5588073" y="5179794"/>
-            <a:ext cx="958391" cy="185439"/>
-          </a:xfrm>
-          <a:prstGeom prst="rect">
-            <a:avLst/>
-          </a:prstGeom>
-          <a:pattFill prst="lgConfetti">
-            <a:fgClr>
-              <a:schemeClr val="accent1"/>
-            </a:fgClr>
-            <a:bgClr>
-              <a:schemeClr val="bg1"/>
-            </a:bgClr>
-          </a:pattFill>
-          <a:ln>
-            <a:noFill/>
-          </a:ln>
-        </p:spPr>
-        <p:style>
-          <a:lnRef idx="2">
-            <a:schemeClr val="accent1">
-              <a:shade val="50000"/>
-            </a:schemeClr>
-          </a:lnRef>
-          <a:fillRef idx="1">
-            <a:schemeClr val="accent1"/>
-          </a:fillRef>
-          <a:effectRef idx="0">
-            <a:schemeClr val="accent1"/>
-          </a:effectRef>
-          <a:fontRef idx="minor">
-            <a:schemeClr val="lt1"/>
-          </a:fontRef>
-        </p:style>
-        <p:txBody>
-          <a:bodyPr rtlCol="0" anchor="ctr"/>
-          <a:lstStyle/>
-          <a:p>
-            <a:pPr algn="ctr"/>
-            <a:endParaRPr lang="en-AU"/>
-          </a:p>
-        </p:txBody>
-      </p:sp>
-      <p:sp>
-        <p:nvSpPr>
-          <p:cNvPr id="61" name="Rectangle 60">
-            <a:extLst>
-              <a:ext uri="{FF2B5EF4-FFF2-40B4-BE49-F238E27FC236}">
-                <a16:creationId xmlns:a16="http://schemas.microsoft.com/office/drawing/2014/main" id="{0361AB74-2D38-4E18-82FF-BF1D56D774AD}"/>
-              </a:ext>
-            </a:extLst>
-          </p:cNvPr>
-          <p:cNvSpPr/>
-          <p:nvPr/>
-        </p:nvSpPr>
-        <p:spPr>
-          <a:xfrm rot="5400000">
-            <a:off x="5537512" y="5634852"/>
-            <a:ext cx="958391" cy="185439"/>
-          </a:xfrm>
-          <a:prstGeom prst="rect">
-            <a:avLst/>
-          </a:prstGeom>
-          <a:pattFill prst="lgConfetti">
-            <a:fgClr>
-              <a:schemeClr val="accent1"/>
-            </a:fgClr>
-            <a:bgClr>
-              <a:schemeClr val="bg1"/>
-            </a:bgClr>
-          </a:pattFill>
-          <a:ln>
-            <a:noFill/>
-          </a:ln>
-        </p:spPr>
-        <p:style>
-          <a:lnRef idx="2">
-            <a:schemeClr val="accent1">
-              <a:shade val="50000"/>
-            </a:schemeClr>
-          </a:lnRef>
-          <a:fillRef idx="1">
-            <a:schemeClr val="accent1"/>
-          </a:fillRef>
-          <a:effectRef idx="0">
-            <a:schemeClr val="accent1"/>
-          </a:effectRef>
-          <a:fontRef idx="minor">
-            <a:schemeClr val="lt1"/>
-          </a:fontRef>
-        </p:style>
-        <p:txBody>
-          <a:bodyPr rtlCol="0" anchor="ctr"/>
-          <a:lstStyle/>
-          <a:p>
-            <a:pPr algn="ctr"/>
-            <a:endParaRPr lang="en-AU"/>
-          </a:p>
-        </p:txBody>
-      </p:sp>
+      </p:pic>
     </p:spTree>
     <p:extLst>
       <p:ext uri="{BB962C8B-B14F-4D97-AF65-F5344CB8AC3E}">

</xml_diff>

<commit_message>
Update feature mask development image
</commit_message>
<xml_diff>
--- a/Docs/Final/systemOverview.pptx
+++ b/Docs/Final/systemOverview.pptx
@@ -7,9 +7,10 @@
   <p:sldIdLst>
     <p:sldId id="256" r:id="rId2"/>
     <p:sldId id="257" r:id="rId3"/>
-    <p:sldId id="258" r:id="rId4"/>
-    <p:sldId id="260" r:id="rId5"/>
-    <p:sldId id="261" r:id="rId6"/>
+    <p:sldId id="262" r:id="rId4"/>
+    <p:sldId id="258" r:id="rId5"/>
+    <p:sldId id="260" r:id="rId6"/>
+    <p:sldId id="261" r:id="rId7"/>
   </p:sldIdLst>
   <p:sldSz cx="12192000" cy="6858000"/>
   <p:notesSz cx="6858000" cy="9144000"/>
@@ -265,7 +266,7 @@
           <a:p>
             <a:fld id="{E8ECAF92-C71A-477A-A898-30019CFA0318}" type="datetimeFigureOut">
               <a:rPr lang="en-AU" smtClean="0"/>
-              <a:t>5/10/2019</a:t>
+              <a:t>6/10/2019</a:t>
             </a:fld>
             <a:endParaRPr lang="en-AU"/>
           </a:p>
@@ -465,7 +466,7 @@
           <a:p>
             <a:fld id="{E8ECAF92-C71A-477A-A898-30019CFA0318}" type="datetimeFigureOut">
               <a:rPr lang="en-AU" smtClean="0"/>
-              <a:t>5/10/2019</a:t>
+              <a:t>6/10/2019</a:t>
             </a:fld>
             <a:endParaRPr lang="en-AU"/>
           </a:p>
@@ -675,7 +676,7 @@
           <a:p>
             <a:fld id="{E8ECAF92-C71A-477A-A898-30019CFA0318}" type="datetimeFigureOut">
               <a:rPr lang="en-AU" smtClean="0"/>
-              <a:t>5/10/2019</a:t>
+              <a:t>6/10/2019</a:t>
             </a:fld>
             <a:endParaRPr lang="en-AU"/>
           </a:p>
@@ -875,7 +876,7 @@
           <a:p>
             <a:fld id="{E8ECAF92-C71A-477A-A898-30019CFA0318}" type="datetimeFigureOut">
               <a:rPr lang="en-AU" smtClean="0"/>
-              <a:t>5/10/2019</a:t>
+              <a:t>6/10/2019</a:t>
             </a:fld>
             <a:endParaRPr lang="en-AU"/>
           </a:p>
@@ -1151,7 +1152,7 @@
           <a:p>
             <a:fld id="{E8ECAF92-C71A-477A-A898-30019CFA0318}" type="datetimeFigureOut">
               <a:rPr lang="en-AU" smtClean="0"/>
-              <a:t>5/10/2019</a:t>
+              <a:t>6/10/2019</a:t>
             </a:fld>
             <a:endParaRPr lang="en-AU"/>
           </a:p>
@@ -1419,7 +1420,7 @@
           <a:p>
             <a:fld id="{E8ECAF92-C71A-477A-A898-30019CFA0318}" type="datetimeFigureOut">
               <a:rPr lang="en-AU" smtClean="0"/>
-              <a:t>5/10/2019</a:t>
+              <a:t>6/10/2019</a:t>
             </a:fld>
             <a:endParaRPr lang="en-AU"/>
           </a:p>
@@ -1834,7 +1835,7 @@
           <a:p>
             <a:fld id="{E8ECAF92-C71A-477A-A898-30019CFA0318}" type="datetimeFigureOut">
               <a:rPr lang="en-AU" smtClean="0"/>
-              <a:t>5/10/2019</a:t>
+              <a:t>6/10/2019</a:t>
             </a:fld>
             <a:endParaRPr lang="en-AU"/>
           </a:p>
@@ -1976,7 +1977,7 @@
           <a:p>
             <a:fld id="{E8ECAF92-C71A-477A-A898-30019CFA0318}" type="datetimeFigureOut">
               <a:rPr lang="en-AU" smtClean="0"/>
-              <a:t>5/10/2019</a:t>
+              <a:t>6/10/2019</a:t>
             </a:fld>
             <a:endParaRPr lang="en-AU"/>
           </a:p>
@@ -2089,7 +2090,7 @@
           <a:p>
             <a:fld id="{E8ECAF92-C71A-477A-A898-30019CFA0318}" type="datetimeFigureOut">
               <a:rPr lang="en-AU" smtClean="0"/>
-              <a:t>5/10/2019</a:t>
+              <a:t>6/10/2019</a:t>
             </a:fld>
             <a:endParaRPr lang="en-AU"/>
           </a:p>
@@ -2402,7 +2403,7 @@
           <a:p>
             <a:fld id="{E8ECAF92-C71A-477A-A898-30019CFA0318}" type="datetimeFigureOut">
               <a:rPr lang="en-AU" smtClean="0"/>
-              <a:t>5/10/2019</a:t>
+              <a:t>6/10/2019</a:t>
             </a:fld>
             <a:endParaRPr lang="en-AU"/>
           </a:p>
@@ -2691,7 +2692,7 @@
           <a:p>
             <a:fld id="{E8ECAF92-C71A-477A-A898-30019CFA0318}" type="datetimeFigureOut">
               <a:rPr lang="en-AU" smtClean="0"/>
-              <a:t>5/10/2019</a:t>
+              <a:t>6/10/2019</a:t>
             </a:fld>
             <a:endParaRPr lang="en-AU"/>
           </a:p>
@@ -2934,7 +2935,7 @@
           <a:p>
             <a:fld id="{E8ECAF92-C71A-477A-A898-30019CFA0318}" type="datetimeFigureOut">
               <a:rPr lang="en-AU" smtClean="0"/>
-              <a:t>5/10/2019</a:t>
+              <a:t>6/10/2019</a:t>
             </a:fld>
             <a:endParaRPr lang="en-AU"/>
           </a:p>
@@ -6975,6 +6976,1564 @@
           <a:chExt cx="0" cy="0"/>
         </a:xfrm>
       </p:grpSpPr>
+      <p:sp>
+        <p:nvSpPr>
+          <p:cNvPr id="6" name="Rectangle 5">
+            <a:extLst>
+              <a:ext uri="{FF2B5EF4-FFF2-40B4-BE49-F238E27FC236}">
+                <a16:creationId xmlns:a16="http://schemas.microsoft.com/office/drawing/2014/main" id="{EE5C8AF9-E1FC-47FB-B171-6B31312C6E28}"/>
+              </a:ext>
+            </a:extLst>
+          </p:cNvPr>
+          <p:cNvSpPr/>
+          <p:nvPr/>
+        </p:nvSpPr>
+        <p:spPr>
+          <a:xfrm>
+            <a:off x="6105378" y="1893929"/>
+            <a:ext cx="3052689" cy="3070141"/>
+          </a:xfrm>
+          <a:prstGeom prst="rect">
+            <a:avLst/>
+          </a:prstGeom>
+          <a:solidFill>
+            <a:schemeClr val="tx1"/>
+          </a:solidFill>
+          <a:ln>
+            <a:solidFill>
+              <a:schemeClr val="tx1"/>
+            </a:solidFill>
+          </a:ln>
+        </p:spPr>
+        <p:style>
+          <a:lnRef idx="2">
+            <a:schemeClr val="accent1">
+              <a:shade val="50000"/>
+            </a:schemeClr>
+          </a:lnRef>
+          <a:fillRef idx="1">
+            <a:schemeClr val="accent1"/>
+          </a:fillRef>
+          <a:effectRef idx="0">
+            <a:schemeClr val="accent1"/>
+          </a:effectRef>
+          <a:fontRef idx="minor">
+            <a:schemeClr val="lt1"/>
+          </a:fontRef>
+        </p:style>
+        <p:txBody>
+          <a:bodyPr rtlCol="0" anchor="ctr"/>
+          <a:lstStyle/>
+          <a:p>
+            <a:pPr algn="ctr"/>
+            <a:endParaRPr lang="en-AU"/>
+          </a:p>
+        </p:txBody>
+      </p:sp>
+      <p:sp>
+        <p:nvSpPr>
+          <p:cNvPr id="27" name="Isosceles Triangle 26">
+            <a:extLst>
+              <a:ext uri="{FF2B5EF4-FFF2-40B4-BE49-F238E27FC236}">
+                <a16:creationId xmlns:a16="http://schemas.microsoft.com/office/drawing/2014/main" id="{CBB44A86-1560-4039-833F-82BE24145F1A}"/>
+              </a:ext>
+            </a:extLst>
+          </p:cNvPr>
+          <p:cNvSpPr/>
+          <p:nvPr/>
+        </p:nvSpPr>
+        <p:spPr>
+          <a:xfrm rot="10800000">
+            <a:off x="6142789" y="1918704"/>
+            <a:ext cx="2956765" cy="3045366"/>
+          </a:xfrm>
+          <a:prstGeom prst="triangle">
+            <a:avLst/>
+          </a:prstGeom>
+          <a:solidFill>
+            <a:schemeClr val="bg1"/>
+          </a:solidFill>
+          <a:ln>
+            <a:solidFill>
+              <a:schemeClr val="tx1"/>
+            </a:solidFill>
+          </a:ln>
+        </p:spPr>
+        <p:style>
+          <a:lnRef idx="2">
+            <a:schemeClr val="accent1">
+              <a:shade val="50000"/>
+            </a:schemeClr>
+          </a:lnRef>
+          <a:fillRef idx="1">
+            <a:schemeClr val="accent1"/>
+          </a:fillRef>
+          <a:effectRef idx="0">
+            <a:schemeClr val="accent1"/>
+          </a:effectRef>
+          <a:fontRef idx="minor">
+            <a:schemeClr val="lt1"/>
+          </a:fontRef>
+        </p:style>
+        <p:txBody>
+          <a:bodyPr rtlCol="0" anchor="ctr"/>
+          <a:lstStyle/>
+          <a:p>
+            <a:pPr algn="ctr"/>
+            <a:endParaRPr lang="en-AU"/>
+          </a:p>
+        </p:txBody>
+      </p:sp>
+      <p:sp>
+        <p:nvSpPr>
+          <p:cNvPr id="3" name="Rectangle 2">
+            <a:extLst>
+              <a:ext uri="{FF2B5EF4-FFF2-40B4-BE49-F238E27FC236}">
+                <a16:creationId xmlns:a16="http://schemas.microsoft.com/office/drawing/2014/main" id="{C7352163-057A-4A80-A650-4E503A04434C}"/>
+              </a:ext>
+            </a:extLst>
+          </p:cNvPr>
+          <p:cNvSpPr/>
+          <p:nvPr/>
+        </p:nvSpPr>
+        <p:spPr>
+          <a:xfrm>
+            <a:off x="0" y="1893929"/>
+            <a:ext cx="3052689" cy="3070141"/>
+          </a:xfrm>
+          <a:prstGeom prst="rect">
+            <a:avLst/>
+          </a:prstGeom>
+          <a:solidFill>
+            <a:schemeClr val="bg1"/>
+          </a:solidFill>
+          <a:ln>
+            <a:solidFill>
+              <a:schemeClr val="tx1"/>
+            </a:solidFill>
+          </a:ln>
+        </p:spPr>
+        <p:style>
+          <a:lnRef idx="2">
+            <a:schemeClr val="accent1">
+              <a:shade val="50000"/>
+            </a:schemeClr>
+          </a:lnRef>
+          <a:fillRef idx="1">
+            <a:schemeClr val="accent1"/>
+          </a:fillRef>
+          <a:effectRef idx="0">
+            <a:schemeClr val="accent1"/>
+          </a:effectRef>
+          <a:fontRef idx="minor">
+            <a:schemeClr val="lt1"/>
+          </a:fontRef>
+        </p:style>
+        <p:txBody>
+          <a:bodyPr rtlCol="0" anchor="ctr"/>
+          <a:lstStyle/>
+          <a:p>
+            <a:pPr algn="ctr"/>
+            <a:endParaRPr lang="en-AU" dirty="0"/>
+          </a:p>
+        </p:txBody>
+      </p:sp>
+      <p:sp>
+        <p:nvSpPr>
+          <p:cNvPr id="4" name="Rectangle 3">
+            <a:extLst>
+              <a:ext uri="{FF2B5EF4-FFF2-40B4-BE49-F238E27FC236}">
+                <a16:creationId xmlns:a16="http://schemas.microsoft.com/office/drawing/2014/main" id="{477A5A62-E53A-4E5B-A9C0-949E1BA2161E}"/>
+              </a:ext>
+            </a:extLst>
+          </p:cNvPr>
+          <p:cNvSpPr/>
+          <p:nvPr/>
+        </p:nvSpPr>
+        <p:spPr>
+          <a:xfrm>
+            <a:off x="3052689" y="1893929"/>
+            <a:ext cx="3052689" cy="3070141"/>
+          </a:xfrm>
+          <a:prstGeom prst="rect">
+            <a:avLst/>
+          </a:prstGeom>
+          <a:solidFill>
+            <a:schemeClr val="bg1"/>
+          </a:solidFill>
+          <a:ln>
+            <a:solidFill>
+              <a:schemeClr val="tx1"/>
+            </a:solidFill>
+          </a:ln>
+        </p:spPr>
+        <p:style>
+          <a:lnRef idx="2">
+            <a:schemeClr val="accent1">
+              <a:shade val="50000"/>
+            </a:schemeClr>
+          </a:lnRef>
+          <a:fillRef idx="1">
+            <a:schemeClr val="accent1"/>
+          </a:fillRef>
+          <a:effectRef idx="0">
+            <a:schemeClr val="accent1"/>
+          </a:effectRef>
+          <a:fontRef idx="minor">
+            <a:schemeClr val="lt1"/>
+          </a:fontRef>
+        </p:style>
+        <p:txBody>
+          <a:bodyPr rtlCol="0" anchor="ctr"/>
+          <a:lstStyle/>
+          <a:p>
+            <a:pPr algn="ctr"/>
+            <a:endParaRPr lang="en-AU"/>
+          </a:p>
+        </p:txBody>
+      </p:sp>
+      <p:sp>
+        <p:nvSpPr>
+          <p:cNvPr id="7" name="Rectangle 6">
+            <a:extLst>
+              <a:ext uri="{FF2B5EF4-FFF2-40B4-BE49-F238E27FC236}">
+                <a16:creationId xmlns:a16="http://schemas.microsoft.com/office/drawing/2014/main" id="{143AF682-3AC2-40A9-81F5-D738DDAFFDAC}"/>
+              </a:ext>
+            </a:extLst>
+          </p:cNvPr>
+          <p:cNvSpPr/>
+          <p:nvPr/>
+        </p:nvSpPr>
+        <p:spPr>
+          <a:xfrm>
+            <a:off x="9158067" y="1893929"/>
+            <a:ext cx="3052689" cy="3070141"/>
+          </a:xfrm>
+          <a:prstGeom prst="rect">
+            <a:avLst/>
+          </a:prstGeom>
+          <a:solidFill>
+            <a:schemeClr val="tx1"/>
+          </a:solidFill>
+          <a:ln>
+            <a:solidFill>
+              <a:schemeClr val="tx1"/>
+            </a:solidFill>
+          </a:ln>
+        </p:spPr>
+        <p:style>
+          <a:lnRef idx="2">
+            <a:schemeClr val="accent1">
+              <a:shade val="50000"/>
+            </a:schemeClr>
+          </a:lnRef>
+          <a:fillRef idx="1">
+            <a:schemeClr val="accent1"/>
+          </a:fillRef>
+          <a:effectRef idx="0">
+            <a:schemeClr val="accent1"/>
+          </a:effectRef>
+          <a:fontRef idx="minor">
+            <a:schemeClr val="lt1"/>
+          </a:fontRef>
+        </p:style>
+        <p:txBody>
+          <a:bodyPr rtlCol="0" anchor="ctr"/>
+          <a:lstStyle/>
+          <a:p>
+            <a:pPr algn="ctr"/>
+            <a:endParaRPr lang="en-AU"/>
+          </a:p>
+        </p:txBody>
+      </p:sp>
+      <p:sp>
+        <p:nvSpPr>
+          <p:cNvPr id="2" name="TextBox 1">
+            <a:extLst>
+              <a:ext uri="{FF2B5EF4-FFF2-40B4-BE49-F238E27FC236}">
+                <a16:creationId xmlns:a16="http://schemas.microsoft.com/office/drawing/2014/main" id="{18956241-6ECA-4638-A022-7F1F07046C60}"/>
+              </a:ext>
+            </a:extLst>
+          </p:cNvPr>
+          <p:cNvSpPr txBox="1"/>
+          <p:nvPr/>
+        </p:nvSpPr>
+        <p:spPr>
+          <a:xfrm>
+            <a:off x="58512" y="1892200"/>
+            <a:ext cx="2994177" cy="369332"/>
+          </a:xfrm>
+          <a:prstGeom prst="rect">
+            <a:avLst/>
+          </a:prstGeom>
+          <a:noFill/>
+        </p:spPr>
+        <p:txBody>
+          <a:bodyPr wrap="square" rtlCol="0">
+            <a:spAutoFit/>
+          </a:bodyPr>
+          <a:lstStyle/>
+          <a:p>
+            <a:pPr algn="ctr"/>
+            <a:r>
+              <a:rPr lang="en-US" dirty="0"/>
+              <a:t>Feature nodes</a:t>
+            </a:r>
+            <a:endParaRPr lang="en-AU" dirty="0"/>
+          </a:p>
+        </p:txBody>
+      </p:sp>
+      <p:sp>
+        <p:nvSpPr>
+          <p:cNvPr id="8" name="TextBox 7">
+            <a:extLst>
+              <a:ext uri="{FF2B5EF4-FFF2-40B4-BE49-F238E27FC236}">
+                <a16:creationId xmlns:a16="http://schemas.microsoft.com/office/drawing/2014/main" id="{FE2FB319-DC1A-431D-A4D3-DD4AF778C27E}"/>
+              </a:ext>
+            </a:extLst>
+          </p:cNvPr>
+          <p:cNvSpPr txBox="1"/>
+          <p:nvPr/>
+        </p:nvSpPr>
+        <p:spPr>
+          <a:xfrm>
+            <a:off x="3079193" y="1918704"/>
+            <a:ext cx="3007429" cy="369332"/>
+          </a:xfrm>
+          <a:prstGeom prst="rect">
+            <a:avLst/>
+          </a:prstGeom>
+          <a:noFill/>
+        </p:spPr>
+        <p:txBody>
+          <a:bodyPr wrap="square" rtlCol="0">
+            <a:spAutoFit/>
+          </a:bodyPr>
+          <a:lstStyle/>
+          <a:p>
+            <a:pPr algn="ctr"/>
+            <a:r>
+              <a:rPr lang="en-US" dirty="0"/>
+              <a:t>Piecewise mask legs</a:t>
+            </a:r>
+            <a:endParaRPr lang="en-AU" dirty="0"/>
+          </a:p>
+        </p:txBody>
+      </p:sp>
+      <p:sp>
+        <p:nvSpPr>
+          <p:cNvPr id="9" name="TextBox 8">
+            <a:extLst>
+              <a:ext uri="{FF2B5EF4-FFF2-40B4-BE49-F238E27FC236}">
+                <a16:creationId xmlns:a16="http://schemas.microsoft.com/office/drawing/2014/main" id="{01C9712B-8C5D-46C3-81B9-8422B17FAF22}"/>
+              </a:ext>
+            </a:extLst>
+          </p:cNvPr>
+          <p:cNvSpPr txBox="1"/>
+          <p:nvPr/>
+        </p:nvSpPr>
+        <p:spPr>
+          <a:xfrm>
+            <a:off x="6163891" y="1905452"/>
+            <a:ext cx="2935664" cy="646331"/>
+          </a:xfrm>
+          <a:prstGeom prst="rect">
+            <a:avLst/>
+          </a:prstGeom>
+          <a:noFill/>
+        </p:spPr>
+        <p:txBody>
+          <a:bodyPr wrap="square" rtlCol="0">
+            <a:spAutoFit/>
+          </a:bodyPr>
+          <a:lstStyle/>
+          <a:p>
+            <a:pPr algn="ctr"/>
+            <a:r>
+              <a:rPr lang="en-US" dirty="0"/>
+              <a:t>Feature mask combined with IPM mask</a:t>
+            </a:r>
+            <a:endParaRPr lang="en-AU" dirty="0"/>
+          </a:p>
+        </p:txBody>
+      </p:sp>
+      <p:sp>
+        <p:nvSpPr>
+          <p:cNvPr id="10" name="TextBox 9">
+            <a:extLst>
+              <a:ext uri="{FF2B5EF4-FFF2-40B4-BE49-F238E27FC236}">
+                <a16:creationId xmlns:a16="http://schemas.microsoft.com/office/drawing/2014/main" id="{76C65483-387A-4EF6-93E0-2522430AC38A}"/>
+              </a:ext>
+            </a:extLst>
+          </p:cNvPr>
+          <p:cNvSpPr txBox="1"/>
+          <p:nvPr/>
+        </p:nvSpPr>
+        <p:spPr>
+          <a:xfrm>
+            <a:off x="9158067" y="1931304"/>
+            <a:ext cx="3033933" cy="369332"/>
+          </a:xfrm>
+          <a:prstGeom prst="rect">
+            <a:avLst/>
+          </a:prstGeom>
+          <a:noFill/>
+        </p:spPr>
+        <p:txBody>
+          <a:bodyPr wrap="square" rtlCol="0">
+            <a:spAutoFit/>
+          </a:bodyPr>
+          <a:lstStyle/>
+          <a:p>
+            <a:pPr algn="ctr"/>
+            <a:r>
+              <a:rPr lang="en-US" dirty="0">
+                <a:solidFill>
+                  <a:schemeClr val="bg1"/>
+                </a:solidFill>
+              </a:rPr>
+              <a:t>Resulting feature mask</a:t>
+            </a:r>
+            <a:endParaRPr lang="en-AU" dirty="0">
+              <a:solidFill>
+                <a:schemeClr val="bg1"/>
+              </a:solidFill>
+            </a:endParaRPr>
+          </a:p>
+        </p:txBody>
+      </p:sp>
+      <p:sp>
+        <p:nvSpPr>
+          <p:cNvPr id="11" name="Oval 10">
+            <a:extLst>
+              <a:ext uri="{FF2B5EF4-FFF2-40B4-BE49-F238E27FC236}">
+                <a16:creationId xmlns:a16="http://schemas.microsoft.com/office/drawing/2014/main" id="{E589E340-D546-4E43-BF6F-CBA828CF4197}"/>
+              </a:ext>
+            </a:extLst>
+          </p:cNvPr>
+          <p:cNvSpPr/>
+          <p:nvPr/>
+        </p:nvSpPr>
+        <p:spPr>
+          <a:xfrm>
+            <a:off x="1473336" y="3312219"/>
+            <a:ext cx="119269" cy="119269"/>
+          </a:xfrm>
+          <a:prstGeom prst="ellipse">
+            <a:avLst/>
+          </a:prstGeom>
+          <a:solidFill>
+            <a:schemeClr val="tx1"/>
+          </a:solidFill>
+          <a:ln>
+            <a:solidFill>
+              <a:schemeClr val="tx1"/>
+            </a:solidFill>
+          </a:ln>
+        </p:spPr>
+        <p:style>
+          <a:lnRef idx="2">
+            <a:schemeClr val="accent1">
+              <a:shade val="50000"/>
+            </a:schemeClr>
+          </a:lnRef>
+          <a:fillRef idx="1">
+            <a:schemeClr val="accent1"/>
+          </a:fillRef>
+          <a:effectRef idx="0">
+            <a:schemeClr val="accent1"/>
+          </a:effectRef>
+          <a:fontRef idx="minor">
+            <a:schemeClr val="lt1"/>
+          </a:fontRef>
+        </p:style>
+        <p:txBody>
+          <a:bodyPr rtlCol="0" anchor="ctr"/>
+          <a:lstStyle/>
+          <a:p>
+            <a:pPr algn="ctr"/>
+            <a:endParaRPr lang="en-AU"/>
+          </a:p>
+        </p:txBody>
+      </p:sp>
+      <p:sp>
+        <p:nvSpPr>
+          <p:cNvPr id="14" name="Oval 13">
+            <a:extLst>
+              <a:ext uri="{FF2B5EF4-FFF2-40B4-BE49-F238E27FC236}">
+                <a16:creationId xmlns:a16="http://schemas.microsoft.com/office/drawing/2014/main" id="{BB3BA2E1-FC13-4EE7-96DA-3B0660DFC13B}"/>
+              </a:ext>
+            </a:extLst>
+          </p:cNvPr>
+          <p:cNvSpPr/>
+          <p:nvPr/>
+        </p:nvSpPr>
+        <p:spPr>
+          <a:xfrm>
+            <a:off x="684831" y="3312219"/>
+            <a:ext cx="119269" cy="119269"/>
+          </a:xfrm>
+          <a:prstGeom prst="ellipse">
+            <a:avLst/>
+          </a:prstGeom>
+          <a:solidFill>
+            <a:schemeClr val="tx1"/>
+          </a:solidFill>
+          <a:ln>
+            <a:solidFill>
+              <a:schemeClr val="tx1"/>
+            </a:solidFill>
+          </a:ln>
+        </p:spPr>
+        <p:style>
+          <a:lnRef idx="2">
+            <a:schemeClr val="accent1">
+              <a:shade val="50000"/>
+            </a:schemeClr>
+          </a:lnRef>
+          <a:fillRef idx="1">
+            <a:schemeClr val="accent1"/>
+          </a:fillRef>
+          <a:effectRef idx="0">
+            <a:schemeClr val="accent1"/>
+          </a:effectRef>
+          <a:fontRef idx="minor">
+            <a:schemeClr val="lt1"/>
+          </a:fontRef>
+        </p:style>
+        <p:txBody>
+          <a:bodyPr rtlCol="0" anchor="ctr"/>
+          <a:lstStyle/>
+          <a:p>
+            <a:pPr algn="ctr"/>
+            <a:endParaRPr lang="en-AU"/>
+          </a:p>
+        </p:txBody>
+      </p:sp>
+      <p:sp>
+        <p:nvSpPr>
+          <p:cNvPr id="15" name="Oval 14">
+            <a:extLst>
+              <a:ext uri="{FF2B5EF4-FFF2-40B4-BE49-F238E27FC236}">
+                <a16:creationId xmlns:a16="http://schemas.microsoft.com/office/drawing/2014/main" id="{9DCE25CC-0313-49C8-85A5-DC87835653DA}"/>
+              </a:ext>
+            </a:extLst>
+          </p:cNvPr>
+          <p:cNvSpPr/>
+          <p:nvPr/>
+        </p:nvSpPr>
+        <p:spPr>
+          <a:xfrm>
+            <a:off x="1473336" y="4094097"/>
+            <a:ext cx="119269" cy="119269"/>
+          </a:xfrm>
+          <a:prstGeom prst="ellipse">
+            <a:avLst/>
+          </a:prstGeom>
+          <a:solidFill>
+            <a:schemeClr val="tx1"/>
+          </a:solidFill>
+          <a:ln>
+            <a:solidFill>
+              <a:schemeClr val="tx1"/>
+            </a:solidFill>
+          </a:ln>
+        </p:spPr>
+        <p:style>
+          <a:lnRef idx="2">
+            <a:schemeClr val="accent1">
+              <a:shade val="50000"/>
+            </a:schemeClr>
+          </a:lnRef>
+          <a:fillRef idx="1">
+            <a:schemeClr val="accent1"/>
+          </a:fillRef>
+          <a:effectRef idx="0">
+            <a:schemeClr val="accent1"/>
+          </a:effectRef>
+          <a:fontRef idx="minor">
+            <a:schemeClr val="lt1"/>
+          </a:fontRef>
+        </p:style>
+        <p:txBody>
+          <a:bodyPr rtlCol="0" anchor="ctr"/>
+          <a:lstStyle/>
+          <a:p>
+            <a:pPr algn="ctr"/>
+            <a:endParaRPr lang="en-AU"/>
+          </a:p>
+        </p:txBody>
+      </p:sp>
+      <p:sp>
+        <p:nvSpPr>
+          <p:cNvPr id="16" name="Oval 15">
+            <a:extLst>
+              <a:ext uri="{FF2B5EF4-FFF2-40B4-BE49-F238E27FC236}">
+                <a16:creationId xmlns:a16="http://schemas.microsoft.com/office/drawing/2014/main" id="{5FEA5E41-966D-4312-B6E3-5297C3B65DE6}"/>
+              </a:ext>
+            </a:extLst>
+          </p:cNvPr>
+          <p:cNvSpPr/>
+          <p:nvPr/>
+        </p:nvSpPr>
+        <p:spPr>
+          <a:xfrm>
+            <a:off x="2241961" y="3312219"/>
+            <a:ext cx="119269" cy="119269"/>
+          </a:xfrm>
+          <a:prstGeom prst="ellipse">
+            <a:avLst/>
+          </a:prstGeom>
+          <a:solidFill>
+            <a:schemeClr val="tx1"/>
+          </a:solidFill>
+          <a:ln>
+            <a:solidFill>
+              <a:schemeClr val="tx1"/>
+            </a:solidFill>
+          </a:ln>
+        </p:spPr>
+        <p:style>
+          <a:lnRef idx="2">
+            <a:schemeClr val="accent1">
+              <a:shade val="50000"/>
+            </a:schemeClr>
+          </a:lnRef>
+          <a:fillRef idx="1">
+            <a:schemeClr val="accent1"/>
+          </a:fillRef>
+          <a:effectRef idx="0">
+            <a:schemeClr val="accent1"/>
+          </a:effectRef>
+          <a:fontRef idx="minor">
+            <a:schemeClr val="lt1"/>
+          </a:fontRef>
+        </p:style>
+        <p:txBody>
+          <a:bodyPr rtlCol="0" anchor="ctr"/>
+          <a:lstStyle/>
+          <a:p>
+            <a:pPr algn="ctr"/>
+            <a:endParaRPr lang="en-AU"/>
+          </a:p>
+        </p:txBody>
+      </p:sp>
+      <p:sp>
+        <p:nvSpPr>
+          <p:cNvPr id="17" name="Oval 16">
+            <a:extLst>
+              <a:ext uri="{FF2B5EF4-FFF2-40B4-BE49-F238E27FC236}">
+                <a16:creationId xmlns:a16="http://schemas.microsoft.com/office/drawing/2014/main" id="{47A4C232-4F79-4F61-94FC-FE5585AE1604}"/>
+              </a:ext>
+            </a:extLst>
+          </p:cNvPr>
+          <p:cNvSpPr/>
+          <p:nvPr/>
+        </p:nvSpPr>
+        <p:spPr>
+          <a:xfrm>
+            <a:off x="4572407" y="3312219"/>
+            <a:ext cx="119269" cy="119269"/>
+          </a:xfrm>
+          <a:prstGeom prst="ellipse">
+            <a:avLst/>
+          </a:prstGeom>
+          <a:solidFill>
+            <a:schemeClr val="tx1"/>
+          </a:solidFill>
+          <a:ln>
+            <a:solidFill>
+              <a:schemeClr val="tx1"/>
+            </a:solidFill>
+          </a:ln>
+        </p:spPr>
+        <p:style>
+          <a:lnRef idx="2">
+            <a:schemeClr val="accent1">
+              <a:shade val="50000"/>
+            </a:schemeClr>
+          </a:lnRef>
+          <a:fillRef idx="1">
+            <a:schemeClr val="accent1"/>
+          </a:fillRef>
+          <a:effectRef idx="0">
+            <a:schemeClr val="accent1"/>
+          </a:effectRef>
+          <a:fontRef idx="minor">
+            <a:schemeClr val="lt1"/>
+          </a:fontRef>
+        </p:style>
+        <p:txBody>
+          <a:bodyPr rtlCol="0" anchor="ctr"/>
+          <a:lstStyle/>
+          <a:p>
+            <a:pPr algn="ctr"/>
+            <a:endParaRPr lang="en-AU"/>
+          </a:p>
+        </p:txBody>
+      </p:sp>
+      <p:sp>
+        <p:nvSpPr>
+          <p:cNvPr id="18" name="Oval 17">
+            <a:extLst>
+              <a:ext uri="{FF2B5EF4-FFF2-40B4-BE49-F238E27FC236}">
+                <a16:creationId xmlns:a16="http://schemas.microsoft.com/office/drawing/2014/main" id="{A7FC1188-3AE2-436C-B257-27627033105A}"/>
+              </a:ext>
+            </a:extLst>
+          </p:cNvPr>
+          <p:cNvSpPr/>
+          <p:nvPr/>
+        </p:nvSpPr>
+        <p:spPr>
+          <a:xfrm>
+            <a:off x="3783902" y="3312219"/>
+            <a:ext cx="119269" cy="119269"/>
+          </a:xfrm>
+          <a:prstGeom prst="ellipse">
+            <a:avLst/>
+          </a:prstGeom>
+          <a:solidFill>
+            <a:schemeClr val="tx1"/>
+          </a:solidFill>
+          <a:ln>
+            <a:solidFill>
+              <a:schemeClr val="tx1"/>
+            </a:solidFill>
+          </a:ln>
+        </p:spPr>
+        <p:style>
+          <a:lnRef idx="2">
+            <a:schemeClr val="accent1">
+              <a:shade val="50000"/>
+            </a:schemeClr>
+          </a:lnRef>
+          <a:fillRef idx="1">
+            <a:schemeClr val="accent1"/>
+          </a:fillRef>
+          <a:effectRef idx="0">
+            <a:schemeClr val="accent1"/>
+          </a:effectRef>
+          <a:fontRef idx="minor">
+            <a:schemeClr val="lt1"/>
+          </a:fontRef>
+        </p:style>
+        <p:txBody>
+          <a:bodyPr rtlCol="0" anchor="ctr"/>
+          <a:lstStyle/>
+          <a:p>
+            <a:pPr algn="ctr"/>
+            <a:endParaRPr lang="en-AU"/>
+          </a:p>
+        </p:txBody>
+      </p:sp>
+      <p:sp>
+        <p:nvSpPr>
+          <p:cNvPr id="19" name="Oval 18">
+            <a:extLst>
+              <a:ext uri="{FF2B5EF4-FFF2-40B4-BE49-F238E27FC236}">
+                <a16:creationId xmlns:a16="http://schemas.microsoft.com/office/drawing/2014/main" id="{2A6D2544-4F5E-40AD-B077-3FD62C6D513E}"/>
+              </a:ext>
+            </a:extLst>
+          </p:cNvPr>
+          <p:cNvSpPr/>
+          <p:nvPr/>
+        </p:nvSpPr>
+        <p:spPr>
+          <a:xfrm>
+            <a:off x="4572407" y="4094097"/>
+            <a:ext cx="119269" cy="119269"/>
+          </a:xfrm>
+          <a:prstGeom prst="ellipse">
+            <a:avLst/>
+          </a:prstGeom>
+          <a:solidFill>
+            <a:schemeClr val="tx1"/>
+          </a:solidFill>
+          <a:ln>
+            <a:solidFill>
+              <a:schemeClr val="tx1"/>
+            </a:solidFill>
+          </a:ln>
+        </p:spPr>
+        <p:style>
+          <a:lnRef idx="2">
+            <a:schemeClr val="accent1">
+              <a:shade val="50000"/>
+            </a:schemeClr>
+          </a:lnRef>
+          <a:fillRef idx="1">
+            <a:schemeClr val="accent1"/>
+          </a:fillRef>
+          <a:effectRef idx="0">
+            <a:schemeClr val="accent1"/>
+          </a:effectRef>
+          <a:fontRef idx="minor">
+            <a:schemeClr val="lt1"/>
+          </a:fontRef>
+        </p:style>
+        <p:txBody>
+          <a:bodyPr rtlCol="0" anchor="ctr"/>
+          <a:lstStyle/>
+          <a:p>
+            <a:pPr algn="ctr"/>
+            <a:endParaRPr lang="en-AU"/>
+          </a:p>
+        </p:txBody>
+      </p:sp>
+      <p:sp>
+        <p:nvSpPr>
+          <p:cNvPr id="20" name="Oval 19">
+            <a:extLst>
+              <a:ext uri="{FF2B5EF4-FFF2-40B4-BE49-F238E27FC236}">
+                <a16:creationId xmlns:a16="http://schemas.microsoft.com/office/drawing/2014/main" id="{0657FB61-0175-4F2D-93C1-0DAF5DB030A2}"/>
+              </a:ext>
+            </a:extLst>
+          </p:cNvPr>
+          <p:cNvSpPr/>
+          <p:nvPr/>
+        </p:nvSpPr>
+        <p:spPr>
+          <a:xfrm>
+            <a:off x="5341032" y="3312219"/>
+            <a:ext cx="119269" cy="119269"/>
+          </a:xfrm>
+          <a:prstGeom prst="ellipse">
+            <a:avLst/>
+          </a:prstGeom>
+          <a:solidFill>
+            <a:schemeClr val="tx1"/>
+          </a:solidFill>
+          <a:ln>
+            <a:solidFill>
+              <a:schemeClr val="tx1"/>
+            </a:solidFill>
+          </a:ln>
+        </p:spPr>
+        <p:style>
+          <a:lnRef idx="2">
+            <a:schemeClr val="accent1">
+              <a:shade val="50000"/>
+            </a:schemeClr>
+          </a:lnRef>
+          <a:fillRef idx="1">
+            <a:schemeClr val="accent1"/>
+          </a:fillRef>
+          <a:effectRef idx="0">
+            <a:schemeClr val="accent1"/>
+          </a:effectRef>
+          <a:fontRef idx="minor">
+            <a:schemeClr val="lt1"/>
+          </a:fontRef>
+        </p:style>
+        <p:txBody>
+          <a:bodyPr rtlCol="0" anchor="ctr"/>
+          <a:lstStyle/>
+          <a:p>
+            <a:pPr algn="ctr"/>
+            <a:endParaRPr lang="en-AU"/>
+          </a:p>
+        </p:txBody>
+      </p:sp>
+      <p:sp>
+        <p:nvSpPr>
+          <p:cNvPr id="22" name="Rectangle: Rounded Corners 21">
+            <a:extLst>
+              <a:ext uri="{FF2B5EF4-FFF2-40B4-BE49-F238E27FC236}">
+                <a16:creationId xmlns:a16="http://schemas.microsoft.com/office/drawing/2014/main" id="{3B8AB733-D1F3-4B39-838A-9CFC77264F54}"/>
+              </a:ext>
+            </a:extLst>
+          </p:cNvPr>
+          <p:cNvSpPr/>
+          <p:nvPr/>
+        </p:nvSpPr>
+        <p:spPr>
+          <a:xfrm rot="16200000">
+            <a:off x="4963346" y="2918791"/>
+            <a:ext cx="119269" cy="901147"/>
+          </a:xfrm>
+          <a:prstGeom prst="roundRect">
+            <a:avLst/>
+          </a:prstGeom>
+          <a:pattFill prst="wdUpDiag">
+            <a:fgClr>
+              <a:schemeClr val="tx1"/>
+            </a:fgClr>
+            <a:bgClr>
+              <a:schemeClr val="bg1"/>
+            </a:bgClr>
+          </a:pattFill>
+          <a:ln>
+            <a:solidFill>
+              <a:schemeClr val="tx1"/>
+            </a:solidFill>
+          </a:ln>
+        </p:spPr>
+        <p:style>
+          <a:lnRef idx="2">
+            <a:schemeClr val="accent1">
+              <a:shade val="50000"/>
+            </a:schemeClr>
+          </a:lnRef>
+          <a:fillRef idx="1">
+            <a:schemeClr val="accent1"/>
+          </a:fillRef>
+          <a:effectRef idx="0">
+            <a:schemeClr val="accent1"/>
+          </a:effectRef>
+          <a:fontRef idx="minor">
+            <a:schemeClr val="lt1"/>
+          </a:fontRef>
+        </p:style>
+        <p:txBody>
+          <a:bodyPr rtlCol="0" anchor="ctr"/>
+          <a:lstStyle/>
+          <a:p>
+            <a:pPr algn="ctr"/>
+            <a:endParaRPr lang="en-AU"/>
+          </a:p>
+        </p:txBody>
+      </p:sp>
+      <p:sp>
+        <p:nvSpPr>
+          <p:cNvPr id="23" name="Rectangle: Rounded Corners 22">
+            <a:extLst>
+              <a:ext uri="{FF2B5EF4-FFF2-40B4-BE49-F238E27FC236}">
+                <a16:creationId xmlns:a16="http://schemas.microsoft.com/office/drawing/2014/main" id="{FFF99B76-8497-46FC-BCD4-4E7FE354E340}"/>
+              </a:ext>
+            </a:extLst>
+          </p:cNvPr>
+          <p:cNvSpPr/>
+          <p:nvPr/>
+        </p:nvSpPr>
+        <p:spPr>
+          <a:xfrm rot="16200000">
+            <a:off x="4174841" y="2918791"/>
+            <a:ext cx="119269" cy="901147"/>
+          </a:xfrm>
+          <a:prstGeom prst="roundRect">
+            <a:avLst/>
+          </a:prstGeom>
+          <a:pattFill prst="wdDnDiag">
+            <a:fgClr>
+              <a:schemeClr val="tx1"/>
+            </a:fgClr>
+            <a:bgClr>
+              <a:schemeClr val="bg1"/>
+            </a:bgClr>
+          </a:pattFill>
+          <a:ln>
+            <a:solidFill>
+              <a:schemeClr val="tx1"/>
+            </a:solidFill>
+          </a:ln>
+        </p:spPr>
+        <p:style>
+          <a:lnRef idx="2">
+            <a:schemeClr val="accent1">
+              <a:shade val="50000"/>
+            </a:schemeClr>
+          </a:lnRef>
+          <a:fillRef idx="1">
+            <a:schemeClr val="accent1"/>
+          </a:fillRef>
+          <a:effectRef idx="0">
+            <a:schemeClr val="accent1"/>
+          </a:effectRef>
+          <a:fontRef idx="minor">
+            <a:schemeClr val="lt1"/>
+          </a:fontRef>
+        </p:style>
+        <p:txBody>
+          <a:bodyPr rtlCol="0" anchor="ctr"/>
+          <a:lstStyle/>
+          <a:p>
+            <a:pPr algn="ctr"/>
+            <a:endParaRPr lang="en-AU"/>
+          </a:p>
+        </p:txBody>
+      </p:sp>
+      <p:sp>
+        <p:nvSpPr>
+          <p:cNvPr id="21" name="Rectangle: Rounded Corners 20">
+            <a:extLst>
+              <a:ext uri="{FF2B5EF4-FFF2-40B4-BE49-F238E27FC236}">
+                <a16:creationId xmlns:a16="http://schemas.microsoft.com/office/drawing/2014/main" id="{2B47A6BE-B388-4640-8805-D7B0570E2162}"/>
+              </a:ext>
+            </a:extLst>
+          </p:cNvPr>
+          <p:cNvSpPr/>
+          <p:nvPr/>
+        </p:nvSpPr>
+        <p:spPr>
+          <a:xfrm>
+            <a:off x="4572407" y="3312219"/>
+            <a:ext cx="119269" cy="901147"/>
+          </a:xfrm>
+          <a:prstGeom prst="roundRect">
+            <a:avLst/>
+          </a:prstGeom>
+          <a:pattFill prst="dkVert">
+            <a:fgClr>
+              <a:schemeClr val="tx1"/>
+            </a:fgClr>
+            <a:bgClr>
+              <a:schemeClr val="bg1"/>
+            </a:bgClr>
+          </a:pattFill>
+          <a:ln>
+            <a:solidFill>
+              <a:schemeClr val="tx1"/>
+            </a:solidFill>
+          </a:ln>
+        </p:spPr>
+        <p:style>
+          <a:lnRef idx="2">
+            <a:schemeClr val="accent1">
+              <a:shade val="50000"/>
+            </a:schemeClr>
+          </a:lnRef>
+          <a:fillRef idx="1">
+            <a:schemeClr val="accent1"/>
+          </a:fillRef>
+          <a:effectRef idx="0">
+            <a:schemeClr val="accent1"/>
+          </a:effectRef>
+          <a:fontRef idx="minor">
+            <a:schemeClr val="lt1"/>
+          </a:fontRef>
+        </p:style>
+        <p:txBody>
+          <a:bodyPr rtlCol="0" anchor="ctr"/>
+          <a:lstStyle/>
+          <a:p>
+            <a:pPr algn="ctr"/>
+            <a:endParaRPr lang="en-AU"/>
+          </a:p>
+        </p:txBody>
+      </p:sp>
+      <p:sp>
+        <p:nvSpPr>
+          <p:cNvPr id="24" name="Rectangle: Rounded Corners 23">
+            <a:extLst>
+              <a:ext uri="{FF2B5EF4-FFF2-40B4-BE49-F238E27FC236}">
+                <a16:creationId xmlns:a16="http://schemas.microsoft.com/office/drawing/2014/main" id="{14E1E89F-5D48-42F4-BD70-8D803D4E1767}"/>
+              </a:ext>
+            </a:extLst>
+          </p:cNvPr>
+          <p:cNvSpPr/>
+          <p:nvPr/>
+        </p:nvSpPr>
+        <p:spPr>
+          <a:xfrm rot="16200000">
+            <a:off x="7956401" y="2918791"/>
+            <a:ext cx="119269" cy="901147"/>
+          </a:xfrm>
+          <a:prstGeom prst="roundRect">
+            <a:avLst/>
+          </a:prstGeom>
+          <a:pattFill prst="wdUpDiag">
+            <a:fgClr>
+              <a:schemeClr val="tx1"/>
+            </a:fgClr>
+            <a:bgClr>
+              <a:schemeClr val="bg1"/>
+            </a:bgClr>
+          </a:pattFill>
+          <a:ln>
+            <a:solidFill>
+              <a:schemeClr val="tx1"/>
+            </a:solidFill>
+          </a:ln>
+        </p:spPr>
+        <p:style>
+          <a:lnRef idx="2">
+            <a:schemeClr val="accent1">
+              <a:shade val="50000"/>
+            </a:schemeClr>
+          </a:lnRef>
+          <a:fillRef idx="1">
+            <a:schemeClr val="accent1"/>
+          </a:fillRef>
+          <a:effectRef idx="0">
+            <a:schemeClr val="accent1"/>
+          </a:effectRef>
+          <a:fontRef idx="minor">
+            <a:schemeClr val="lt1"/>
+          </a:fontRef>
+        </p:style>
+        <p:txBody>
+          <a:bodyPr rtlCol="0" anchor="ctr"/>
+          <a:lstStyle/>
+          <a:p>
+            <a:pPr algn="ctr"/>
+            <a:endParaRPr lang="en-AU"/>
+          </a:p>
+        </p:txBody>
+      </p:sp>
+      <p:sp>
+        <p:nvSpPr>
+          <p:cNvPr id="25" name="Rectangle: Rounded Corners 24">
+            <a:extLst>
+              <a:ext uri="{FF2B5EF4-FFF2-40B4-BE49-F238E27FC236}">
+                <a16:creationId xmlns:a16="http://schemas.microsoft.com/office/drawing/2014/main" id="{EB2425FD-14AF-4E8F-8B53-C70F84DC46FD}"/>
+              </a:ext>
+            </a:extLst>
+          </p:cNvPr>
+          <p:cNvSpPr/>
+          <p:nvPr/>
+        </p:nvSpPr>
+        <p:spPr>
+          <a:xfrm rot="16200000">
+            <a:off x="7167896" y="2918791"/>
+            <a:ext cx="119269" cy="901147"/>
+          </a:xfrm>
+          <a:prstGeom prst="roundRect">
+            <a:avLst/>
+          </a:prstGeom>
+          <a:pattFill prst="wdDnDiag">
+            <a:fgClr>
+              <a:schemeClr val="tx1"/>
+            </a:fgClr>
+            <a:bgClr>
+              <a:schemeClr val="bg1"/>
+            </a:bgClr>
+          </a:pattFill>
+          <a:ln>
+            <a:solidFill>
+              <a:schemeClr val="tx1"/>
+            </a:solidFill>
+          </a:ln>
+        </p:spPr>
+        <p:style>
+          <a:lnRef idx="2">
+            <a:schemeClr val="accent1">
+              <a:shade val="50000"/>
+            </a:schemeClr>
+          </a:lnRef>
+          <a:fillRef idx="1">
+            <a:schemeClr val="accent1"/>
+          </a:fillRef>
+          <a:effectRef idx="0">
+            <a:schemeClr val="accent1"/>
+          </a:effectRef>
+          <a:fontRef idx="minor">
+            <a:schemeClr val="lt1"/>
+          </a:fontRef>
+        </p:style>
+        <p:txBody>
+          <a:bodyPr rtlCol="0" anchor="ctr"/>
+          <a:lstStyle/>
+          <a:p>
+            <a:pPr algn="ctr"/>
+            <a:endParaRPr lang="en-AU"/>
+          </a:p>
+        </p:txBody>
+      </p:sp>
+      <p:sp>
+        <p:nvSpPr>
+          <p:cNvPr id="26" name="Rectangle: Rounded Corners 25">
+            <a:extLst>
+              <a:ext uri="{FF2B5EF4-FFF2-40B4-BE49-F238E27FC236}">
+                <a16:creationId xmlns:a16="http://schemas.microsoft.com/office/drawing/2014/main" id="{370145B0-78E6-41EE-A745-BA4D7E25284C}"/>
+              </a:ext>
+            </a:extLst>
+          </p:cNvPr>
+          <p:cNvSpPr/>
+          <p:nvPr/>
+        </p:nvSpPr>
+        <p:spPr>
+          <a:xfrm>
+            <a:off x="7565462" y="3312219"/>
+            <a:ext cx="119269" cy="901147"/>
+          </a:xfrm>
+          <a:prstGeom prst="roundRect">
+            <a:avLst/>
+          </a:prstGeom>
+          <a:pattFill prst="dkVert">
+            <a:fgClr>
+              <a:schemeClr val="tx1"/>
+            </a:fgClr>
+            <a:bgClr>
+              <a:schemeClr val="bg1"/>
+            </a:bgClr>
+          </a:pattFill>
+          <a:ln>
+            <a:solidFill>
+              <a:schemeClr val="tx1"/>
+            </a:solidFill>
+          </a:ln>
+        </p:spPr>
+        <p:style>
+          <a:lnRef idx="2">
+            <a:schemeClr val="accent1">
+              <a:shade val="50000"/>
+            </a:schemeClr>
+          </a:lnRef>
+          <a:fillRef idx="1">
+            <a:schemeClr val="accent1"/>
+          </a:fillRef>
+          <a:effectRef idx="0">
+            <a:schemeClr val="accent1"/>
+          </a:effectRef>
+          <a:fontRef idx="minor">
+            <a:schemeClr val="lt1"/>
+          </a:fontRef>
+        </p:style>
+        <p:txBody>
+          <a:bodyPr rtlCol="0" anchor="ctr"/>
+          <a:lstStyle/>
+          <a:p>
+            <a:pPr algn="ctr"/>
+            <a:endParaRPr lang="en-AU"/>
+          </a:p>
+        </p:txBody>
+      </p:sp>
+      <p:sp>
+        <p:nvSpPr>
+          <p:cNvPr id="34" name="Rectangle: Rounded Corners 33">
+            <a:extLst>
+              <a:ext uri="{FF2B5EF4-FFF2-40B4-BE49-F238E27FC236}">
+                <a16:creationId xmlns:a16="http://schemas.microsoft.com/office/drawing/2014/main" id="{E8418934-A38D-45A4-8C13-450E0C9B4FF8}"/>
+              </a:ext>
+            </a:extLst>
+          </p:cNvPr>
+          <p:cNvSpPr/>
+          <p:nvPr/>
+        </p:nvSpPr>
+        <p:spPr>
+          <a:xfrm rot="16200000">
+            <a:off x="11009384" y="2918791"/>
+            <a:ext cx="119269" cy="901147"/>
+          </a:xfrm>
+          <a:prstGeom prst="roundRect">
+            <a:avLst/>
+          </a:prstGeom>
+          <a:solidFill>
+            <a:schemeClr val="bg1"/>
+          </a:solidFill>
+          <a:ln>
+            <a:noFill/>
+          </a:ln>
+        </p:spPr>
+        <p:style>
+          <a:lnRef idx="2">
+            <a:schemeClr val="accent1">
+              <a:shade val="50000"/>
+            </a:schemeClr>
+          </a:lnRef>
+          <a:fillRef idx="1">
+            <a:schemeClr val="accent1"/>
+          </a:fillRef>
+          <a:effectRef idx="0">
+            <a:schemeClr val="accent1"/>
+          </a:effectRef>
+          <a:fontRef idx="minor">
+            <a:schemeClr val="lt1"/>
+          </a:fontRef>
+        </p:style>
+        <p:txBody>
+          <a:bodyPr rtlCol="0" anchor="ctr"/>
+          <a:lstStyle/>
+          <a:p>
+            <a:pPr algn="ctr"/>
+            <a:endParaRPr lang="en-AU"/>
+          </a:p>
+        </p:txBody>
+      </p:sp>
+      <p:sp>
+        <p:nvSpPr>
+          <p:cNvPr id="35" name="Rectangle: Rounded Corners 34">
+            <a:extLst>
+              <a:ext uri="{FF2B5EF4-FFF2-40B4-BE49-F238E27FC236}">
+                <a16:creationId xmlns:a16="http://schemas.microsoft.com/office/drawing/2014/main" id="{EBF227D5-DA38-41AA-BD52-E63C0C8E01E7}"/>
+              </a:ext>
+            </a:extLst>
+          </p:cNvPr>
+          <p:cNvSpPr/>
+          <p:nvPr/>
+        </p:nvSpPr>
+        <p:spPr>
+          <a:xfrm rot="16200000">
+            <a:off x="10220879" y="2918791"/>
+            <a:ext cx="119269" cy="901147"/>
+          </a:xfrm>
+          <a:prstGeom prst="roundRect">
+            <a:avLst/>
+          </a:prstGeom>
+          <a:solidFill>
+            <a:schemeClr val="bg1"/>
+          </a:solidFill>
+          <a:ln>
+            <a:noFill/>
+          </a:ln>
+        </p:spPr>
+        <p:style>
+          <a:lnRef idx="2">
+            <a:schemeClr val="accent1">
+              <a:shade val="50000"/>
+            </a:schemeClr>
+          </a:lnRef>
+          <a:fillRef idx="1">
+            <a:schemeClr val="accent1"/>
+          </a:fillRef>
+          <a:effectRef idx="0">
+            <a:schemeClr val="accent1"/>
+          </a:effectRef>
+          <a:fontRef idx="minor">
+            <a:schemeClr val="lt1"/>
+          </a:fontRef>
+        </p:style>
+        <p:txBody>
+          <a:bodyPr rtlCol="0" anchor="ctr"/>
+          <a:lstStyle/>
+          <a:p>
+            <a:pPr algn="ctr"/>
+            <a:endParaRPr lang="en-AU"/>
+          </a:p>
+        </p:txBody>
+      </p:sp>
+      <p:sp>
+        <p:nvSpPr>
+          <p:cNvPr id="36" name="Rectangle: Rounded Corners 35">
+            <a:extLst>
+              <a:ext uri="{FF2B5EF4-FFF2-40B4-BE49-F238E27FC236}">
+                <a16:creationId xmlns:a16="http://schemas.microsoft.com/office/drawing/2014/main" id="{96CA9C4B-812C-4EB0-9CE8-8CAFFBD50248}"/>
+              </a:ext>
+            </a:extLst>
+          </p:cNvPr>
+          <p:cNvSpPr/>
+          <p:nvPr/>
+        </p:nvSpPr>
+        <p:spPr>
+          <a:xfrm>
+            <a:off x="10618445" y="3312219"/>
+            <a:ext cx="119269" cy="901147"/>
+          </a:xfrm>
+          <a:prstGeom prst="roundRect">
+            <a:avLst/>
+          </a:prstGeom>
+          <a:solidFill>
+            <a:schemeClr val="bg1"/>
+          </a:solidFill>
+          <a:ln>
+            <a:noFill/>
+          </a:ln>
+        </p:spPr>
+        <p:style>
+          <a:lnRef idx="2">
+            <a:schemeClr val="accent1">
+              <a:shade val="50000"/>
+            </a:schemeClr>
+          </a:lnRef>
+          <a:fillRef idx="1">
+            <a:schemeClr val="accent1"/>
+          </a:fillRef>
+          <a:effectRef idx="0">
+            <a:schemeClr val="accent1"/>
+          </a:effectRef>
+          <a:fontRef idx="minor">
+            <a:schemeClr val="lt1"/>
+          </a:fontRef>
+        </p:style>
+        <p:txBody>
+          <a:bodyPr rtlCol="0" anchor="ctr"/>
+          <a:lstStyle/>
+          <a:p>
+            <a:pPr algn="ctr"/>
+            <a:endParaRPr lang="en-AU"/>
+          </a:p>
+        </p:txBody>
+      </p:sp>
+      <p:sp>
+        <p:nvSpPr>
+          <p:cNvPr id="37" name="Isosceles Triangle 36">
+            <a:extLst>
+              <a:ext uri="{FF2B5EF4-FFF2-40B4-BE49-F238E27FC236}">
+                <a16:creationId xmlns:a16="http://schemas.microsoft.com/office/drawing/2014/main" id="{B382E13C-186A-4068-9386-F3DA36885E50}"/>
+              </a:ext>
+            </a:extLst>
+          </p:cNvPr>
+          <p:cNvSpPr/>
+          <p:nvPr/>
+        </p:nvSpPr>
+        <p:spPr>
+          <a:xfrm>
+            <a:off x="10640273" y="1758950"/>
+            <a:ext cx="1551727" cy="3184894"/>
+          </a:xfrm>
+          <a:prstGeom prst="triangle">
+            <a:avLst>
+              <a:gd name="adj" fmla="val 100000"/>
+            </a:avLst>
+          </a:prstGeom>
+          <a:solidFill>
+            <a:schemeClr val="tx1"/>
+          </a:solidFill>
+          <a:ln>
+            <a:noFill/>
+          </a:ln>
+        </p:spPr>
+        <p:style>
+          <a:lnRef idx="2">
+            <a:schemeClr val="accent1">
+              <a:shade val="50000"/>
+            </a:schemeClr>
+          </a:lnRef>
+          <a:fillRef idx="1">
+            <a:schemeClr val="accent1"/>
+          </a:fillRef>
+          <a:effectRef idx="0">
+            <a:schemeClr val="accent1"/>
+          </a:effectRef>
+          <a:fontRef idx="minor">
+            <a:schemeClr val="lt1"/>
+          </a:fontRef>
+        </p:style>
+        <p:txBody>
+          <a:bodyPr rtlCol="0" anchor="ctr"/>
+          <a:lstStyle/>
+          <a:p>
+            <a:pPr algn="ctr"/>
+            <a:endParaRPr lang="en-AU"/>
+          </a:p>
+        </p:txBody>
+      </p:sp>
+      <p:sp>
+        <p:nvSpPr>
+          <p:cNvPr id="38" name="Isosceles Triangle 37">
+            <a:extLst>
+              <a:ext uri="{FF2B5EF4-FFF2-40B4-BE49-F238E27FC236}">
+                <a16:creationId xmlns:a16="http://schemas.microsoft.com/office/drawing/2014/main" id="{3C8A9B42-A258-437C-A59B-895FD3007C91}"/>
+              </a:ext>
+            </a:extLst>
+          </p:cNvPr>
+          <p:cNvSpPr/>
+          <p:nvPr/>
+        </p:nvSpPr>
+        <p:spPr>
+          <a:xfrm flipH="1">
+            <a:off x="9198054" y="1758950"/>
+            <a:ext cx="1551727" cy="3184894"/>
+          </a:xfrm>
+          <a:prstGeom prst="triangle">
+            <a:avLst>
+              <a:gd name="adj" fmla="val 100000"/>
+            </a:avLst>
+          </a:prstGeom>
+          <a:solidFill>
+            <a:schemeClr val="tx1"/>
+          </a:solidFill>
+          <a:ln>
+            <a:noFill/>
+          </a:ln>
+        </p:spPr>
+        <p:style>
+          <a:lnRef idx="2">
+            <a:schemeClr val="accent1">
+              <a:shade val="50000"/>
+            </a:schemeClr>
+          </a:lnRef>
+          <a:fillRef idx="1">
+            <a:schemeClr val="accent1"/>
+          </a:fillRef>
+          <a:effectRef idx="0">
+            <a:schemeClr val="accent1"/>
+          </a:effectRef>
+          <a:fontRef idx="minor">
+            <a:schemeClr val="lt1"/>
+          </a:fontRef>
+        </p:style>
+        <p:txBody>
+          <a:bodyPr rtlCol="0" anchor="ctr"/>
+          <a:lstStyle/>
+          <a:p>
+            <a:pPr algn="ctr"/>
+            <a:endParaRPr lang="en-AU"/>
+          </a:p>
+        </p:txBody>
+      </p:sp>
+      <p:sp>
+        <p:nvSpPr>
+          <p:cNvPr id="39" name="Rectangle 38">
+            <a:extLst>
+              <a:ext uri="{FF2B5EF4-FFF2-40B4-BE49-F238E27FC236}">
+                <a16:creationId xmlns:a16="http://schemas.microsoft.com/office/drawing/2014/main" id="{6F42797E-E7D5-45AE-BBAC-E39B60902C22}"/>
+              </a:ext>
+            </a:extLst>
+          </p:cNvPr>
+          <p:cNvSpPr/>
+          <p:nvPr/>
+        </p:nvSpPr>
+        <p:spPr>
+          <a:xfrm>
+            <a:off x="9029704" y="1758950"/>
+            <a:ext cx="3162296" cy="127453"/>
+          </a:xfrm>
+          <a:prstGeom prst="rect">
+            <a:avLst/>
+          </a:prstGeom>
+          <a:solidFill>
+            <a:schemeClr val="bg1"/>
+          </a:solidFill>
+          <a:ln>
+            <a:noFill/>
+          </a:ln>
+        </p:spPr>
+        <p:style>
+          <a:lnRef idx="2">
+            <a:schemeClr val="accent1">
+              <a:shade val="50000"/>
+            </a:schemeClr>
+          </a:lnRef>
+          <a:fillRef idx="1">
+            <a:schemeClr val="accent1"/>
+          </a:fillRef>
+          <a:effectRef idx="0">
+            <a:schemeClr val="accent1"/>
+          </a:effectRef>
+          <a:fontRef idx="minor">
+            <a:schemeClr val="lt1"/>
+          </a:fontRef>
+        </p:style>
+        <p:txBody>
+          <a:bodyPr rtlCol="0" anchor="ctr"/>
+          <a:lstStyle/>
+          <a:p>
+            <a:pPr algn="ctr"/>
+            <a:endParaRPr lang="en-AU"/>
+          </a:p>
+        </p:txBody>
+      </p:sp>
+    </p:spTree>
+    <p:extLst>
+      <p:ext uri="{BB962C8B-B14F-4D97-AF65-F5344CB8AC3E}">
+        <p14:creationId xmlns:p14="http://schemas.microsoft.com/office/powerpoint/2010/main" val="1211732685"/>
+      </p:ext>
+    </p:extLst>
+  </p:cSld>
+  <p:clrMapOvr>
+    <a:masterClrMapping/>
+  </p:clrMapOvr>
+</p:sld>
+</file>
+
+<file path=ppt/slides/slide4.xml><?xml version="1.0" encoding="utf-8"?>
+<p:sld xmlns:a="http://schemas.openxmlformats.org/drawingml/2006/main" xmlns:r="http://schemas.openxmlformats.org/officeDocument/2006/relationships" xmlns:p="http://schemas.openxmlformats.org/presentationml/2006/main">
+  <p:cSld>
+    <p:spTree>
+      <p:nvGrpSpPr>
+        <p:cNvPr id="1" name=""/>
+        <p:cNvGrpSpPr/>
+        <p:nvPr/>
+      </p:nvGrpSpPr>
+      <p:grpSpPr>
+        <a:xfrm>
+          <a:off x="0" y="0"/>
+          <a:ext cx="0" cy="0"/>
+          <a:chOff x="0" y="0"/>
+          <a:chExt cx="0" cy="0"/>
+        </a:xfrm>
+      </p:grpSpPr>
       <p:pic>
         <p:nvPicPr>
           <p:cNvPr id="5" name="Picture 4">
@@ -7168,7 +8727,7 @@
 </p:sld>
 </file>
 
-<file path=ppt/slides/slide4.xml><?xml version="1.0" encoding="utf-8"?>
+<file path=ppt/slides/slide5.xml><?xml version="1.0" encoding="utf-8"?>
 <p:sld xmlns:a="http://schemas.openxmlformats.org/drawingml/2006/main" xmlns:r="http://schemas.openxmlformats.org/officeDocument/2006/relationships" xmlns:p="http://schemas.openxmlformats.org/presentationml/2006/main">
   <p:cSld>
     <p:spTree>
@@ -7543,7 +9102,7 @@
 </p:sld>
 </file>
 
-<file path=ppt/slides/slide5.xml><?xml version="1.0" encoding="utf-8"?>
+<file path=ppt/slides/slide6.xml><?xml version="1.0" encoding="utf-8"?>
 <p:sld xmlns:a="http://schemas.openxmlformats.org/drawingml/2006/main" xmlns:r="http://schemas.openxmlformats.org/officeDocument/2006/relationships" xmlns:p="http://schemas.openxmlformats.org/presentationml/2006/main">
   <p:cSld>
     <p:spTree>

</xml_diff>

<commit_message>
Updated mask visual in system overview image
</commit_message>
<xml_diff>
--- a/Docs/Final/systemOverview.pptx
+++ b/Docs/Final/systemOverview.pptx
@@ -4503,10 +4503,10 @@
       </p:pic>
       <p:grpSp>
         <p:nvGrpSpPr>
-          <p:cNvPr id="64" name="Group 63">
-            <a:extLst>
-              <a:ext uri="{FF2B5EF4-FFF2-40B4-BE49-F238E27FC236}">
-                <a16:creationId xmlns:a16="http://schemas.microsoft.com/office/drawing/2014/main" id="{A1059A24-91A1-4768-8024-A7CE14A6757A}"/>
+          <p:cNvPr id="5" name="Group 4">
+            <a:extLst>
+              <a:ext uri="{FF2B5EF4-FFF2-40B4-BE49-F238E27FC236}">
+                <a16:creationId xmlns:a16="http://schemas.microsoft.com/office/drawing/2014/main" id="{D06D57C7-6A2C-49AB-89CD-2BC56168220C}"/>
               </a:ext>
             </a:extLst>
           </p:cNvPr>
@@ -4517,8 +4517,8 @@
           <a:xfrm>
             <a:off x="5350062" y="1441410"/>
             <a:ext cx="1153133" cy="914426"/>
-            <a:chOff x="5194851" y="1416978"/>
-            <a:chExt cx="1630017" cy="1292592"/>
+            <a:chOff x="5350062" y="1441410"/>
+            <a:chExt cx="1153133" cy="914426"/>
           </a:xfrm>
         </p:grpSpPr>
         <p:sp>
@@ -4535,8 +4535,8 @@
           </p:nvSpPr>
           <p:spPr>
             <a:xfrm>
-              <a:off x="5194851" y="1416978"/>
-              <a:ext cx="1630017" cy="1292592"/>
+              <a:off x="5350062" y="1441410"/>
+              <a:ext cx="1153133" cy="914426"/>
             </a:xfrm>
             <a:prstGeom prst="rect">
               <a:avLst/>
@@ -4587,8 +4587,8 @@
           </p:nvSpPr>
           <p:spPr>
             <a:xfrm rot="340870">
-              <a:off x="5574930" y="1644532"/>
-              <a:ext cx="958391" cy="185439"/>
+              <a:off x="5718403" y="1746541"/>
+              <a:ext cx="435546" cy="45719"/>
             </a:xfrm>
             <a:prstGeom prst="rect">
               <a:avLst/>
@@ -4639,8 +4639,8 @@
           </p:nvSpPr>
           <p:spPr>
             <a:xfrm rot="5400000">
-              <a:off x="5636992" y="1986965"/>
-              <a:ext cx="746285" cy="198583"/>
+              <a:off x="5769393" y="1895458"/>
+              <a:ext cx="318282" cy="45719"/>
             </a:xfrm>
             <a:prstGeom prst="rect">
               <a:avLst/>
@@ -4720,12 +4720,260 @@
           </a:fontRef>
         </p:style>
       </p:cxnSp>
+      <p:cxnSp>
+        <p:nvCxnSpPr>
+          <p:cNvPr id="47" name="Straight Arrow Connector 46">
+            <a:extLst>
+              <a:ext uri="{FF2B5EF4-FFF2-40B4-BE49-F238E27FC236}">
+                <a16:creationId xmlns:a16="http://schemas.microsoft.com/office/drawing/2014/main" id="{F778086B-7E67-4FDC-B203-62FA5A529318}"/>
+              </a:ext>
+            </a:extLst>
+          </p:cNvPr>
+          <p:cNvCxnSpPr/>
+          <p:nvPr/>
+        </p:nvCxnSpPr>
+        <p:spPr>
+          <a:xfrm>
+            <a:off x="4784032" y="551896"/>
+            <a:ext cx="530087" cy="0"/>
+          </a:xfrm>
+          <a:prstGeom prst="straightConnector1">
+            <a:avLst/>
+          </a:prstGeom>
+          <a:ln>
+            <a:solidFill>
+              <a:schemeClr val="tx1"/>
+            </a:solidFill>
+            <a:tailEnd type="triangle"/>
+          </a:ln>
+        </p:spPr>
+        <p:style>
+          <a:lnRef idx="1">
+            <a:schemeClr val="accent1"/>
+          </a:lnRef>
+          <a:fillRef idx="0">
+            <a:schemeClr val="accent1"/>
+          </a:fillRef>
+          <a:effectRef idx="0">
+            <a:schemeClr val="accent1"/>
+          </a:effectRef>
+          <a:fontRef idx="minor">
+            <a:schemeClr val="tx1"/>
+          </a:fontRef>
+        </p:style>
+      </p:cxnSp>
+      <p:sp>
+        <p:nvSpPr>
+          <p:cNvPr id="37" name="Right Brace 36">
+            <a:extLst>
+              <a:ext uri="{FF2B5EF4-FFF2-40B4-BE49-F238E27FC236}">
+                <a16:creationId xmlns:a16="http://schemas.microsoft.com/office/drawing/2014/main" id="{866CF1A3-A2FC-4006-8943-B29AE9401BF3}"/>
+              </a:ext>
+            </a:extLst>
+          </p:cNvPr>
+          <p:cNvSpPr/>
+          <p:nvPr/>
+        </p:nvSpPr>
+        <p:spPr>
+          <a:xfrm>
+            <a:off x="6773645" y="138348"/>
+            <a:ext cx="482495" cy="2249734"/>
+          </a:xfrm>
+          <a:prstGeom prst="rightBrace">
+            <a:avLst/>
+          </a:prstGeom>
+          <a:ln w="28575">
+            <a:solidFill>
+              <a:schemeClr val="tx1"/>
+            </a:solidFill>
+          </a:ln>
+        </p:spPr>
+        <p:style>
+          <a:lnRef idx="1">
+            <a:schemeClr val="accent1"/>
+          </a:lnRef>
+          <a:fillRef idx="0">
+            <a:schemeClr val="accent1"/>
+          </a:fillRef>
+          <a:effectRef idx="0">
+            <a:schemeClr val="accent1"/>
+          </a:effectRef>
+          <a:fontRef idx="minor">
+            <a:schemeClr val="tx1"/>
+          </a:fontRef>
+        </p:style>
+        <p:txBody>
+          <a:bodyPr rtlCol="0" anchor="ctr"/>
+          <a:lstStyle/>
+          <a:p>
+            <a:pPr algn="ctr"/>
+            <a:endParaRPr lang="en-AU"/>
+          </a:p>
+        </p:txBody>
+      </p:sp>
+      <p:cxnSp>
+        <p:nvCxnSpPr>
+          <p:cNvPr id="42" name="Straight Arrow Connector 41">
+            <a:extLst>
+              <a:ext uri="{FF2B5EF4-FFF2-40B4-BE49-F238E27FC236}">
+                <a16:creationId xmlns:a16="http://schemas.microsoft.com/office/drawing/2014/main" id="{EB55AAEC-2200-44EC-985D-DC06468317ED}"/>
+              </a:ext>
+            </a:extLst>
+          </p:cNvPr>
+          <p:cNvCxnSpPr>
+            <a:cxnSpLocks/>
+          </p:cNvCxnSpPr>
+          <p:nvPr/>
+        </p:nvCxnSpPr>
+        <p:spPr>
+          <a:xfrm>
+            <a:off x="8338524" y="2036138"/>
+            <a:ext cx="0" cy="673432"/>
+          </a:xfrm>
+          <a:prstGeom prst="straightConnector1">
+            <a:avLst/>
+          </a:prstGeom>
+          <a:ln>
+            <a:solidFill>
+              <a:schemeClr val="tx1"/>
+            </a:solidFill>
+            <a:tailEnd type="triangle"/>
+          </a:ln>
+        </p:spPr>
+        <p:style>
+          <a:lnRef idx="1">
+            <a:schemeClr val="accent1"/>
+          </a:lnRef>
+          <a:fillRef idx="0">
+            <a:schemeClr val="accent1"/>
+          </a:fillRef>
+          <a:effectRef idx="0">
+            <a:schemeClr val="accent1"/>
+          </a:effectRef>
+          <a:fontRef idx="minor">
+            <a:schemeClr val="tx1"/>
+          </a:fontRef>
+        </p:style>
+      </p:cxnSp>
+      <p:cxnSp>
+        <p:nvCxnSpPr>
+          <p:cNvPr id="57" name="Straight Arrow Connector 56">
+            <a:extLst>
+              <a:ext uri="{FF2B5EF4-FFF2-40B4-BE49-F238E27FC236}">
+                <a16:creationId xmlns:a16="http://schemas.microsoft.com/office/drawing/2014/main" id="{48ADF1AA-DB11-43A3-BCAC-5973EEB38072}"/>
+              </a:ext>
+            </a:extLst>
+          </p:cNvPr>
+          <p:cNvCxnSpPr/>
+          <p:nvPr/>
+        </p:nvCxnSpPr>
+        <p:spPr>
+          <a:xfrm>
+            <a:off x="10542103" y="2192309"/>
+            <a:ext cx="0" cy="517261"/>
+          </a:xfrm>
+          <a:prstGeom prst="straightConnector1">
+            <a:avLst/>
+          </a:prstGeom>
+          <a:ln>
+            <a:solidFill>
+              <a:schemeClr val="tx1"/>
+            </a:solidFill>
+            <a:tailEnd type="triangle"/>
+          </a:ln>
+        </p:spPr>
+        <p:style>
+          <a:lnRef idx="1">
+            <a:schemeClr val="accent1"/>
+          </a:lnRef>
+          <a:fillRef idx="0">
+            <a:schemeClr val="accent1"/>
+          </a:fillRef>
+          <a:effectRef idx="0">
+            <a:schemeClr val="accent1"/>
+          </a:effectRef>
+          <a:fontRef idx="minor">
+            <a:schemeClr val="tx1"/>
+          </a:fontRef>
+        </p:style>
+      </p:cxnSp>
+      <p:cxnSp>
+        <p:nvCxnSpPr>
+          <p:cNvPr id="58" name="Straight Connector 57">
+            <a:extLst>
+              <a:ext uri="{FF2B5EF4-FFF2-40B4-BE49-F238E27FC236}">
+                <a16:creationId xmlns:a16="http://schemas.microsoft.com/office/drawing/2014/main" id="{97F89AF3-C417-408A-8A17-49C1960E4D3C}"/>
+              </a:ext>
+            </a:extLst>
+          </p:cNvPr>
+          <p:cNvCxnSpPr/>
+          <p:nvPr/>
+        </p:nvCxnSpPr>
+        <p:spPr>
+          <a:xfrm flipH="1">
+            <a:off x="8338524" y="2192309"/>
+            <a:ext cx="2203579" cy="0"/>
+          </a:xfrm>
+          <a:prstGeom prst="line">
+            <a:avLst/>
+          </a:prstGeom>
+          <a:ln>
+            <a:solidFill>
+              <a:schemeClr val="tx1"/>
+            </a:solidFill>
+          </a:ln>
+        </p:spPr>
+        <p:style>
+          <a:lnRef idx="1">
+            <a:schemeClr val="accent1"/>
+          </a:lnRef>
+          <a:fillRef idx="0">
+            <a:schemeClr val="accent1"/>
+          </a:fillRef>
+          <a:effectRef idx="0">
+            <a:schemeClr val="accent1"/>
+          </a:effectRef>
+          <a:fontRef idx="minor">
+            <a:schemeClr val="tx1"/>
+          </a:fontRef>
+        </p:style>
+      </p:cxnSp>
+      <p:pic>
+        <p:nvPicPr>
+          <p:cNvPr id="2" name="Picture 1">
+            <a:extLst>
+              <a:ext uri="{FF2B5EF4-FFF2-40B4-BE49-F238E27FC236}">
+                <a16:creationId xmlns:a16="http://schemas.microsoft.com/office/drawing/2014/main" id="{19C98FB1-4AE9-437E-B769-F9ADD983A0C1}"/>
+              </a:ext>
+            </a:extLst>
+          </p:cNvPr>
+          <p:cNvPicPr>
+            <a:picLocks noChangeAspect="1"/>
+          </p:cNvPicPr>
+          <p:nvPr/>
+        </p:nvPicPr>
+        <p:blipFill>
+          <a:blip r:embed="rId6"/>
+          <a:stretch>
+            <a:fillRect/>
+          </a:stretch>
+        </p:blipFill>
+        <p:spPr>
+          <a:xfrm>
+            <a:off x="5154053" y="4441702"/>
+            <a:ext cx="1805876" cy="1805876"/>
+          </a:xfrm>
+          <a:prstGeom prst="rect">
+            <a:avLst/>
+          </a:prstGeom>
+        </p:spPr>
+      </p:pic>
       <p:grpSp>
         <p:nvGrpSpPr>
-          <p:cNvPr id="63" name="Group 62">
-            <a:extLst>
-              <a:ext uri="{FF2B5EF4-FFF2-40B4-BE49-F238E27FC236}">
-                <a16:creationId xmlns:a16="http://schemas.microsoft.com/office/drawing/2014/main" id="{C7B2FC38-1A21-4755-8A7C-D8FAF5CF3ACC}"/>
+          <p:cNvPr id="3" name="Group 2">
+            <a:extLst>
+              <a:ext uri="{FF2B5EF4-FFF2-40B4-BE49-F238E27FC236}">
+                <a16:creationId xmlns:a16="http://schemas.microsoft.com/office/drawing/2014/main" id="{BDC085E7-9285-48F8-BA30-76808F723839}"/>
               </a:ext>
             </a:extLst>
           </p:cNvPr>
@@ -4734,18 +4982,18 @@
         </p:nvGrpSpPr>
         <p:grpSpPr>
           <a:xfrm>
-            <a:off x="5350063" y="100636"/>
-            <a:ext cx="1153132" cy="939001"/>
-            <a:chOff x="5194851" y="76203"/>
-            <a:chExt cx="1630017" cy="1327331"/>
+            <a:off x="7699417" y="904255"/>
+            <a:ext cx="1153133" cy="914426"/>
+            <a:chOff x="7699417" y="904255"/>
+            <a:chExt cx="1153133" cy="914426"/>
           </a:xfrm>
         </p:grpSpPr>
         <p:sp>
           <p:nvSpPr>
-            <p:cNvPr id="45" name="Rectangle 44">
+            <p:cNvPr id="48" name="Rectangle 47">
               <a:extLst>
                 <a:ext uri="{FF2B5EF4-FFF2-40B4-BE49-F238E27FC236}">
-                  <a16:creationId xmlns:a16="http://schemas.microsoft.com/office/drawing/2014/main" id="{FF332222-6676-4CCE-A6E7-AE2073ACBAA2}"/>
+                  <a16:creationId xmlns:a16="http://schemas.microsoft.com/office/drawing/2014/main" id="{C507438B-FA2A-4BBD-84DE-9414257473E4}"/>
                 </a:ext>
               </a:extLst>
             </p:cNvPr>
@@ -4754,8 +5002,8 @@
           </p:nvSpPr>
           <p:spPr>
             <a:xfrm>
-              <a:off x="5194851" y="76203"/>
-              <a:ext cx="1630017" cy="1292592"/>
+              <a:off x="7699417" y="904255"/>
+              <a:ext cx="1153133" cy="914426"/>
             </a:xfrm>
             <a:prstGeom prst="rect">
               <a:avLst/>
@@ -4794,10 +5042,114 @@
         </p:sp>
         <p:sp>
           <p:nvSpPr>
-            <p:cNvPr id="25" name="Arc 24">
+            <p:cNvPr id="59" name="Rectangle 58">
               <a:extLst>
                 <a:ext uri="{FF2B5EF4-FFF2-40B4-BE49-F238E27FC236}">
-                  <a16:creationId xmlns:a16="http://schemas.microsoft.com/office/drawing/2014/main" id="{6293D2C6-F9BF-4ACD-9F62-C0A4EBD250E7}"/>
+                  <a16:creationId xmlns:a16="http://schemas.microsoft.com/office/drawing/2014/main" id="{5171E214-6EED-4AB4-B7E6-52FEBDD3970D}"/>
+                </a:ext>
+              </a:extLst>
+            </p:cNvPr>
+            <p:cNvSpPr/>
+            <p:nvPr/>
+          </p:nvSpPr>
+          <p:spPr>
+            <a:xfrm rot="340870">
+              <a:off x="8067758" y="1209386"/>
+              <a:ext cx="435546" cy="45719"/>
+            </a:xfrm>
+            <a:prstGeom prst="rect">
+              <a:avLst/>
+            </a:prstGeom>
+            <a:solidFill>
+              <a:schemeClr val="bg1"/>
+            </a:solidFill>
+            <a:ln>
+              <a:noFill/>
+            </a:ln>
+          </p:spPr>
+          <p:style>
+            <a:lnRef idx="2">
+              <a:schemeClr val="accent1">
+                <a:shade val="50000"/>
+              </a:schemeClr>
+            </a:lnRef>
+            <a:fillRef idx="1">
+              <a:schemeClr val="accent1"/>
+            </a:fillRef>
+            <a:effectRef idx="0">
+              <a:schemeClr val="accent1"/>
+            </a:effectRef>
+            <a:fontRef idx="minor">
+              <a:schemeClr val="lt1"/>
+            </a:fontRef>
+          </p:style>
+          <p:txBody>
+            <a:bodyPr rtlCol="0" anchor="ctr"/>
+            <a:lstStyle/>
+            <a:p>
+              <a:pPr algn="ctr"/>
+              <a:endParaRPr lang="en-AU"/>
+            </a:p>
+          </p:txBody>
+        </p:sp>
+        <p:sp>
+          <p:nvSpPr>
+            <p:cNvPr id="60" name="Rectangle 59">
+              <a:extLst>
+                <a:ext uri="{FF2B5EF4-FFF2-40B4-BE49-F238E27FC236}">
+                  <a16:creationId xmlns:a16="http://schemas.microsoft.com/office/drawing/2014/main" id="{4F8A1CD5-B46A-458E-96B5-92DD5B637501}"/>
+                </a:ext>
+              </a:extLst>
+            </p:cNvPr>
+            <p:cNvSpPr/>
+            <p:nvPr/>
+          </p:nvSpPr>
+          <p:spPr>
+            <a:xfrm rot="5400000">
+              <a:off x="8118748" y="1358303"/>
+              <a:ext cx="318282" cy="45719"/>
+            </a:xfrm>
+            <a:prstGeom prst="rect">
+              <a:avLst/>
+            </a:prstGeom>
+            <a:solidFill>
+              <a:schemeClr val="bg1"/>
+            </a:solidFill>
+            <a:ln>
+              <a:noFill/>
+            </a:ln>
+          </p:spPr>
+          <p:style>
+            <a:lnRef idx="2">
+              <a:schemeClr val="accent1">
+                <a:shade val="50000"/>
+              </a:schemeClr>
+            </a:lnRef>
+            <a:fillRef idx="1">
+              <a:schemeClr val="accent1"/>
+            </a:fillRef>
+            <a:effectRef idx="0">
+              <a:schemeClr val="accent1"/>
+            </a:effectRef>
+            <a:fontRef idx="minor">
+              <a:schemeClr val="lt1"/>
+            </a:fontRef>
+          </p:style>
+          <p:txBody>
+            <a:bodyPr rtlCol="0" anchor="ctr"/>
+            <a:lstStyle/>
+            <a:p>
+              <a:pPr algn="ctr"/>
+              <a:endParaRPr lang="en-AU"/>
+            </a:p>
+          </p:txBody>
+        </p:sp>
+        <p:sp>
+          <p:nvSpPr>
+            <p:cNvPr id="61" name="Arc 60">
+              <a:extLst>
+                <a:ext uri="{FF2B5EF4-FFF2-40B4-BE49-F238E27FC236}">
+                  <a16:creationId xmlns:a16="http://schemas.microsoft.com/office/drawing/2014/main" id="{C101C37F-7AAC-4F35-906D-3E24FAC8ECFB}"/>
                 </a:ext>
               </a:extLst>
             </p:cNvPr>
@@ -4806,14 +5158,14 @@
           </p:nvSpPr>
           <p:spPr>
             <a:xfrm>
-              <a:off x="5201108" y="495215"/>
-              <a:ext cx="908319" cy="908319"/>
+              <a:off x="7906977" y="1213688"/>
+              <a:ext cx="374096" cy="352667"/>
             </a:xfrm>
             <a:prstGeom prst="arc">
               <a:avLst/>
             </a:prstGeom>
             <a:noFill/>
-            <a:ln w="101600">
+            <a:ln w="88900">
               <a:solidFill>
                 <a:schemeClr val="bg1"/>
               </a:solidFill>
@@ -4843,103 +5195,12 @@
           </p:txBody>
         </p:sp>
       </p:grpSp>
-      <p:cxnSp>
-        <p:nvCxnSpPr>
-          <p:cNvPr id="47" name="Straight Arrow Connector 46">
-            <a:extLst>
-              <a:ext uri="{FF2B5EF4-FFF2-40B4-BE49-F238E27FC236}">
-                <a16:creationId xmlns:a16="http://schemas.microsoft.com/office/drawing/2014/main" id="{F778086B-7E67-4FDC-B203-62FA5A529318}"/>
-              </a:ext>
-            </a:extLst>
-          </p:cNvPr>
-          <p:cNvCxnSpPr/>
-          <p:nvPr/>
-        </p:nvCxnSpPr>
-        <p:spPr>
-          <a:xfrm>
-            <a:off x="4784032" y="551896"/>
-            <a:ext cx="530087" cy="0"/>
-          </a:xfrm>
-          <a:prstGeom prst="straightConnector1">
-            <a:avLst/>
-          </a:prstGeom>
-          <a:ln>
-            <a:solidFill>
-              <a:schemeClr val="tx1"/>
-            </a:solidFill>
-            <a:tailEnd type="triangle"/>
-          </a:ln>
-        </p:spPr>
-        <p:style>
-          <a:lnRef idx="1">
-            <a:schemeClr val="accent1"/>
-          </a:lnRef>
-          <a:fillRef idx="0">
-            <a:schemeClr val="accent1"/>
-          </a:fillRef>
-          <a:effectRef idx="0">
-            <a:schemeClr val="accent1"/>
-          </a:effectRef>
-          <a:fontRef idx="minor">
-            <a:schemeClr val="tx1"/>
-          </a:fontRef>
-        </p:style>
-      </p:cxnSp>
-      <p:sp>
-        <p:nvSpPr>
-          <p:cNvPr id="37" name="Right Brace 36">
-            <a:extLst>
-              <a:ext uri="{FF2B5EF4-FFF2-40B4-BE49-F238E27FC236}">
-                <a16:creationId xmlns:a16="http://schemas.microsoft.com/office/drawing/2014/main" id="{866CF1A3-A2FC-4006-8943-B29AE9401BF3}"/>
-              </a:ext>
-            </a:extLst>
-          </p:cNvPr>
-          <p:cNvSpPr/>
-          <p:nvPr/>
-        </p:nvSpPr>
-        <p:spPr>
-          <a:xfrm>
-            <a:off x="6773645" y="138348"/>
-            <a:ext cx="482495" cy="2249734"/>
-          </a:xfrm>
-          <a:prstGeom prst="rightBrace">
-            <a:avLst/>
-          </a:prstGeom>
-          <a:ln w="28575">
-            <a:solidFill>
-              <a:schemeClr val="tx1"/>
-            </a:solidFill>
-          </a:ln>
-        </p:spPr>
-        <p:style>
-          <a:lnRef idx="1">
-            <a:schemeClr val="accent1"/>
-          </a:lnRef>
-          <a:fillRef idx="0">
-            <a:schemeClr val="accent1"/>
-          </a:fillRef>
-          <a:effectRef idx="0">
-            <a:schemeClr val="accent1"/>
-          </a:effectRef>
-          <a:fontRef idx="minor">
-            <a:schemeClr val="tx1"/>
-          </a:fontRef>
-        </p:style>
-        <p:txBody>
-          <a:bodyPr rtlCol="0" anchor="ctr"/>
-          <a:lstStyle/>
-          <a:p>
-            <a:pPr algn="ctr"/>
-            <a:endParaRPr lang="en-AU"/>
-          </a:p>
-        </p:txBody>
-      </p:sp>
       <p:grpSp>
         <p:nvGrpSpPr>
-          <p:cNvPr id="62" name="Group 61">
-            <a:extLst>
-              <a:ext uri="{FF2B5EF4-FFF2-40B4-BE49-F238E27FC236}">
-                <a16:creationId xmlns:a16="http://schemas.microsoft.com/office/drawing/2014/main" id="{A438E95F-EA56-431E-A559-D55A63441B52}"/>
+          <p:cNvPr id="7" name="Group 6">
+            <a:extLst>
+              <a:ext uri="{FF2B5EF4-FFF2-40B4-BE49-F238E27FC236}">
+                <a16:creationId xmlns:a16="http://schemas.microsoft.com/office/drawing/2014/main" id="{361B6C3B-BC00-400B-A39A-2E647E7B2EB0}"/>
               </a:ext>
             </a:extLst>
           </p:cNvPr>
@@ -4948,18 +5209,18 @@
         </p:nvGrpSpPr>
         <p:grpSpPr>
           <a:xfrm>
-            <a:off x="7514926" y="792954"/>
-            <a:ext cx="1614880" cy="1243183"/>
-            <a:chOff x="7467514" y="632113"/>
-            <a:chExt cx="1679062" cy="1292592"/>
+            <a:off x="5350062" y="145318"/>
+            <a:ext cx="1153133" cy="914426"/>
+            <a:chOff x="5350062" y="145318"/>
+            <a:chExt cx="1153133" cy="914426"/>
           </a:xfrm>
         </p:grpSpPr>
         <p:sp>
           <p:nvSpPr>
-            <p:cNvPr id="49" name="Rectangle 48">
+            <p:cNvPr id="65" name="Rectangle 64">
               <a:extLst>
                 <a:ext uri="{FF2B5EF4-FFF2-40B4-BE49-F238E27FC236}">
-                  <a16:creationId xmlns:a16="http://schemas.microsoft.com/office/drawing/2014/main" id="{09EC2AA9-8F49-4799-8A45-F2CBF14D317B}"/>
+                  <a16:creationId xmlns:a16="http://schemas.microsoft.com/office/drawing/2014/main" id="{8D59C71D-3FAA-4653-8F4B-DF012AF20AF5}"/>
                 </a:ext>
               </a:extLst>
             </p:cNvPr>
@@ -4968,8 +5229,8 @@
           </p:nvSpPr>
           <p:spPr>
             <a:xfrm>
-              <a:off x="7516559" y="632113"/>
-              <a:ext cx="1630017" cy="1292592"/>
+              <a:off x="5350062" y="145318"/>
+              <a:ext cx="1153133" cy="914426"/>
             </a:xfrm>
             <a:prstGeom prst="rect">
               <a:avLst/>
@@ -5008,114 +5269,10 @@
         </p:sp>
         <p:sp>
           <p:nvSpPr>
-            <p:cNvPr id="50" name="Rectangle 49">
+            <p:cNvPr id="66" name="Arc 65">
               <a:extLst>
                 <a:ext uri="{FF2B5EF4-FFF2-40B4-BE49-F238E27FC236}">
-                  <a16:creationId xmlns:a16="http://schemas.microsoft.com/office/drawing/2014/main" id="{4C5204A0-9512-43AE-B034-D10EDA5DFA46}"/>
-                </a:ext>
-              </a:extLst>
-            </p:cNvPr>
-            <p:cNvSpPr/>
-            <p:nvPr/>
-          </p:nvSpPr>
-          <p:spPr>
-            <a:xfrm rot="340870">
-              <a:off x="7896638" y="859667"/>
-              <a:ext cx="958391" cy="185439"/>
-            </a:xfrm>
-            <a:prstGeom prst="rect">
-              <a:avLst/>
-            </a:prstGeom>
-            <a:solidFill>
-              <a:schemeClr val="bg1"/>
-            </a:solidFill>
-            <a:ln>
-              <a:noFill/>
-            </a:ln>
-          </p:spPr>
-          <p:style>
-            <a:lnRef idx="2">
-              <a:schemeClr val="accent1">
-                <a:shade val="50000"/>
-              </a:schemeClr>
-            </a:lnRef>
-            <a:fillRef idx="1">
-              <a:schemeClr val="accent1"/>
-            </a:fillRef>
-            <a:effectRef idx="0">
-              <a:schemeClr val="accent1"/>
-            </a:effectRef>
-            <a:fontRef idx="minor">
-              <a:schemeClr val="lt1"/>
-            </a:fontRef>
-          </p:style>
-          <p:txBody>
-            <a:bodyPr rtlCol="0" anchor="ctr"/>
-            <a:lstStyle/>
-            <a:p>
-              <a:pPr algn="ctr"/>
-              <a:endParaRPr lang="en-AU"/>
-            </a:p>
-          </p:txBody>
-        </p:sp>
-        <p:sp>
-          <p:nvSpPr>
-            <p:cNvPr id="51" name="Rectangle 50">
-              <a:extLst>
-                <a:ext uri="{FF2B5EF4-FFF2-40B4-BE49-F238E27FC236}">
-                  <a16:creationId xmlns:a16="http://schemas.microsoft.com/office/drawing/2014/main" id="{F9702FDA-A0FB-45CB-8526-80E4C9335029}"/>
-                </a:ext>
-              </a:extLst>
-            </p:cNvPr>
-            <p:cNvSpPr/>
-            <p:nvPr/>
-          </p:nvSpPr>
-          <p:spPr>
-            <a:xfrm rot="5400000">
-              <a:off x="7961180" y="1243052"/>
-              <a:ext cx="784865" cy="155260"/>
-            </a:xfrm>
-            <a:prstGeom prst="rect">
-              <a:avLst/>
-            </a:prstGeom>
-            <a:solidFill>
-              <a:schemeClr val="bg1"/>
-            </a:solidFill>
-            <a:ln>
-              <a:noFill/>
-            </a:ln>
-          </p:spPr>
-          <p:style>
-            <a:lnRef idx="2">
-              <a:schemeClr val="accent1">
-                <a:shade val="50000"/>
-              </a:schemeClr>
-            </a:lnRef>
-            <a:fillRef idx="1">
-              <a:schemeClr val="accent1"/>
-            </a:fillRef>
-            <a:effectRef idx="0">
-              <a:schemeClr val="accent1"/>
-            </a:effectRef>
-            <a:fontRef idx="minor">
-              <a:schemeClr val="lt1"/>
-            </a:fontRef>
-          </p:style>
-          <p:txBody>
-            <a:bodyPr rtlCol="0" anchor="ctr"/>
-            <a:lstStyle/>
-            <a:p>
-              <a:pPr algn="ctr"/>
-              <a:endParaRPr lang="en-AU"/>
-            </a:p>
-          </p:txBody>
-        </p:sp>
-        <p:sp>
-          <p:nvSpPr>
-            <p:cNvPr id="56" name="Arc 55">
-              <a:extLst>
-                <a:ext uri="{FF2B5EF4-FFF2-40B4-BE49-F238E27FC236}">
-                  <a16:creationId xmlns:a16="http://schemas.microsoft.com/office/drawing/2014/main" id="{9043A55B-AB94-4EA0-B7AA-A8CDF7BB62FF}"/>
+                  <a16:creationId xmlns:a16="http://schemas.microsoft.com/office/drawing/2014/main" id="{14D0E47E-870E-4965-90E8-F80E4C4DED5E}"/>
                 </a:ext>
               </a:extLst>
             </p:cNvPr>
@@ -5124,14 +5281,14 @@
           </p:nvSpPr>
           <p:spPr>
             <a:xfrm>
-              <a:off x="7467514" y="956178"/>
-              <a:ext cx="908319" cy="908319"/>
+              <a:off x="5557622" y="454751"/>
+              <a:ext cx="374096" cy="352667"/>
             </a:xfrm>
             <a:prstGeom prst="arc">
               <a:avLst/>
             </a:prstGeom>
             <a:noFill/>
-            <a:ln w="101600">
+            <a:ln w="88900">
               <a:solidFill>
                 <a:schemeClr val="bg1"/>
               </a:solidFill>
@@ -5161,163 +5318,6 @@
           </p:txBody>
         </p:sp>
       </p:grpSp>
-      <p:cxnSp>
-        <p:nvCxnSpPr>
-          <p:cNvPr id="42" name="Straight Arrow Connector 41">
-            <a:extLst>
-              <a:ext uri="{FF2B5EF4-FFF2-40B4-BE49-F238E27FC236}">
-                <a16:creationId xmlns:a16="http://schemas.microsoft.com/office/drawing/2014/main" id="{EB55AAEC-2200-44EC-985D-DC06468317ED}"/>
-              </a:ext>
-            </a:extLst>
-          </p:cNvPr>
-          <p:cNvCxnSpPr>
-            <a:cxnSpLocks/>
-          </p:cNvCxnSpPr>
-          <p:nvPr/>
-        </p:nvCxnSpPr>
-        <p:spPr>
-          <a:xfrm>
-            <a:off x="8338524" y="2036138"/>
-            <a:ext cx="0" cy="673432"/>
-          </a:xfrm>
-          <a:prstGeom prst="straightConnector1">
-            <a:avLst/>
-          </a:prstGeom>
-          <a:ln>
-            <a:solidFill>
-              <a:schemeClr val="tx1"/>
-            </a:solidFill>
-            <a:tailEnd type="triangle"/>
-          </a:ln>
-        </p:spPr>
-        <p:style>
-          <a:lnRef idx="1">
-            <a:schemeClr val="accent1"/>
-          </a:lnRef>
-          <a:fillRef idx="0">
-            <a:schemeClr val="accent1"/>
-          </a:fillRef>
-          <a:effectRef idx="0">
-            <a:schemeClr val="accent1"/>
-          </a:effectRef>
-          <a:fontRef idx="minor">
-            <a:schemeClr val="tx1"/>
-          </a:fontRef>
-        </p:style>
-      </p:cxnSp>
-      <p:cxnSp>
-        <p:nvCxnSpPr>
-          <p:cNvPr id="57" name="Straight Arrow Connector 56">
-            <a:extLst>
-              <a:ext uri="{FF2B5EF4-FFF2-40B4-BE49-F238E27FC236}">
-                <a16:creationId xmlns:a16="http://schemas.microsoft.com/office/drawing/2014/main" id="{48ADF1AA-DB11-43A3-BCAC-5973EEB38072}"/>
-              </a:ext>
-            </a:extLst>
-          </p:cNvPr>
-          <p:cNvCxnSpPr/>
-          <p:nvPr/>
-        </p:nvCxnSpPr>
-        <p:spPr>
-          <a:xfrm>
-            <a:off x="10542103" y="2192309"/>
-            <a:ext cx="0" cy="517261"/>
-          </a:xfrm>
-          <a:prstGeom prst="straightConnector1">
-            <a:avLst/>
-          </a:prstGeom>
-          <a:ln>
-            <a:solidFill>
-              <a:schemeClr val="tx1"/>
-            </a:solidFill>
-            <a:tailEnd type="triangle"/>
-          </a:ln>
-        </p:spPr>
-        <p:style>
-          <a:lnRef idx="1">
-            <a:schemeClr val="accent1"/>
-          </a:lnRef>
-          <a:fillRef idx="0">
-            <a:schemeClr val="accent1"/>
-          </a:fillRef>
-          <a:effectRef idx="0">
-            <a:schemeClr val="accent1"/>
-          </a:effectRef>
-          <a:fontRef idx="minor">
-            <a:schemeClr val="tx1"/>
-          </a:fontRef>
-        </p:style>
-      </p:cxnSp>
-      <p:cxnSp>
-        <p:nvCxnSpPr>
-          <p:cNvPr id="58" name="Straight Connector 57">
-            <a:extLst>
-              <a:ext uri="{FF2B5EF4-FFF2-40B4-BE49-F238E27FC236}">
-                <a16:creationId xmlns:a16="http://schemas.microsoft.com/office/drawing/2014/main" id="{97F89AF3-C417-408A-8A17-49C1960E4D3C}"/>
-              </a:ext>
-            </a:extLst>
-          </p:cNvPr>
-          <p:cNvCxnSpPr/>
-          <p:nvPr/>
-        </p:nvCxnSpPr>
-        <p:spPr>
-          <a:xfrm flipH="1">
-            <a:off x="8338524" y="2192309"/>
-            <a:ext cx="2203579" cy="0"/>
-          </a:xfrm>
-          <a:prstGeom prst="line">
-            <a:avLst/>
-          </a:prstGeom>
-          <a:ln>
-            <a:solidFill>
-              <a:schemeClr val="tx1"/>
-            </a:solidFill>
-          </a:ln>
-        </p:spPr>
-        <p:style>
-          <a:lnRef idx="1">
-            <a:schemeClr val="accent1"/>
-          </a:lnRef>
-          <a:fillRef idx="0">
-            <a:schemeClr val="accent1"/>
-          </a:fillRef>
-          <a:effectRef idx="0">
-            <a:schemeClr val="accent1"/>
-          </a:effectRef>
-          <a:fontRef idx="minor">
-            <a:schemeClr val="tx1"/>
-          </a:fontRef>
-        </p:style>
-      </p:cxnSp>
-      <p:pic>
-        <p:nvPicPr>
-          <p:cNvPr id="2" name="Picture 1">
-            <a:extLst>
-              <a:ext uri="{FF2B5EF4-FFF2-40B4-BE49-F238E27FC236}">
-                <a16:creationId xmlns:a16="http://schemas.microsoft.com/office/drawing/2014/main" id="{19C98FB1-4AE9-437E-B769-F9ADD983A0C1}"/>
-              </a:ext>
-            </a:extLst>
-          </p:cNvPr>
-          <p:cNvPicPr>
-            <a:picLocks noChangeAspect="1"/>
-          </p:cNvPicPr>
-          <p:nvPr/>
-        </p:nvPicPr>
-        <p:blipFill>
-          <a:blip r:embed="rId6"/>
-          <a:stretch>
-            <a:fillRect/>
-          </a:stretch>
-        </p:blipFill>
-        <p:spPr>
-          <a:xfrm>
-            <a:off x="5154053" y="4441702"/>
-            <a:ext cx="1805876" cy="1805876"/>
-          </a:xfrm>
-          <a:prstGeom prst="rect">
-            <a:avLst/>
-          </a:prstGeom>
-        </p:spPr>
-      </p:pic>
     </p:spTree>
     <p:extLst>
       <p:ext uri="{BB962C8B-B14F-4D97-AF65-F5344CB8AC3E}">

</xml_diff>

<commit_message>
Report draft 2 complete
</commit_message>
<xml_diff>
--- a/Docs/Final/systemOverview.pptx
+++ b/Docs/Final/systemOverview.pptx
@@ -266,7 +266,7 @@
           <a:p>
             <a:fld id="{E8ECAF92-C71A-477A-A898-30019CFA0318}" type="datetimeFigureOut">
               <a:rPr lang="en-AU" smtClean="0"/>
-              <a:t>6/10/2019</a:t>
+              <a:t>10/10/2019</a:t>
             </a:fld>
             <a:endParaRPr lang="en-AU"/>
           </a:p>
@@ -466,7 +466,7 @@
           <a:p>
             <a:fld id="{E8ECAF92-C71A-477A-A898-30019CFA0318}" type="datetimeFigureOut">
               <a:rPr lang="en-AU" smtClean="0"/>
-              <a:t>6/10/2019</a:t>
+              <a:t>10/10/2019</a:t>
             </a:fld>
             <a:endParaRPr lang="en-AU"/>
           </a:p>
@@ -676,7 +676,7 @@
           <a:p>
             <a:fld id="{E8ECAF92-C71A-477A-A898-30019CFA0318}" type="datetimeFigureOut">
               <a:rPr lang="en-AU" smtClean="0"/>
-              <a:t>6/10/2019</a:t>
+              <a:t>10/10/2019</a:t>
             </a:fld>
             <a:endParaRPr lang="en-AU"/>
           </a:p>
@@ -876,7 +876,7 @@
           <a:p>
             <a:fld id="{E8ECAF92-C71A-477A-A898-30019CFA0318}" type="datetimeFigureOut">
               <a:rPr lang="en-AU" smtClean="0"/>
-              <a:t>6/10/2019</a:t>
+              <a:t>10/10/2019</a:t>
             </a:fld>
             <a:endParaRPr lang="en-AU"/>
           </a:p>
@@ -1152,7 +1152,7 @@
           <a:p>
             <a:fld id="{E8ECAF92-C71A-477A-A898-30019CFA0318}" type="datetimeFigureOut">
               <a:rPr lang="en-AU" smtClean="0"/>
-              <a:t>6/10/2019</a:t>
+              <a:t>10/10/2019</a:t>
             </a:fld>
             <a:endParaRPr lang="en-AU"/>
           </a:p>
@@ -1420,7 +1420,7 @@
           <a:p>
             <a:fld id="{E8ECAF92-C71A-477A-A898-30019CFA0318}" type="datetimeFigureOut">
               <a:rPr lang="en-AU" smtClean="0"/>
-              <a:t>6/10/2019</a:t>
+              <a:t>10/10/2019</a:t>
             </a:fld>
             <a:endParaRPr lang="en-AU"/>
           </a:p>
@@ -1835,7 +1835,7 @@
           <a:p>
             <a:fld id="{E8ECAF92-C71A-477A-A898-30019CFA0318}" type="datetimeFigureOut">
               <a:rPr lang="en-AU" smtClean="0"/>
-              <a:t>6/10/2019</a:t>
+              <a:t>10/10/2019</a:t>
             </a:fld>
             <a:endParaRPr lang="en-AU"/>
           </a:p>
@@ -1977,7 +1977,7 @@
           <a:p>
             <a:fld id="{E8ECAF92-C71A-477A-A898-30019CFA0318}" type="datetimeFigureOut">
               <a:rPr lang="en-AU" smtClean="0"/>
-              <a:t>6/10/2019</a:t>
+              <a:t>10/10/2019</a:t>
             </a:fld>
             <a:endParaRPr lang="en-AU"/>
           </a:p>
@@ -2090,7 +2090,7 @@
           <a:p>
             <a:fld id="{E8ECAF92-C71A-477A-A898-30019CFA0318}" type="datetimeFigureOut">
               <a:rPr lang="en-AU" smtClean="0"/>
-              <a:t>6/10/2019</a:t>
+              <a:t>10/10/2019</a:t>
             </a:fld>
             <a:endParaRPr lang="en-AU"/>
           </a:p>
@@ -2403,7 +2403,7 @@
           <a:p>
             <a:fld id="{E8ECAF92-C71A-477A-A898-30019CFA0318}" type="datetimeFigureOut">
               <a:rPr lang="en-AU" smtClean="0"/>
-              <a:t>6/10/2019</a:t>
+              <a:t>10/10/2019</a:t>
             </a:fld>
             <a:endParaRPr lang="en-AU"/>
           </a:p>
@@ -2692,7 +2692,7 @@
           <a:p>
             <a:fld id="{E8ECAF92-C71A-477A-A898-30019CFA0318}" type="datetimeFigureOut">
               <a:rPr lang="en-AU" smtClean="0"/>
-              <a:t>6/10/2019</a:t>
+              <a:t>10/10/2019</a:t>
             </a:fld>
             <a:endParaRPr lang="en-AU"/>
           </a:p>
@@ -2935,7 +2935,7 @@
           <a:p>
             <a:fld id="{E8ECAF92-C71A-477A-A898-30019CFA0318}" type="datetimeFigureOut">
               <a:rPr lang="en-AU" smtClean="0"/>
-              <a:t>6/10/2019</a:t>
+              <a:t>10/10/2019</a:t>
             </a:fld>
             <a:endParaRPr lang="en-AU"/>
           </a:p>
@@ -5837,60 +5837,6 @@
             </a:prstGeom>
             <a:solidFill>
               <a:schemeClr val="bg1"/>
-            </a:solidFill>
-            <a:ln>
-              <a:solidFill>
-                <a:schemeClr val="tx1"/>
-              </a:solidFill>
-            </a:ln>
-          </p:spPr>
-          <p:style>
-            <a:lnRef idx="2">
-              <a:schemeClr val="accent1">
-                <a:shade val="50000"/>
-              </a:schemeClr>
-            </a:lnRef>
-            <a:fillRef idx="1">
-              <a:schemeClr val="accent1"/>
-            </a:fillRef>
-            <a:effectRef idx="0">
-              <a:schemeClr val="accent1"/>
-            </a:effectRef>
-            <a:fontRef idx="minor">
-              <a:schemeClr val="lt1"/>
-            </a:fontRef>
-          </p:style>
-          <p:txBody>
-            <a:bodyPr rtlCol="0" anchor="ctr"/>
-            <a:lstStyle/>
-            <a:p>
-              <a:pPr algn="ctr"/>
-              <a:endParaRPr lang="en-AU"/>
-            </a:p>
-          </p:txBody>
-        </p:sp>
-        <p:sp>
-          <p:nvSpPr>
-            <p:cNvPr id="33" name="Isosceles Triangle 32">
-              <a:extLst>
-                <a:ext uri="{FF2B5EF4-FFF2-40B4-BE49-F238E27FC236}">
-                  <a16:creationId xmlns:a16="http://schemas.microsoft.com/office/drawing/2014/main" id="{ABC94D29-BFE4-4D78-ABC9-8B184B6F7BD7}"/>
-                </a:ext>
-              </a:extLst>
-            </p:cNvPr>
-            <p:cNvSpPr/>
-            <p:nvPr/>
-          </p:nvSpPr>
-          <p:spPr>
-            <a:xfrm>
-              <a:off x="2965175" y="1835528"/>
-              <a:ext cx="172278" cy="172278"/>
-            </a:xfrm>
-            <a:prstGeom prst="triangle">
-              <a:avLst/>
-            </a:prstGeom>
-            <a:solidFill>
-              <a:schemeClr val="tx1"/>
             </a:solidFill>
             <a:ln>
               <a:solidFill>
@@ -6521,60 +6467,6 @@
           </p:sp>
           <p:sp>
             <p:nvSpPr>
-              <p:cNvPr id="46" name="Isosceles Triangle 45">
-                <a:extLst>
-                  <a:ext uri="{FF2B5EF4-FFF2-40B4-BE49-F238E27FC236}">
-                    <a16:creationId xmlns:a16="http://schemas.microsoft.com/office/drawing/2014/main" id="{E10CC3F3-95C3-47A8-B786-807326F8625E}"/>
-                  </a:ext>
-                </a:extLst>
-              </p:cNvPr>
-              <p:cNvSpPr/>
-              <p:nvPr/>
-            </p:nvSpPr>
-            <p:spPr>
-              <a:xfrm>
-                <a:off x="3443358" y="1613551"/>
-                <a:ext cx="172278" cy="172278"/>
-              </a:xfrm>
-              <a:prstGeom prst="triangle">
-                <a:avLst/>
-              </a:prstGeom>
-              <a:solidFill>
-                <a:schemeClr val="tx1"/>
-              </a:solidFill>
-              <a:ln>
-                <a:solidFill>
-                  <a:schemeClr val="tx1"/>
-                </a:solidFill>
-              </a:ln>
-            </p:spPr>
-            <p:style>
-              <a:lnRef idx="2">
-                <a:schemeClr val="accent1">
-                  <a:shade val="50000"/>
-                </a:schemeClr>
-              </a:lnRef>
-              <a:fillRef idx="1">
-                <a:schemeClr val="accent1"/>
-              </a:fillRef>
-              <a:effectRef idx="0">
-                <a:schemeClr val="accent1"/>
-              </a:effectRef>
-              <a:fontRef idx="minor">
-                <a:schemeClr val="lt1"/>
-              </a:fontRef>
-            </p:style>
-            <p:txBody>
-              <a:bodyPr rtlCol="0" anchor="ctr"/>
-              <a:lstStyle/>
-              <a:p>
-                <a:pPr algn="ctr"/>
-                <a:endParaRPr lang="en-AU"/>
-              </a:p>
-            </p:txBody>
-          </p:sp>
-          <p:sp>
-            <p:nvSpPr>
               <p:cNvPr id="47" name="Right Brace 46">
                 <a:extLst>
                   <a:ext uri="{FF2B5EF4-FFF2-40B4-BE49-F238E27FC236}">
@@ -6946,6 +6838,114 @@
           </p:txBody>
         </p:sp>
       </p:grpSp>
+      <p:sp>
+        <p:nvSpPr>
+          <p:cNvPr id="2" name="Rectangle 1">
+            <a:extLst>
+              <a:ext uri="{FF2B5EF4-FFF2-40B4-BE49-F238E27FC236}">
+                <a16:creationId xmlns:a16="http://schemas.microsoft.com/office/drawing/2014/main" id="{4DA62F02-F0E7-486F-8436-47979847FA65}"/>
+              </a:ext>
+            </a:extLst>
+          </p:cNvPr>
+          <p:cNvSpPr/>
+          <p:nvPr/>
+        </p:nvSpPr>
+        <p:spPr>
+          <a:xfrm>
+            <a:off x="2785252" y="1617076"/>
+            <a:ext cx="159386" cy="159386"/>
+          </a:xfrm>
+          <a:prstGeom prst="rect">
+            <a:avLst/>
+          </a:prstGeom>
+          <a:solidFill>
+            <a:schemeClr val="tx1"/>
+          </a:solidFill>
+          <a:ln>
+            <a:solidFill>
+              <a:schemeClr val="tx1"/>
+            </a:solidFill>
+          </a:ln>
+        </p:spPr>
+        <p:style>
+          <a:lnRef idx="2">
+            <a:schemeClr val="accent1">
+              <a:shade val="50000"/>
+            </a:schemeClr>
+          </a:lnRef>
+          <a:fillRef idx="1">
+            <a:schemeClr val="accent1"/>
+          </a:fillRef>
+          <a:effectRef idx="0">
+            <a:schemeClr val="accent1"/>
+          </a:effectRef>
+          <a:fontRef idx="minor">
+            <a:schemeClr val="lt1"/>
+          </a:fontRef>
+        </p:style>
+        <p:txBody>
+          <a:bodyPr rtlCol="0" anchor="ctr"/>
+          <a:lstStyle/>
+          <a:p>
+            <a:pPr algn="ctr"/>
+            <a:endParaRPr lang="en-AU"/>
+          </a:p>
+        </p:txBody>
+      </p:sp>
+      <p:sp>
+        <p:nvSpPr>
+          <p:cNvPr id="58" name="Rectangle 57">
+            <a:extLst>
+              <a:ext uri="{FF2B5EF4-FFF2-40B4-BE49-F238E27FC236}">
+                <a16:creationId xmlns:a16="http://schemas.microsoft.com/office/drawing/2014/main" id="{33BF3C9B-45E7-434F-9A96-703FE9FF894C}"/>
+              </a:ext>
+            </a:extLst>
+          </p:cNvPr>
+          <p:cNvSpPr/>
+          <p:nvPr/>
+        </p:nvSpPr>
+        <p:spPr>
+          <a:xfrm>
+            <a:off x="9592766" y="1692444"/>
+            <a:ext cx="159386" cy="159386"/>
+          </a:xfrm>
+          <a:prstGeom prst="rect">
+            <a:avLst/>
+          </a:prstGeom>
+          <a:solidFill>
+            <a:schemeClr val="tx1"/>
+          </a:solidFill>
+          <a:ln>
+            <a:solidFill>
+              <a:schemeClr val="tx1"/>
+            </a:solidFill>
+          </a:ln>
+        </p:spPr>
+        <p:style>
+          <a:lnRef idx="2">
+            <a:schemeClr val="accent1">
+              <a:shade val="50000"/>
+            </a:schemeClr>
+          </a:lnRef>
+          <a:fillRef idx="1">
+            <a:schemeClr val="accent1"/>
+          </a:fillRef>
+          <a:effectRef idx="0">
+            <a:schemeClr val="accent1"/>
+          </a:effectRef>
+          <a:fontRef idx="minor">
+            <a:schemeClr val="lt1"/>
+          </a:fontRef>
+        </p:style>
+        <p:txBody>
+          <a:bodyPr rtlCol="0" anchor="ctr"/>
+          <a:lstStyle/>
+          <a:p>
+            <a:pPr algn="ctr"/>
+            <a:endParaRPr lang="en-AU"/>
+          </a:p>
+        </p:txBody>
+      </p:sp>
     </p:spTree>
     <p:extLst>
       <p:ext uri="{BB962C8B-B14F-4D97-AF65-F5344CB8AC3E}">

</xml_diff>